<commit_message>
Fill out missing stuff
</commit_message>
<xml_diff>
--- a/figures/figures.pptx
+++ b/figures/figures.pptx
@@ -7,6 +7,7 @@
   <p:sldIdLst>
     <p:sldId id="257" r:id="rId2"/>
     <p:sldId id="258" r:id="rId3"/>
+    <p:sldId id="260" r:id="rId4"/>
   </p:sldIdLst>
   <p:sldSz cx="9144000" cy="6858000" type="screen4x3"/>
   <p:notesSz cx="6858000" cy="9144000"/>
@@ -289,7 +290,7 @@
           <a:p>
             <a:fld id="{56FF5959-4879-46D8-B814-66C710277C6C}" type="datetimeFigureOut">
               <a:rPr lang="en-US" smtClean="0"/>
-              <a:t>9/1/2016</a:t>
+              <a:t>9/27/2016</a:t>
             </a:fld>
             <a:endParaRPr lang="en-US"/>
           </a:p>
@@ -459,7 +460,7 @@
           <a:p>
             <a:fld id="{56FF5959-4879-46D8-B814-66C710277C6C}" type="datetimeFigureOut">
               <a:rPr lang="en-US" smtClean="0"/>
-              <a:t>9/1/2016</a:t>
+              <a:t>9/27/2016</a:t>
             </a:fld>
             <a:endParaRPr lang="en-US"/>
           </a:p>
@@ -639,7 +640,7 @@
           <a:p>
             <a:fld id="{56FF5959-4879-46D8-B814-66C710277C6C}" type="datetimeFigureOut">
               <a:rPr lang="en-US" smtClean="0"/>
-              <a:t>9/1/2016</a:t>
+              <a:t>9/27/2016</a:t>
             </a:fld>
             <a:endParaRPr lang="en-US"/>
           </a:p>
@@ -809,7 +810,7 @@
           <a:p>
             <a:fld id="{56FF5959-4879-46D8-B814-66C710277C6C}" type="datetimeFigureOut">
               <a:rPr lang="en-US" smtClean="0"/>
-              <a:t>9/1/2016</a:t>
+              <a:t>9/27/2016</a:t>
             </a:fld>
             <a:endParaRPr lang="en-US"/>
           </a:p>
@@ -1055,7 +1056,7 @@
           <a:p>
             <a:fld id="{56FF5959-4879-46D8-B814-66C710277C6C}" type="datetimeFigureOut">
               <a:rPr lang="en-US" smtClean="0"/>
-              <a:t>9/1/2016</a:t>
+              <a:t>9/27/2016</a:t>
             </a:fld>
             <a:endParaRPr lang="en-US"/>
           </a:p>
@@ -1343,7 +1344,7 @@
           <a:p>
             <a:fld id="{56FF5959-4879-46D8-B814-66C710277C6C}" type="datetimeFigureOut">
               <a:rPr lang="en-US" smtClean="0"/>
-              <a:t>9/1/2016</a:t>
+              <a:t>9/27/2016</a:t>
             </a:fld>
             <a:endParaRPr lang="en-US"/>
           </a:p>
@@ -1765,7 +1766,7 @@
           <a:p>
             <a:fld id="{56FF5959-4879-46D8-B814-66C710277C6C}" type="datetimeFigureOut">
               <a:rPr lang="en-US" smtClean="0"/>
-              <a:t>9/1/2016</a:t>
+              <a:t>9/27/2016</a:t>
             </a:fld>
             <a:endParaRPr lang="en-US"/>
           </a:p>
@@ -1883,7 +1884,7 @@
           <a:p>
             <a:fld id="{56FF5959-4879-46D8-B814-66C710277C6C}" type="datetimeFigureOut">
               <a:rPr lang="en-US" smtClean="0"/>
-              <a:t>9/1/2016</a:t>
+              <a:t>9/27/2016</a:t>
             </a:fld>
             <a:endParaRPr lang="en-US"/>
           </a:p>
@@ -1978,7 +1979,7 @@
           <a:p>
             <a:fld id="{56FF5959-4879-46D8-B814-66C710277C6C}" type="datetimeFigureOut">
               <a:rPr lang="en-US" smtClean="0"/>
-              <a:t>9/1/2016</a:t>
+              <a:t>9/27/2016</a:t>
             </a:fld>
             <a:endParaRPr lang="en-US"/>
           </a:p>
@@ -2255,7 +2256,7 @@
           <a:p>
             <a:fld id="{56FF5959-4879-46D8-B814-66C710277C6C}" type="datetimeFigureOut">
               <a:rPr lang="en-US" smtClean="0"/>
-              <a:t>9/1/2016</a:t>
+              <a:t>9/27/2016</a:t>
             </a:fld>
             <a:endParaRPr lang="en-US"/>
           </a:p>
@@ -2508,7 +2509,7 @@
           <a:p>
             <a:fld id="{56FF5959-4879-46D8-B814-66C710277C6C}" type="datetimeFigureOut">
               <a:rPr lang="en-US" smtClean="0"/>
-              <a:t>9/1/2016</a:t>
+              <a:t>9/27/2016</a:t>
             </a:fld>
             <a:endParaRPr lang="en-US"/>
           </a:p>
@@ -2721,7 +2722,7 @@
           <a:p>
             <a:fld id="{56FF5959-4879-46D8-B814-66C710277C6C}" type="datetimeFigureOut">
               <a:rPr lang="en-US" smtClean="0"/>
-              <a:t>9/1/2016</a:t>
+              <a:t>9/27/2016</a:t>
             </a:fld>
             <a:endParaRPr lang="en-US"/>
           </a:p>
@@ -6831,7 +6832,6 @@
                         <a:rPr lang="en-US" sz="1100" dirty="0" smtClean="0"/>
                         <a:t>α</a:t>
                       </a:r>
-                      <a:endParaRPr lang="en-US" sz="1100" dirty="0" smtClean="0"/>
                     </a:p>
                   </a:txBody>
                   <a:tcPr marL="57968" marR="57968" marT="28984" marB="28984"/>
@@ -8435,6 +8435,100 @@
 </p:sld>
 </file>
 
+<file path=ppt/slides/slide3.xml><?xml version="1.0" encoding="utf-8"?>
+<p:sld xmlns:a="http://schemas.openxmlformats.org/drawingml/2006/main" xmlns:r="http://schemas.openxmlformats.org/officeDocument/2006/relationships" xmlns:p="http://schemas.openxmlformats.org/presentationml/2006/main">
+  <p:cSld>
+    <p:spTree>
+      <p:nvGrpSpPr>
+        <p:cNvPr id="1" name=""/>
+        <p:cNvGrpSpPr/>
+        <p:nvPr/>
+      </p:nvGrpSpPr>
+      <p:grpSpPr>
+        <a:xfrm>
+          <a:off x="0" y="0"/>
+          <a:ext cx="0" cy="0"/>
+          <a:chOff x="0" y="0"/>
+          <a:chExt cx="0" cy="0"/>
+        </a:xfrm>
+      </p:grpSpPr>
+      <p:pic>
+        <p:nvPicPr>
+          <p:cNvPr id="1026" name="Picture 2"/>
+          <p:cNvPicPr>
+            <a:picLocks noChangeAspect="1" noChangeArrowheads="1"/>
+          </p:cNvPicPr>
+          <p:nvPr/>
+        </p:nvPicPr>
+        <p:blipFill>
+          <a:blip r:embed="rId2">
+            <a:extLst>
+              <a:ext uri="{28A0092B-C50C-407E-A947-70E740481C1C}">
+                <a14:useLocalDpi xmlns:a14="http://schemas.microsoft.com/office/drawing/2010/main" val="0"/>
+              </a:ext>
+            </a:extLst>
+          </a:blip>
+          <a:srcRect/>
+          <a:stretch>
+            <a:fillRect/>
+          </a:stretch>
+        </p:blipFill>
+        <p:spPr bwMode="auto">
+          <a:xfrm>
+            <a:off x="712975" y="1133515"/>
+            <a:ext cx="4234622" cy="5234135"/>
+          </a:xfrm>
+          <a:prstGeom prst="rect">
+            <a:avLst/>
+          </a:prstGeom>
+          <a:noFill/>
+          <a:ln>
+            <a:noFill/>
+          </a:ln>
+          <a:effectLst/>
+          <a:extLst>
+            <a:ext uri="{909E8E84-426E-40DD-AFC4-6F175D3DCCD1}">
+              <a14:hiddenFill xmlns:a14="http://schemas.microsoft.com/office/drawing/2010/main">
+                <a:solidFill>
+                  <a:schemeClr val="accent1"/>
+                </a:solidFill>
+              </a14:hiddenFill>
+            </a:ext>
+            <a:ext uri="{91240B29-F687-4F45-9708-019B960494DF}">
+              <a14:hiddenLine xmlns:a14="http://schemas.microsoft.com/office/drawing/2010/main" w="9525">
+                <a:solidFill>
+                  <a:schemeClr val="tx1"/>
+                </a:solidFill>
+                <a:miter lim="800000"/>
+                <a:headEnd/>
+                <a:tailEnd/>
+              </a14:hiddenLine>
+            </a:ext>
+            <a:ext uri="{AF507438-7753-43E0-B8FC-AC1667EBCBE1}">
+              <a14:hiddenEffects xmlns:a14="http://schemas.microsoft.com/office/drawing/2010/main">
+                <a:effectLst>
+                  <a:outerShdw dist="35921" dir="2700000" algn="ctr" rotWithShape="0">
+                    <a:schemeClr val="bg2"/>
+                  </a:outerShdw>
+                </a:effectLst>
+              </a14:hiddenEffects>
+            </a:ext>
+          </a:extLst>
+        </p:spPr>
+      </p:pic>
+    </p:spTree>
+    <p:extLst>
+      <p:ext uri="{BB962C8B-B14F-4D97-AF65-F5344CB8AC3E}">
+        <p14:creationId xmlns:p14="http://schemas.microsoft.com/office/powerpoint/2010/main" val="2896245276"/>
+      </p:ext>
+    </p:extLst>
+  </p:cSld>
+  <p:clrMapOvr>
+    <a:masterClrMapping/>
+  </p:clrMapOvr>
+</p:sld>
+</file>
+
 <file path=ppt/theme/theme1.xml><?xml version="1.0" encoding="utf-8"?>
 <a:theme xmlns:a="http://schemas.openxmlformats.org/drawingml/2006/main" name="Office Theme">
   <a:themeElements>

</xml_diff>

<commit_message>
Add microbe set fig, make some stuff prettier
</commit_message>
<xml_diff>
--- a/figures/figures.pptx
+++ b/figures/figures.pptx
@@ -8,6 +8,7 @@
     <p:sldId id="257" r:id="rId2"/>
     <p:sldId id="258" r:id="rId3"/>
     <p:sldId id="260" r:id="rId4"/>
+    <p:sldId id="261" r:id="rId5"/>
   </p:sldIdLst>
   <p:sldSz cx="9144000" cy="6858000" type="screen4x3"/>
   <p:notesSz cx="6858000" cy="9144000"/>
@@ -290,7 +291,7 @@
           <a:p>
             <a:fld id="{56FF5959-4879-46D8-B814-66C710277C6C}" type="datetimeFigureOut">
               <a:rPr lang="en-US" smtClean="0"/>
-              <a:t>9/27/2016</a:t>
+              <a:t>9/29/2016</a:t>
             </a:fld>
             <a:endParaRPr lang="en-US"/>
           </a:p>
@@ -460,7 +461,7 @@
           <a:p>
             <a:fld id="{56FF5959-4879-46D8-B814-66C710277C6C}" type="datetimeFigureOut">
               <a:rPr lang="en-US" smtClean="0"/>
-              <a:t>9/27/2016</a:t>
+              <a:t>9/29/2016</a:t>
             </a:fld>
             <a:endParaRPr lang="en-US"/>
           </a:p>
@@ -640,7 +641,7 @@
           <a:p>
             <a:fld id="{56FF5959-4879-46D8-B814-66C710277C6C}" type="datetimeFigureOut">
               <a:rPr lang="en-US" smtClean="0"/>
-              <a:t>9/27/2016</a:t>
+              <a:t>9/29/2016</a:t>
             </a:fld>
             <a:endParaRPr lang="en-US"/>
           </a:p>
@@ -810,7 +811,7 @@
           <a:p>
             <a:fld id="{56FF5959-4879-46D8-B814-66C710277C6C}" type="datetimeFigureOut">
               <a:rPr lang="en-US" smtClean="0"/>
-              <a:t>9/27/2016</a:t>
+              <a:t>9/29/2016</a:t>
             </a:fld>
             <a:endParaRPr lang="en-US"/>
           </a:p>
@@ -1056,7 +1057,7 @@
           <a:p>
             <a:fld id="{56FF5959-4879-46D8-B814-66C710277C6C}" type="datetimeFigureOut">
               <a:rPr lang="en-US" smtClean="0"/>
-              <a:t>9/27/2016</a:t>
+              <a:t>9/29/2016</a:t>
             </a:fld>
             <a:endParaRPr lang="en-US"/>
           </a:p>
@@ -1344,7 +1345,7 @@
           <a:p>
             <a:fld id="{56FF5959-4879-46D8-B814-66C710277C6C}" type="datetimeFigureOut">
               <a:rPr lang="en-US" smtClean="0"/>
-              <a:t>9/27/2016</a:t>
+              <a:t>9/29/2016</a:t>
             </a:fld>
             <a:endParaRPr lang="en-US"/>
           </a:p>
@@ -1766,7 +1767,7 @@
           <a:p>
             <a:fld id="{56FF5959-4879-46D8-B814-66C710277C6C}" type="datetimeFigureOut">
               <a:rPr lang="en-US" smtClean="0"/>
-              <a:t>9/27/2016</a:t>
+              <a:t>9/29/2016</a:t>
             </a:fld>
             <a:endParaRPr lang="en-US"/>
           </a:p>
@@ -1884,7 +1885,7 @@
           <a:p>
             <a:fld id="{56FF5959-4879-46D8-B814-66C710277C6C}" type="datetimeFigureOut">
               <a:rPr lang="en-US" smtClean="0"/>
-              <a:t>9/27/2016</a:t>
+              <a:t>9/29/2016</a:t>
             </a:fld>
             <a:endParaRPr lang="en-US"/>
           </a:p>
@@ -1979,7 +1980,7 @@
           <a:p>
             <a:fld id="{56FF5959-4879-46D8-B814-66C710277C6C}" type="datetimeFigureOut">
               <a:rPr lang="en-US" smtClean="0"/>
-              <a:t>9/27/2016</a:t>
+              <a:t>9/29/2016</a:t>
             </a:fld>
             <a:endParaRPr lang="en-US"/>
           </a:p>
@@ -2256,7 +2257,7 @@
           <a:p>
             <a:fld id="{56FF5959-4879-46D8-B814-66C710277C6C}" type="datetimeFigureOut">
               <a:rPr lang="en-US" smtClean="0"/>
-              <a:t>9/27/2016</a:t>
+              <a:t>9/29/2016</a:t>
             </a:fld>
             <a:endParaRPr lang="en-US"/>
           </a:p>
@@ -2509,7 +2510,7 @@
           <a:p>
             <a:fld id="{56FF5959-4879-46D8-B814-66C710277C6C}" type="datetimeFigureOut">
               <a:rPr lang="en-US" smtClean="0"/>
-              <a:t>9/27/2016</a:t>
+              <a:t>9/29/2016</a:t>
             </a:fld>
             <a:endParaRPr lang="en-US"/>
           </a:p>
@@ -2722,7 +2723,7 @@
           <a:p>
             <a:fld id="{56FF5959-4879-46D8-B814-66C710277C6C}" type="datetimeFigureOut">
               <a:rPr lang="en-US" smtClean="0"/>
-              <a:t>9/27/2016</a:t>
+              <a:t>9/29/2016</a:t>
             </a:fld>
             <a:endParaRPr lang="en-US"/>
           </a:p>
@@ -7063,16 +7064,16 @@
       </p:graphicFrame>
       <p:grpSp>
         <p:nvGrpSpPr>
-          <p:cNvPr id="52" name="Group 51"/>
+          <p:cNvPr id="2" name="Group 1"/>
           <p:cNvGrpSpPr/>
           <p:nvPr/>
         </p:nvGrpSpPr>
         <p:grpSpPr>
           <a:xfrm>
             <a:off x="5929213" y="1131754"/>
-            <a:ext cx="2766718" cy="1870641"/>
-            <a:chOff x="3148010" y="4099559"/>
-            <a:chExt cx="3065480" cy="2072641"/>
+            <a:ext cx="1934256" cy="1870641"/>
+            <a:chOff x="5929213" y="1131754"/>
+            <a:chExt cx="1934256" cy="1870641"/>
           </a:xfrm>
         </p:grpSpPr>
         <p:grpSp>
@@ -7083,8 +7084,8 @@
           </p:nvGrpSpPr>
           <p:grpSpPr>
             <a:xfrm>
-              <a:off x="3148010" y="4099559"/>
-              <a:ext cx="2143125" cy="2072641"/>
+              <a:off x="5929213" y="1131754"/>
+              <a:ext cx="1934256" cy="1870641"/>
               <a:chOff x="3148010" y="4029075"/>
               <a:chExt cx="2143125" cy="2143126"/>
             </a:xfrm>
@@ -7168,8 +7169,8 @@
           </p:nvSpPr>
           <p:spPr>
             <a:xfrm>
-              <a:off x="3467101" y="5653088"/>
-              <a:ext cx="57150" cy="57150"/>
+              <a:off x="6217205" y="2533876"/>
+              <a:ext cx="51580" cy="51580"/>
             </a:xfrm>
             <a:prstGeom prst="ellipse">
               <a:avLst/>
@@ -7214,8 +7215,8 @@
           </p:nvSpPr>
           <p:spPr>
             <a:xfrm>
-              <a:off x="3550921" y="5805488"/>
-              <a:ext cx="57150" cy="57150"/>
+              <a:off x="6292856" y="2671423"/>
+              <a:ext cx="51580" cy="51580"/>
             </a:xfrm>
             <a:prstGeom prst="ellipse">
               <a:avLst/>
@@ -7260,12 +7261,15 @@
           </p:nvSpPr>
           <p:spPr>
             <a:xfrm>
-              <a:off x="4095751" y="5414963"/>
-              <a:ext cx="57150" cy="57150"/>
+              <a:off x="6784587" y="2318958"/>
+              <a:ext cx="51580" cy="51580"/>
             </a:xfrm>
             <a:prstGeom prst="ellipse">
               <a:avLst/>
             </a:prstGeom>
+            <a:solidFill>
+              <a:schemeClr val="accent3"/>
+            </a:solidFill>
             <a:ln>
               <a:noFill/>
             </a:ln>
@@ -7303,8 +7307,8 @@
           </p:nvSpPr>
           <p:spPr>
             <a:xfrm>
-              <a:off x="3876677" y="4371975"/>
-              <a:ext cx="57150" cy="57150"/>
+              <a:off x="6586864" y="1377620"/>
+              <a:ext cx="51580" cy="51580"/>
             </a:xfrm>
             <a:prstGeom prst="ellipse">
               <a:avLst/>
@@ -7346,8 +7350,8 @@
           </p:nvSpPr>
           <p:spPr>
             <a:xfrm>
-              <a:off x="4991911" y="4981605"/>
-              <a:ext cx="57150" cy="57150"/>
+              <a:off x="7593407" y="1927836"/>
+              <a:ext cx="51580" cy="51580"/>
             </a:xfrm>
             <a:prstGeom prst="ellipse">
               <a:avLst/>
@@ -7389,8 +7393,8 @@
           </p:nvSpPr>
           <p:spPr>
             <a:xfrm>
-              <a:off x="4419601" y="4810125"/>
-              <a:ext cx="57150" cy="57150"/>
+              <a:off x="7076875" y="1773068"/>
+              <a:ext cx="51580" cy="51580"/>
             </a:xfrm>
             <a:prstGeom prst="ellipse">
               <a:avLst/>
@@ -7432,8 +7436,8 @@
           </p:nvSpPr>
           <p:spPr>
             <a:xfrm>
-              <a:off x="3409951" y="5800726"/>
-              <a:ext cx="57150" cy="57150"/>
+              <a:off x="6165625" y="2667125"/>
+              <a:ext cx="51580" cy="51580"/>
             </a:xfrm>
             <a:prstGeom prst="ellipse">
               <a:avLst/>
@@ -7478,8 +7482,8 @@
           </p:nvSpPr>
           <p:spPr>
             <a:xfrm>
-              <a:off x="4963336" y="5940743"/>
-              <a:ext cx="57150" cy="57150"/>
+              <a:off x="7567617" y="2793496"/>
+              <a:ext cx="51580" cy="51580"/>
             </a:xfrm>
             <a:prstGeom prst="ellipse">
               <a:avLst/>
@@ -7524,8 +7528,8 @@
           </p:nvSpPr>
           <p:spPr>
             <a:xfrm>
-              <a:off x="4857751" y="5855018"/>
-              <a:ext cx="57150" cy="57150"/>
+              <a:off x="7472322" y="2716126"/>
+              <a:ext cx="51580" cy="51580"/>
             </a:xfrm>
             <a:prstGeom prst="ellipse">
               <a:avLst/>
@@ -7570,8 +7574,8 @@
           </p:nvSpPr>
           <p:spPr>
             <a:xfrm>
-              <a:off x="5020486" y="5826443"/>
-              <a:ext cx="57150" cy="57150"/>
+              <a:off x="7619197" y="2690336"/>
+              <a:ext cx="51580" cy="51580"/>
             </a:xfrm>
             <a:prstGeom prst="ellipse">
               <a:avLst/>
@@ -7616,8 +7620,8 @@
           </p:nvSpPr>
           <p:spPr>
             <a:xfrm>
-              <a:off x="4906185" y="5697856"/>
-              <a:ext cx="57150" cy="57150"/>
+              <a:off x="7516036" y="2574281"/>
+              <a:ext cx="51580" cy="51580"/>
             </a:xfrm>
             <a:prstGeom prst="ellipse">
               <a:avLst/>
@@ -7662,8 +7666,8 @@
           </p:nvSpPr>
           <p:spPr>
             <a:xfrm>
-              <a:off x="3621402" y="4914915"/>
-              <a:ext cx="57150" cy="57150"/>
+              <a:off x="6356468" y="1867645"/>
+              <a:ext cx="51580" cy="51580"/>
             </a:xfrm>
             <a:prstGeom prst="ellipse">
               <a:avLst/>
@@ -7705,8 +7709,8 @@
           </p:nvSpPr>
           <p:spPr>
             <a:xfrm>
-              <a:off x="3767139" y="5107304"/>
-              <a:ext cx="57150" cy="57150"/>
+              <a:off x="6488002" y="2041284"/>
+              <a:ext cx="51580" cy="51580"/>
             </a:xfrm>
             <a:prstGeom prst="ellipse">
               <a:avLst/>
@@ -7748,8 +7752,8 @@
           </p:nvSpPr>
           <p:spPr>
             <a:xfrm>
-              <a:off x="5138739" y="5635944"/>
-              <a:ext cx="57150" cy="57150"/>
+              <a:off x="7725925" y="2518403"/>
+              <a:ext cx="51580" cy="51580"/>
             </a:xfrm>
             <a:prstGeom prst="ellipse">
               <a:avLst/>
@@ -7794,8 +7798,8 @@
           </p:nvSpPr>
           <p:spPr>
             <a:xfrm>
-              <a:off x="4095753" y="4953000"/>
-              <a:ext cx="57150" cy="57150"/>
+              <a:off x="6784589" y="1902018"/>
+              <a:ext cx="51580" cy="51580"/>
             </a:xfrm>
             <a:prstGeom prst="ellipse">
               <a:avLst/>
@@ -7837,8 +7841,8 @@
           </p:nvSpPr>
           <p:spPr>
             <a:xfrm>
-              <a:off x="4451983" y="4495800"/>
-              <a:ext cx="57150" cy="57150"/>
+              <a:off x="7106101" y="1489377"/>
+              <a:ext cx="51580" cy="51580"/>
             </a:xfrm>
             <a:prstGeom prst="ellipse">
               <a:avLst/>
@@ -7880,8 +7884,8 @@
           </p:nvSpPr>
           <p:spPr>
             <a:xfrm>
-              <a:off x="5186365" y="5826443"/>
-              <a:ext cx="57150" cy="57150"/>
+              <a:off x="7768910" y="2690336"/>
+              <a:ext cx="51580" cy="51580"/>
             </a:xfrm>
             <a:prstGeom prst="ellipse">
               <a:avLst/>
@@ -7923,8 +7927,8 @@
           </p:nvSpPr>
           <p:spPr>
             <a:xfrm>
-              <a:off x="4451981" y="5314951"/>
-              <a:ext cx="57150" cy="57150"/>
+              <a:off x="7106099" y="2228694"/>
+              <a:ext cx="51580" cy="51580"/>
             </a:xfrm>
             <a:prstGeom prst="ellipse">
               <a:avLst/>
@@ -7966,8 +7970,8 @@
           </p:nvSpPr>
           <p:spPr>
             <a:xfrm>
-              <a:off x="3352801" y="5289235"/>
-              <a:ext cx="57150" cy="57150"/>
+              <a:off x="6114045" y="2205484"/>
+              <a:ext cx="51580" cy="51580"/>
             </a:xfrm>
             <a:prstGeom prst="ellipse">
               <a:avLst/>
@@ -8004,383 +8008,368 @@
             </a:p>
           </p:txBody>
         </p:sp>
-        <p:grpSp>
-          <p:nvGrpSpPr>
-            <p:cNvPr id="51" name="Group 50"/>
-            <p:cNvGrpSpPr/>
+      </p:grpSp>
+      <p:grpSp>
+        <p:nvGrpSpPr>
+          <p:cNvPr id="3" name="Group 2"/>
+          <p:cNvGrpSpPr/>
+          <p:nvPr/>
+        </p:nvGrpSpPr>
+        <p:grpSpPr>
+          <a:xfrm>
+            <a:off x="7308916" y="1184221"/>
+            <a:ext cx="1199440" cy="580613"/>
+            <a:chOff x="7708966" y="1279471"/>
+            <a:chExt cx="1199440" cy="580613"/>
+          </a:xfrm>
+        </p:grpSpPr>
+        <p:sp>
+          <p:nvSpPr>
+            <p:cNvPr id="39" name="Oval 38"/>
+            <p:cNvSpPr/>
             <p:nvPr/>
-          </p:nvGrpSpPr>
-          <p:grpSpPr>
+          </p:nvSpPr>
+          <p:spPr>
             <a:xfrm>
-              <a:off x="5115401" y="4307086"/>
-              <a:ext cx="1098089" cy="560189"/>
-              <a:chOff x="5608321" y="4542699"/>
-              <a:chExt cx="1098089" cy="560189"/>
+              <a:off x="7786833" y="1371904"/>
+              <a:ext cx="51580" cy="51580"/>
             </a:xfrm>
-          </p:grpSpPr>
-          <p:grpSp>
-            <p:nvGrpSpPr>
-              <p:cNvPr id="49" name="Group 48"/>
-              <p:cNvGrpSpPr/>
-              <p:nvPr/>
-            </p:nvGrpSpPr>
-            <p:grpSpPr>
-              <a:xfrm>
-                <a:off x="5696761" y="4542699"/>
-                <a:ext cx="1009649" cy="560189"/>
-                <a:chOff x="5696761" y="4542699"/>
-                <a:chExt cx="1009649" cy="560189"/>
-              </a:xfrm>
-            </p:grpSpPr>
-            <p:sp>
-              <p:nvSpPr>
-                <p:cNvPr id="39" name="Oval 38"/>
-                <p:cNvSpPr/>
-                <p:nvPr/>
-              </p:nvSpPr>
-              <p:spPr>
-                <a:xfrm>
-                  <a:off x="5696761" y="4617083"/>
-                  <a:ext cx="57150" cy="57150"/>
-                </a:xfrm>
-                <a:prstGeom prst="ellipse">
-                  <a:avLst/>
-                </a:prstGeom>
-                <a:ln>
-                  <a:noFill/>
-                </a:ln>
-              </p:spPr>
-              <p:style>
-                <a:lnRef idx="2">
-                  <a:schemeClr val="accent1">
-                    <a:shade val="50000"/>
-                  </a:schemeClr>
-                </a:lnRef>
-                <a:fillRef idx="1">
-                  <a:schemeClr val="accent1"/>
-                </a:fillRef>
-                <a:effectRef idx="0">
-                  <a:schemeClr val="accent1"/>
-                </a:effectRef>
-                <a:fontRef idx="minor">
-                  <a:schemeClr val="lt1"/>
-                </a:fontRef>
-              </p:style>
-              <p:txBody>
-                <a:bodyPr rtlCol="0" anchor="ctr"/>
-                <a:lstStyle/>
-                <a:p>
-                  <a:pPr algn="ctr"/>
-                  <a:endParaRPr lang="en-US"/>
-                </a:p>
-              </p:txBody>
-            </p:sp>
-            <p:sp>
-              <p:nvSpPr>
-                <p:cNvPr id="41" name="Oval 40"/>
-                <p:cNvSpPr/>
-                <p:nvPr/>
-              </p:nvSpPr>
-              <p:spPr>
-                <a:xfrm>
-                  <a:off x="5696762" y="4728843"/>
-                  <a:ext cx="57150" cy="57150"/>
-                </a:xfrm>
-                <a:prstGeom prst="ellipse">
-                  <a:avLst/>
-                </a:prstGeom>
-                <a:solidFill>
-                  <a:schemeClr val="accent6"/>
-                </a:solidFill>
-                <a:ln>
-                  <a:noFill/>
-                </a:ln>
-              </p:spPr>
-              <p:style>
-                <a:lnRef idx="2">
-                  <a:schemeClr val="accent1">
-                    <a:shade val="50000"/>
-                  </a:schemeClr>
-                </a:lnRef>
-                <a:fillRef idx="1">
-                  <a:schemeClr val="accent1"/>
-                </a:fillRef>
-                <a:effectRef idx="0">
-                  <a:schemeClr val="accent1"/>
-                </a:effectRef>
-                <a:fontRef idx="minor">
-                  <a:schemeClr val="lt1"/>
-                </a:fontRef>
-              </p:style>
-              <p:txBody>
-                <a:bodyPr rtlCol="0" anchor="ctr"/>
-                <a:lstStyle/>
-                <a:p>
-                  <a:pPr algn="ctr"/>
-                  <a:endParaRPr lang="en-US"/>
-                </a:p>
-              </p:txBody>
-            </p:sp>
-            <p:sp>
-              <p:nvSpPr>
-                <p:cNvPr id="42" name="Oval 41"/>
-                <p:cNvSpPr/>
-                <p:nvPr/>
-              </p:nvSpPr>
-              <p:spPr>
-                <a:xfrm>
-                  <a:off x="5696762" y="4848223"/>
-                  <a:ext cx="57150" cy="57150"/>
-                </a:xfrm>
-                <a:prstGeom prst="ellipse">
-                  <a:avLst/>
-                </a:prstGeom>
-                <a:solidFill>
-                  <a:schemeClr val="accent3"/>
-                </a:solidFill>
-                <a:ln>
-                  <a:noFill/>
-                </a:ln>
-              </p:spPr>
-              <p:style>
-                <a:lnRef idx="2">
-                  <a:schemeClr val="accent1">
-                    <a:shade val="50000"/>
-                  </a:schemeClr>
-                </a:lnRef>
-                <a:fillRef idx="1">
-                  <a:schemeClr val="accent1"/>
-                </a:fillRef>
-                <a:effectRef idx="0">
-                  <a:schemeClr val="accent1"/>
-                </a:effectRef>
-                <a:fontRef idx="minor">
-                  <a:schemeClr val="lt1"/>
-                </a:fontRef>
-              </p:style>
-              <p:txBody>
-                <a:bodyPr rtlCol="0" anchor="ctr"/>
-                <a:lstStyle/>
-                <a:p>
-                  <a:pPr algn="ctr"/>
-                  <a:endParaRPr lang="en-US"/>
-                </a:p>
-              </p:txBody>
-            </p:sp>
-            <p:sp>
-              <p:nvSpPr>
-                <p:cNvPr id="43" name="Oval 42"/>
-                <p:cNvSpPr/>
-                <p:nvPr/>
-              </p:nvSpPr>
-              <p:spPr>
-                <a:xfrm>
-                  <a:off x="5701525" y="4967603"/>
-                  <a:ext cx="57150" cy="57150"/>
-                </a:xfrm>
-                <a:prstGeom prst="ellipse">
-                  <a:avLst/>
-                </a:prstGeom>
-                <a:solidFill>
-                  <a:schemeClr val="accent2"/>
-                </a:solidFill>
-                <a:ln>
-                  <a:noFill/>
-                </a:ln>
-              </p:spPr>
-              <p:style>
-                <a:lnRef idx="2">
-                  <a:schemeClr val="accent1">
-                    <a:shade val="50000"/>
-                  </a:schemeClr>
-                </a:lnRef>
-                <a:fillRef idx="1">
-                  <a:schemeClr val="accent1"/>
-                </a:fillRef>
-                <a:effectRef idx="0">
-                  <a:schemeClr val="accent1"/>
-                </a:effectRef>
-                <a:fontRef idx="minor">
-                  <a:schemeClr val="lt1"/>
-                </a:fontRef>
-              </p:style>
-              <p:txBody>
-                <a:bodyPr rtlCol="0" anchor="ctr"/>
-                <a:lstStyle/>
-                <a:p>
-                  <a:pPr algn="ctr"/>
-                  <a:endParaRPr lang="en-US"/>
-                </a:p>
-              </p:txBody>
-            </p:sp>
-            <p:sp>
-              <p:nvSpPr>
-                <p:cNvPr id="44" name="TextBox 43"/>
-                <p:cNvSpPr txBox="1"/>
-                <p:nvPr/>
-              </p:nvSpPr>
-              <p:spPr>
-                <a:xfrm>
-                  <a:off x="5720571" y="4542699"/>
-                  <a:ext cx="985839" cy="200055"/>
-                </a:xfrm>
-                <a:prstGeom prst="rect">
-                  <a:avLst/>
-                </a:prstGeom>
-                <a:noFill/>
-              </p:spPr>
-              <p:txBody>
-                <a:bodyPr wrap="square" rtlCol="0">
-                  <a:spAutoFit/>
-                </a:bodyPr>
-                <a:lstStyle/>
-                <a:p>
-                  <a:r>
-                    <a:rPr lang="en-US" sz="700" dirty="0" smtClean="0"/>
-                    <a:t>Obesity</a:t>
-                  </a:r>
-                  <a:endParaRPr lang="en-US" sz="900" dirty="0"/>
-                </a:p>
-              </p:txBody>
-            </p:sp>
-            <p:sp>
-              <p:nvSpPr>
-                <p:cNvPr id="45" name="TextBox 44"/>
-                <p:cNvSpPr txBox="1"/>
-                <p:nvPr/>
-              </p:nvSpPr>
-              <p:spPr>
-                <a:xfrm>
-                  <a:off x="5720571" y="4660204"/>
-                  <a:ext cx="985839" cy="200055"/>
-                </a:xfrm>
-                <a:prstGeom prst="rect">
-                  <a:avLst/>
-                </a:prstGeom>
-                <a:noFill/>
-              </p:spPr>
-              <p:txBody>
-                <a:bodyPr wrap="square" rtlCol="0">
-                  <a:spAutoFit/>
-                </a:bodyPr>
-                <a:lstStyle/>
-                <a:p>
-                  <a:r>
-                    <a:rPr lang="en-US" sz="700" dirty="0" smtClean="0"/>
-                    <a:t>IBD</a:t>
-                  </a:r>
-                  <a:endParaRPr lang="en-US" sz="900" dirty="0"/>
-                </a:p>
-              </p:txBody>
-            </p:sp>
-            <p:sp>
-              <p:nvSpPr>
-                <p:cNvPr id="46" name="TextBox 45"/>
-                <p:cNvSpPr txBox="1"/>
-                <p:nvPr/>
-              </p:nvSpPr>
-              <p:spPr>
-                <a:xfrm>
-                  <a:off x="5720571" y="4777709"/>
-                  <a:ext cx="985839" cy="200055"/>
-                </a:xfrm>
-                <a:prstGeom prst="rect">
-                  <a:avLst/>
-                </a:prstGeom>
-                <a:noFill/>
-              </p:spPr>
-              <p:txBody>
-                <a:bodyPr wrap="square" rtlCol="0">
-                  <a:spAutoFit/>
-                </a:bodyPr>
-                <a:lstStyle/>
-                <a:p>
-                  <a:r>
-                    <a:rPr lang="en-US" sz="700" dirty="0" smtClean="0"/>
-                    <a:t>Autism</a:t>
-                  </a:r>
-                  <a:endParaRPr lang="en-US" sz="900" dirty="0"/>
-                </a:p>
-              </p:txBody>
-            </p:sp>
-            <p:sp>
-              <p:nvSpPr>
-                <p:cNvPr id="47" name="TextBox 46"/>
-                <p:cNvSpPr txBox="1"/>
-                <p:nvPr/>
-              </p:nvSpPr>
-              <p:spPr>
-                <a:xfrm>
-                  <a:off x="5720571" y="4902833"/>
-                  <a:ext cx="985839" cy="200055"/>
-                </a:xfrm>
-                <a:prstGeom prst="rect">
-                  <a:avLst/>
-                </a:prstGeom>
-                <a:noFill/>
-              </p:spPr>
-              <p:txBody>
-                <a:bodyPr wrap="square" rtlCol="0">
-                  <a:spAutoFit/>
-                </a:bodyPr>
-                <a:lstStyle/>
-                <a:p>
-                  <a:r>
-                    <a:rPr lang="en-US" sz="700" dirty="0" smtClean="0"/>
-                    <a:t>Colorectal cancer</a:t>
-                  </a:r>
-                  <a:endParaRPr lang="en-US" sz="900" dirty="0"/>
-                </a:p>
-              </p:txBody>
-            </p:sp>
-          </p:grpSp>
-          <p:sp>
-            <p:nvSpPr>
-              <p:cNvPr id="50" name="Rectangle 49"/>
-              <p:cNvSpPr/>
-              <p:nvPr/>
-            </p:nvSpPr>
-            <p:spPr>
-              <a:xfrm>
-                <a:off x="5608321" y="4552950"/>
-                <a:ext cx="944880" cy="549938"/>
-              </a:xfrm>
-              <a:prstGeom prst="rect">
-                <a:avLst/>
-              </a:prstGeom>
+            <a:prstGeom prst="ellipse">
+              <a:avLst/>
+            </a:prstGeom>
+            <a:ln>
               <a:noFill/>
-              <a:ln w="3175">
-                <a:solidFill>
-                  <a:schemeClr val="tx1"/>
-                </a:solidFill>
-              </a:ln>
-            </p:spPr>
-            <p:style>
-              <a:lnRef idx="2">
-                <a:schemeClr val="accent1">
-                  <a:shade val="50000"/>
-                </a:schemeClr>
-              </a:lnRef>
-              <a:fillRef idx="1">
-                <a:schemeClr val="accent1"/>
-              </a:fillRef>
-              <a:effectRef idx="0">
-                <a:schemeClr val="accent1"/>
-              </a:effectRef>
-              <a:fontRef idx="minor">
-                <a:schemeClr val="lt1"/>
-              </a:fontRef>
-            </p:style>
-            <p:txBody>
-              <a:bodyPr rtlCol="0" anchor="ctr"/>
-              <a:lstStyle/>
-              <a:p>
-                <a:pPr algn="ctr"/>
-                <a:endParaRPr lang="en-US"/>
-              </a:p>
-            </p:txBody>
-          </p:sp>
-        </p:grpSp>
+            </a:ln>
+          </p:spPr>
+          <p:style>
+            <a:lnRef idx="2">
+              <a:schemeClr val="accent1">
+                <a:shade val="50000"/>
+              </a:schemeClr>
+            </a:lnRef>
+            <a:fillRef idx="1">
+              <a:schemeClr val="accent1"/>
+            </a:fillRef>
+            <a:effectRef idx="0">
+              <a:schemeClr val="accent1"/>
+            </a:effectRef>
+            <a:fontRef idx="minor">
+              <a:schemeClr val="lt1"/>
+            </a:fontRef>
+          </p:style>
+          <p:txBody>
+            <a:bodyPr rtlCol="0" anchor="ctr"/>
+            <a:lstStyle/>
+            <a:p>
+              <a:pPr algn="ctr"/>
+              <a:endParaRPr lang="en-US"/>
+            </a:p>
+          </p:txBody>
+        </p:sp>
+        <p:sp>
+          <p:nvSpPr>
+            <p:cNvPr id="41" name="Oval 40"/>
+            <p:cNvSpPr/>
+            <p:nvPr/>
+          </p:nvSpPr>
+          <p:spPr>
+            <a:xfrm>
+              <a:off x="7786833" y="1490055"/>
+              <a:ext cx="51580" cy="51580"/>
+            </a:xfrm>
+            <a:prstGeom prst="ellipse">
+              <a:avLst/>
+            </a:prstGeom>
+            <a:solidFill>
+              <a:schemeClr val="accent6"/>
+            </a:solidFill>
+            <a:ln>
+              <a:noFill/>
+            </a:ln>
+          </p:spPr>
+          <p:style>
+            <a:lnRef idx="2">
+              <a:schemeClr val="accent1">
+                <a:shade val="50000"/>
+              </a:schemeClr>
+            </a:lnRef>
+            <a:fillRef idx="1">
+              <a:schemeClr val="accent1"/>
+            </a:fillRef>
+            <a:effectRef idx="0">
+              <a:schemeClr val="accent1"/>
+            </a:effectRef>
+            <a:fontRef idx="minor">
+              <a:schemeClr val="lt1"/>
+            </a:fontRef>
+          </p:style>
+          <p:txBody>
+            <a:bodyPr rtlCol="0" anchor="ctr"/>
+            <a:lstStyle/>
+            <a:p>
+              <a:pPr algn="ctr"/>
+              <a:endParaRPr lang="en-US"/>
+            </a:p>
+          </p:txBody>
+        </p:sp>
+        <p:sp>
+          <p:nvSpPr>
+            <p:cNvPr id="42" name="Oval 41"/>
+            <p:cNvSpPr/>
+            <p:nvPr/>
+          </p:nvSpPr>
+          <p:spPr>
+            <a:xfrm>
+              <a:off x="7786833" y="1608206"/>
+              <a:ext cx="51580" cy="51580"/>
+            </a:xfrm>
+            <a:prstGeom prst="ellipse">
+              <a:avLst/>
+            </a:prstGeom>
+            <a:solidFill>
+              <a:schemeClr val="accent3"/>
+            </a:solidFill>
+            <a:ln>
+              <a:noFill/>
+            </a:ln>
+          </p:spPr>
+          <p:style>
+            <a:lnRef idx="2">
+              <a:schemeClr val="accent1">
+                <a:shade val="50000"/>
+              </a:schemeClr>
+            </a:lnRef>
+            <a:fillRef idx="1">
+              <a:schemeClr val="accent1"/>
+            </a:fillRef>
+            <a:effectRef idx="0">
+              <a:schemeClr val="accent1"/>
+            </a:effectRef>
+            <a:fontRef idx="minor">
+              <a:schemeClr val="lt1"/>
+            </a:fontRef>
+          </p:style>
+          <p:txBody>
+            <a:bodyPr rtlCol="0" anchor="ctr"/>
+            <a:lstStyle/>
+            <a:p>
+              <a:pPr algn="ctr"/>
+              <a:endParaRPr lang="en-US"/>
+            </a:p>
+          </p:txBody>
+        </p:sp>
+        <p:sp>
+          <p:nvSpPr>
+            <p:cNvPr id="43" name="Oval 42"/>
+            <p:cNvSpPr/>
+            <p:nvPr/>
+          </p:nvSpPr>
+          <p:spPr>
+            <a:xfrm>
+              <a:off x="7786833" y="1726358"/>
+              <a:ext cx="51580" cy="51580"/>
+            </a:xfrm>
+            <a:prstGeom prst="ellipse">
+              <a:avLst/>
+            </a:prstGeom>
+            <a:solidFill>
+              <a:schemeClr val="accent2"/>
+            </a:solidFill>
+            <a:ln>
+              <a:noFill/>
+            </a:ln>
+          </p:spPr>
+          <p:style>
+            <a:lnRef idx="2">
+              <a:schemeClr val="accent1">
+                <a:shade val="50000"/>
+              </a:schemeClr>
+            </a:lnRef>
+            <a:fillRef idx="1">
+              <a:schemeClr val="accent1"/>
+            </a:fillRef>
+            <a:effectRef idx="0">
+              <a:schemeClr val="accent1"/>
+            </a:effectRef>
+            <a:fontRef idx="minor">
+              <a:schemeClr val="lt1"/>
+            </a:fontRef>
+          </p:style>
+          <p:txBody>
+            <a:bodyPr rtlCol="0" anchor="ctr"/>
+            <a:lstStyle/>
+            <a:p>
+              <a:pPr algn="ctr"/>
+              <a:endParaRPr lang="en-US"/>
+            </a:p>
+          </p:txBody>
+        </p:sp>
+        <p:sp>
+          <p:nvSpPr>
+            <p:cNvPr id="44" name="TextBox 43"/>
+            <p:cNvSpPr txBox="1"/>
+            <p:nvPr/>
+          </p:nvSpPr>
+          <p:spPr>
+            <a:xfrm>
+              <a:off x="7831797" y="1279471"/>
+              <a:ext cx="1076609" cy="143331"/>
+            </a:xfrm>
+            <a:prstGeom prst="rect">
+              <a:avLst/>
+            </a:prstGeom>
+            <a:noFill/>
+          </p:spPr>
+          <p:txBody>
+            <a:bodyPr wrap="square" rtlCol="0">
+              <a:spAutoFit/>
+            </a:bodyPr>
+            <a:lstStyle/>
+            <a:p>
+              <a:r>
+                <a:rPr lang="en-US" sz="900" dirty="0" smtClean="0"/>
+                <a:t>Obesity</a:t>
+              </a:r>
+              <a:endParaRPr lang="en-US" sz="1050" dirty="0"/>
+            </a:p>
+          </p:txBody>
+        </p:sp>
+        <p:sp>
+          <p:nvSpPr>
+            <p:cNvPr id="45" name="TextBox 44"/>
+            <p:cNvSpPr txBox="1"/>
+            <p:nvPr/>
+          </p:nvSpPr>
+          <p:spPr>
+            <a:xfrm>
+              <a:off x="7831797" y="1396567"/>
+              <a:ext cx="1076609" cy="143331"/>
+            </a:xfrm>
+            <a:prstGeom prst="rect">
+              <a:avLst/>
+            </a:prstGeom>
+            <a:noFill/>
+          </p:spPr>
+          <p:txBody>
+            <a:bodyPr wrap="square" rtlCol="0">
+              <a:spAutoFit/>
+            </a:bodyPr>
+            <a:lstStyle/>
+            <a:p>
+              <a:r>
+                <a:rPr lang="en-US" sz="900" dirty="0" smtClean="0"/>
+                <a:t>IBD</a:t>
+              </a:r>
+              <a:endParaRPr lang="en-US" sz="1050" dirty="0"/>
+            </a:p>
+          </p:txBody>
+        </p:sp>
+        <p:sp>
+          <p:nvSpPr>
+            <p:cNvPr id="46" name="TextBox 45"/>
+            <p:cNvSpPr txBox="1"/>
+            <p:nvPr/>
+          </p:nvSpPr>
+          <p:spPr>
+            <a:xfrm>
+              <a:off x="7831797" y="1513663"/>
+              <a:ext cx="1076609" cy="143331"/>
+            </a:xfrm>
+            <a:prstGeom prst="rect">
+              <a:avLst/>
+            </a:prstGeom>
+            <a:noFill/>
+          </p:spPr>
+          <p:txBody>
+            <a:bodyPr wrap="square" rtlCol="0">
+              <a:spAutoFit/>
+            </a:bodyPr>
+            <a:lstStyle/>
+            <a:p>
+              <a:r>
+                <a:rPr lang="en-US" sz="900" dirty="0" smtClean="0"/>
+                <a:t>Autism</a:t>
+              </a:r>
+              <a:endParaRPr lang="en-US" sz="1050" dirty="0"/>
+            </a:p>
+          </p:txBody>
+        </p:sp>
+        <p:sp>
+          <p:nvSpPr>
+            <p:cNvPr id="47" name="TextBox 46"/>
+            <p:cNvSpPr txBox="1"/>
+            <p:nvPr/>
+          </p:nvSpPr>
+          <p:spPr>
+            <a:xfrm>
+              <a:off x="7831797" y="1630758"/>
+              <a:ext cx="1076609" cy="229326"/>
+            </a:xfrm>
+            <a:prstGeom prst="rect">
+              <a:avLst/>
+            </a:prstGeom>
+            <a:noFill/>
+          </p:spPr>
+          <p:txBody>
+            <a:bodyPr wrap="square" rtlCol="0">
+              <a:spAutoFit/>
+            </a:bodyPr>
+            <a:lstStyle/>
+            <a:p>
+              <a:r>
+                <a:rPr lang="en-US" sz="900" dirty="0" smtClean="0"/>
+                <a:t>Colorectal cancer</a:t>
+              </a:r>
+              <a:endParaRPr lang="en-US" sz="1050" dirty="0"/>
+            </a:p>
+          </p:txBody>
+        </p:sp>
+        <p:sp>
+          <p:nvSpPr>
+            <p:cNvPr id="50" name="Rectangle 49"/>
+            <p:cNvSpPr/>
+            <p:nvPr/>
+          </p:nvSpPr>
+          <p:spPr>
+            <a:xfrm>
+              <a:off x="7708966" y="1303490"/>
+              <a:ext cx="1135066" cy="545975"/>
+            </a:xfrm>
+            <a:prstGeom prst="rect">
+              <a:avLst/>
+            </a:prstGeom>
+            <a:noFill/>
+            <a:ln w="3175">
+              <a:solidFill>
+                <a:schemeClr val="tx1"/>
+              </a:solidFill>
+            </a:ln>
+          </p:spPr>
+          <p:style>
+            <a:lnRef idx="2">
+              <a:schemeClr val="accent1">
+                <a:shade val="50000"/>
+              </a:schemeClr>
+            </a:lnRef>
+            <a:fillRef idx="1">
+              <a:schemeClr val="accent1"/>
+            </a:fillRef>
+            <a:effectRef idx="0">
+              <a:schemeClr val="accent1"/>
+            </a:effectRef>
+            <a:fontRef idx="minor">
+              <a:schemeClr val="lt1"/>
+            </a:fontRef>
+          </p:style>
+          <p:txBody>
+            <a:bodyPr rtlCol="0" anchor="ctr"/>
+            <a:lstStyle/>
+            <a:p>
+              <a:pPr algn="ctr"/>
+              <a:endParaRPr lang="en-US"/>
+            </a:p>
+          </p:txBody>
+        </p:sp>
       </p:grpSp>
       <p:sp>
         <p:nvSpPr>
@@ -8520,6 +8509,1702 @@
     <p:extLst>
       <p:ext uri="{BB962C8B-B14F-4D97-AF65-F5344CB8AC3E}">
         <p14:creationId xmlns:p14="http://schemas.microsoft.com/office/powerpoint/2010/main" val="2896245276"/>
+      </p:ext>
+    </p:extLst>
+  </p:cSld>
+  <p:clrMapOvr>
+    <a:masterClrMapping/>
+  </p:clrMapOvr>
+</p:sld>
+</file>
+
+<file path=ppt/slides/slide4.xml><?xml version="1.0" encoding="utf-8"?>
+<p:sld xmlns:a="http://schemas.openxmlformats.org/drawingml/2006/main" xmlns:r="http://schemas.openxmlformats.org/officeDocument/2006/relationships" xmlns:p="http://schemas.openxmlformats.org/presentationml/2006/main">
+  <p:cSld>
+    <p:spTree>
+      <p:nvGrpSpPr>
+        <p:cNvPr id="1" name=""/>
+        <p:cNvGrpSpPr/>
+        <p:nvPr/>
+      </p:nvGrpSpPr>
+      <p:grpSpPr>
+        <a:xfrm>
+          <a:off x="0" y="0"/>
+          <a:ext cx="0" cy="0"/>
+          <a:chOff x="0" y="0"/>
+          <a:chExt cx="0" cy="0"/>
+        </a:xfrm>
+      </p:grpSpPr>
+      <p:grpSp>
+        <p:nvGrpSpPr>
+          <p:cNvPr id="64" name="Group 63"/>
+          <p:cNvGrpSpPr/>
+          <p:nvPr/>
+        </p:nvGrpSpPr>
+        <p:grpSpPr>
+          <a:xfrm>
+            <a:off x="-1609943" y="1107129"/>
+            <a:ext cx="10677224" cy="5621902"/>
+            <a:chOff x="-1609943" y="1107129"/>
+            <a:chExt cx="10677224" cy="5621902"/>
+          </a:xfrm>
+        </p:grpSpPr>
+        <p:grpSp>
+          <p:nvGrpSpPr>
+            <p:cNvPr id="61" name="Group 60"/>
+            <p:cNvGrpSpPr/>
+            <p:nvPr/>
+          </p:nvGrpSpPr>
+          <p:grpSpPr>
+            <a:xfrm>
+              <a:off x="609750" y="1107129"/>
+              <a:ext cx="8457531" cy="783156"/>
+              <a:chOff x="609750" y="1107129"/>
+              <a:chExt cx="8457531" cy="783156"/>
+            </a:xfrm>
+          </p:grpSpPr>
+          <p:sp>
+            <p:nvSpPr>
+              <p:cNvPr id="4" name="Rounded Rectangle 3"/>
+              <p:cNvSpPr/>
+              <p:nvPr/>
+            </p:nvSpPr>
+            <p:spPr>
+              <a:xfrm>
+                <a:off x="609750" y="1107129"/>
+                <a:ext cx="1952831" cy="783156"/>
+              </a:xfrm>
+              <a:prstGeom prst="roundRect">
+                <a:avLst/>
+              </a:prstGeom>
+            </p:spPr>
+            <p:style>
+              <a:lnRef idx="2">
+                <a:schemeClr val="dk1"/>
+              </a:lnRef>
+              <a:fillRef idx="1">
+                <a:schemeClr val="lt1"/>
+              </a:fillRef>
+              <a:effectRef idx="0">
+                <a:schemeClr val="dk1"/>
+              </a:effectRef>
+              <a:fontRef idx="minor">
+                <a:schemeClr val="dk1"/>
+              </a:fontRef>
+            </p:style>
+            <p:txBody>
+              <a:bodyPr rtlCol="0" anchor="ctr"/>
+              <a:lstStyle/>
+              <a:p>
+                <a:pPr algn="ctr"/>
+                <a:r>
+                  <a:rPr lang="en-US" dirty="0" smtClean="0"/>
+                  <a:t>Literature Search</a:t>
+                </a:r>
+                <a:endParaRPr lang="en-US" dirty="0"/>
+              </a:p>
+            </p:txBody>
+          </p:sp>
+          <p:sp>
+            <p:nvSpPr>
+              <p:cNvPr id="5" name="Rounded Rectangle 4"/>
+              <p:cNvSpPr/>
+              <p:nvPr/>
+            </p:nvSpPr>
+            <p:spPr>
+              <a:xfrm>
+                <a:off x="2679090" y="1107129"/>
+                <a:ext cx="1952831" cy="783156"/>
+              </a:xfrm>
+              <a:prstGeom prst="roundRect">
+                <a:avLst/>
+              </a:prstGeom>
+            </p:spPr>
+            <p:style>
+              <a:lnRef idx="2">
+                <a:schemeClr val="dk1"/>
+              </a:lnRef>
+              <a:fillRef idx="1">
+                <a:schemeClr val="lt1"/>
+              </a:fillRef>
+              <a:effectRef idx="0">
+                <a:schemeClr val="dk1"/>
+              </a:effectRef>
+              <a:fontRef idx="minor">
+                <a:schemeClr val="dk1"/>
+              </a:fontRef>
+            </p:style>
+            <p:txBody>
+              <a:bodyPr rtlCol="0" anchor="ctr"/>
+              <a:lstStyle/>
+              <a:p>
+                <a:pPr algn="ctr"/>
+                <a:r>
+                  <a:rPr lang="en-US" dirty="0" smtClean="0"/>
+                  <a:t>Existing Databases</a:t>
+                </a:r>
+                <a:endParaRPr lang="en-US" dirty="0"/>
+              </a:p>
+            </p:txBody>
+          </p:sp>
+          <p:sp>
+            <p:nvSpPr>
+              <p:cNvPr id="6" name="Rounded Rectangle 5"/>
+              <p:cNvSpPr/>
+              <p:nvPr/>
+            </p:nvSpPr>
+            <p:spPr>
+              <a:xfrm>
+                <a:off x="4811752" y="1107129"/>
+                <a:ext cx="2080267" cy="783156"/>
+              </a:xfrm>
+              <a:prstGeom prst="roundRect">
+                <a:avLst/>
+              </a:prstGeom>
+            </p:spPr>
+            <p:style>
+              <a:lnRef idx="2">
+                <a:schemeClr val="dk1"/>
+              </a:lnRef>
+              <a:fillRef idx="1">
+                <a:schemeClr val="lt1"/>
+              </a:fillRef>
+              <a:effectRef idx="0">
+                <a:schemeClr val="dk1"/>
+              </a:effectRef>
+              <a:fontRef idx="minor">
+                <a:schemeClr val="dk1"/>
+              </a:fontRef>
+            </p:style>
+            <p:txBody>
+              <a:bodyPr rtlCol="0" anchor="ctr"/>
+              <a:lstStyle/>
+              <a:p>
+                <a:pPr algn="ctr"/>
+                <a:r>
+                  <a:rPr lang="en-US" dirty="0" smtClean="0"/>
+                  <a:t>Supervised Learning</a:t>
+                </a:r>
+                <a:endParaRPr lang="en-US" dirty="0"/>
+              </a:p>
+            </p:txBody>
+          </p:sp>
+          <p:sp>
+            <p:nvSpPr>
+              <p:cNvPr id="7" name="Rounded Rectangle 6"/>
+              <p:cNvSpPr/>
+              <p:nvPr/>
+            </p:nvSpPr>
+            <p:spPr>
+              <a:xfrm>
+                <a:off x="6995886" y="1107129"/>
+                <a:ext cx="2071395" cy="783156"/>
+              </a:xfrm>
+              <a:prstGeom prst="roundRect">
+                <a:avLst/>
+              </a:prstGeom>
+            </p:spPr>
+            <p:style>
+              <a:lnRef idx="2">
+                <a:schemeClr val="dk1"/>
+              </a:lnRef>
+              <a:fillRef idx="1">
+                <a:schemeClr val="lt1"/>
+              </a:fillRef>
+              <a:effectRef idx="0">
+                <a:schemeClr val="dk1"/>
+              </a:effectRef>
+              <a:fontRef idx="minor">
+                <a:schemeClr val="dk1"/>
+              </a:fontRef>
+            </p:style>
+            <p:txBody>
+              <a:bodyPr rtlCol="0" anchor="ctr"/>
+              <a:lstStyle/>
+              <a:p>
+                <a:pPr algn="ctr"/>
+                <a:r>
+                  <a:rPr lang="en-US" dirty="0" smtClean="0"/>
+                  <a:t>Unsupervised Learning</a:t>
+                </a:r>
+                <a:endParaRPr lang="en-US" dirty="0"/>
+              </a:p>
+            </p:txBody>
+          </p:sp>
+        </p:grpSp>
+        <p:grpSp>
+          <p:nvGrpSpPr>
+            <p:cNvPr id="59" name="Group 58"/>
+            <p:cNvGrpSpPr/>
+            <p:nvPr/>
+          </p:nvGrpSpPr>
+          <p:grpSpPr>
+            <a:xfrm>
+              <a:off x="609750" y="2363014"/>
+              <a:ext cx="8457531" cy="947619"/>
+              <a:chOff x="609750" y="2377449"/>
+              <a:chExt cx="8457531" cy="947619"/>
+            </a:xfrm>
+          </p:grpSpPr>
+          <p:grpSp>
+            <p:nvGrpSpPr>
+              <p:cNvPr id="57" name="Group 56"/>
+              <p:cNvGrpSpPr/>
+              <p:nvPr/>
+            </p:nvGrpSpPr>
+            <p:grpSpPr>
+              <a:xfrm>
+                <a:off x="609750" y="2377449"/>
+                <a:ext cx="4022170" cy="947619"/>
+                <a:chOff x="609750" y="2377449"/>
+                <a:chExt cx="4022170" cy="947619"/>
+              </a:xfrm>
+            </p:grpSpPr>
+            <p:sp>
+              <p:nvSpPr>
+                <p:cNvPr id="12" name="Rounded Rectangle 11"/>
+                <p:cNvSpPr/>
+                <p:nvPr/>
+              </p:nvSpPr>
+              <p:spPr>
+                <a:xfrm>
+                  <a:off x="609750" y="2377449"/>
+                  <a:ext cx="1952831" cy="947619"/>
+                </a:xfrm>
+                <a:prstGeom prst="roundRect">
+                  <a:avLst/>
+                </a:prstGeom>
+              </p:spPr>
+              <p:style>
+                <a:lnRef idx="2">
+                  <a:schemeClr val="dk1"/>
+                </a:lnRef>
+                <a:fillRef idx="1">
+                  <a:schemeClr val="lt1"/>
+                </a:fillRef>
+                <a:effectRef idx="0">
+                  <a:schemeClr val="dk1"/>
+                </a:effectRef>
+                <a:fontRef idx="minor">
+                  <a:schemeClr val="dk1"/>
+                </a:fontRef>
+              </p:style>
+              <p:txBody>
+                <a:bodyPr lIns="0" rIns="0" rtlCol="0" anchor="ctr"/>
+                <a:lstStyle/>
+                <a:p>
+                  <a:pPr algn="ctr"/>
+                  <a:r>
+                    <a:rPr lang="en-US" dirty="0" smtClean="0"/>
+                    <a:t>Review articles</a:t>
+                  </a:r>
+                </a:p>
+                <a:p>
+                  <a:pPr algn="ctr"/>
+                  <a:r>
+                    <a:rPr lang="en-US" dirty="0" smtClean="0"/>
+                    <a:t>Text mining</a:t>
+                  </a:r>
+                  <a:endParaRPr lang="en-US" dirty="0"/>
+                </a:p>
+              </p:txBody>
+            </p:sp>
+            <p:sp>
+              <p:nvSpPr>
+                <p:cNvPr id="13" name="Rounded Rectangle 12"/>
+                <p:cNvSpPr/>
+                <p:nvPr/>
+              </p:nvSpPr>
+              <p:spPr>
+                <a:xfrm>
+                  <a:off x="2679089" y="2377449"/>
+                  <a:ext cx="1952831" cy="947619"/>
+                </a:xfrm>
+                <a:prstGeom prst="roundRect">
+                  <a:avLst/>
+                </a:prstGeom>
+              </p:spPr>
+              <p:style>
+                <a:lnRef idx="2">
+                  <a:schemeClr val="dk1"/>
+                </a:lnRef>
+                <a:fillRef idx="1">
+                  <a:schemeClr val="lt1"/>
+                </a:fillRef>
+                <a:effectRef idx="0">
+                  <a:schemeClr val="dk1"/>
+                </a:effectRef>
+                <a:fontRef idx="minor">
+                  <a:schemeClr val="dk1"/>
+                </a:fontRef>
+              </p:style>
+              <p:txBody>
+                <a:bodyPr lIns="0" rIns="0" rtlCol="0" anchor="ctr"/>
+                <a:lstStyle/>
+                <a:p>
+                  <a:pPr algn="ctr"/>
+                  <a:r>
+                    <a:rPr lang="en-US" dirty="0" err="1" smtClean="0"/>
+                    <a:t>ImG</a:t>
+                  </a:r>
+                  <a:endParaRPr lang="en-US" dirty="0" smtClean="0"/>
+                </a:p>
+                <a:p>
+                  <a:pPr algn="ctr"/>
+                  <a:r>
+                    <a:rPr lang="en-US" dirty="0" smtClean="0"/>
+                    <a:t>IMNGS</a:t>
+                  </a:r>
+                </a:p>
+                <a:p>
+                  <a:pPr algn="ctr"/>
+                  <a:r>
+                    <a:rPr lang="en-US" dirty="0" smtClean="0"/>
+                    <a:t>FAPROTAX</a:t>
+                  </a:r>
+                  <a:endParaRPr lang="en-US" dirty="0"/>
+                </a:p>
+              </p:txBody>
+            </p:sp>
+          </p:grpSp>
+          <p:grpSp>
+            <p:nvGrpSpPr>
+              <p:cNvPr id="58" name="Group 57"/>
+              <p:cNvGrpSpPr/>
+              <p:nvPr/>
+            </p:nvGrpSpPr>
+            <p:grpSpPr>
+              <a:xfrm>
+                <a:off x="4811752" y="2377449"/>
+                <a:ext cx="4255529" cy="947619"/>
+                <a:chOff x="4811752" y="2377449"/>
+                <a:chExt cx="4255529" cy="947619"/>
+              </a:xfrm>
+            </p:grpSpPr>
+            <p:sp>
+              <p:nvSpPr>
+                <p:cNvPr id="14" name="Rounded Rectangle 13"/>
+                <p:cNvSpPr/>
+                <p:nvPr/>
+              </p:nvSpPr>
+              <p:spPr>
+                <a:xfrm>
+                  <a:off x="4811752" y="2377449"/>
+                  <a:ext cx="2080266" cy="947619"/>
+                </a:xfrm>
+                <a:prstGeom prst="roundRect">
+                  <a:avLst/>
+                </a:prstGeom>
+              </p:spPr>
+              <p:style>
+                <a:lnRef idx="2">
+                  <a:schemeClr val="dk1"/>
+                </a:lnRef>
+                <a:fillRef idx="1">
+                  <a:schemeClr val="lt1"/>
+                </a:fillRef>
+                <a:effectRef idx="0">
+                  <a:schemeClr val="dk1"/>
+                </a:effectRef>
+                <a:fontRef idx="minor">
+                  <a:schemeClr val="dk1"/>
+                </a:fontRef>
+              </p:style>
+              <p:txBody>
+                <a:bodyPr lIns="0" rIns="0" rtlCol="0" anchor="ctr"/>
+                <a:lstStyle/>
+                <a:p>
+                  <a:pPr algn="ctr"/>
+                  <a:r>
+                    <a:rPr lang="en-US" dirty="0" smtClean="0"/>
+                    <a:t>Aim 2 datasets</a:t>
+                  </a:r>
+                </a:p>
+                <a:p>
+                  <a:pPr algn="ctr"/>
+                  <a:r>
+                    <a:rPr lang="en-US" dirty="0" smtClean="0"/>
+                    <a:t>Earth Microbiome Project</a:t>
+                  </a:r>
+                  <a:endParaRPr lang="en-US" dirty="0"/>
+                </a:p>
+              </p:txBody>
+            </p:sp>
+            <p:sp>
+              <p:nvSpPr>
+                <p:cNvPr id="15" name="Rounded Rectangle 14"/>
+                <p:cNvSpPr/>
+                <p:nvPr/>
+              </p:nvSpPr>
+              <p:spPr>
+                <a:xfrm>
+                  <a:off x="6995409" y="2377449"/>
+                  <a:ext cx="2071872" cy="947619"/>
+                </a:xfrm>
+                <a:prstGeom prst="roundRect">
+                  <a:avLst/>
+                </a:prstGeom>
+              </p:spPr>
+              <p:style>
+                <a:lnRef idx="2">
+                  <a:schemeClr val="dk1"/>
+                </a:lnRef>
+                <a:fillRef idx="1">
+                  <a:schemeClr val="lt1"/>
+                </a:fillRef>
+                <a:effectRef idx="0">
+                  <a:schemeClr val="dk1"/>
+                </a:effectRef>
+                <a:fontRef idx="minor">
+                  <a:schemeClr val="dk1"/>
+                </a:fontRef>
+              </p:style>
+              <p:txBody>
+                <a:bodyPr lIns="0" rIns="0" rtlCol="0" anchor="ctr"/>
+                <a:lstStyle/>
+                <a:p>
+                  <a:pPr algn="ctr"/>
+                  <a:r>
+                    <a:rPr lang="en-US" dirty="0"/>
+                    <a:t>Large 16S cohorts</a:t>
+                  </a:r>
+                </a:p>
+                <a:p>
+                  <a:pPr algn="ctr"/>
+                  <a:r>
+                    <a:rPr lang="en-US" dirty="0" smtClean="0"/>
+                    <a:t>Human Microbiome Project</a:t>
+                  </a:r>
+                </a:p>
+              </p:txBody>
+            </p:sp>
+          </p:grpSp>
+        </p:grpSp>
+        <p:grpSp>
+          <p:nvGrpSpPr>
+            <p:cNvPr id="37" name="Group 36"/>
+            <p:cNvGrpSpPr/>
+            <p:nvPr/>
+          </p:nvGrpSpPr>
+          <p:grpSpPr>
+            <a:xfrm>
+              <a:off x="609750" y="3921059"/>
+              <a:ext cx="8457531" cy="827315"/>
+              <a:chOff x="609750" y="4006084"/>
+              <a:chExt cx="8457531" cy="827315"/>
+            </a:xfrm>
+          </p:grpSpPr>
+          <p:sp>
+            <p:nvSpPr>
+              <p:cNvPr id="16" name="Rounded Rectangle 15"/>
+              <p:cNvSpPr/>
+              <p:nvPr/>
+            </p:nvSpPr>
+            <p:spPr>
+              <a:xfrm>
+                <a:off x="609750" y="4006084"/>
+                <a:ext cx="4022171" cy="827315"/>
+              </a:xfrm>
+              <a:prstGeom prst="roundRect">
+                <a:avLst/>
+              </a:prstGeom>
+            </p:spPr>
+            <p:style>
+              <a:lnRef idx="2">
+                <a:schemeClr val="dk1"/>
+              </a:lnRef>
+              <a:fillRef idx="1">
+                <a:schemeClr val="lt1"/>
+              </a:fillRef>
+              <a:effectRef idx="0">
+                <a:schemeClr val="dk1"/>
+              </a:effectRef>
+              <a:fontRef idx="minor">
+                <a:schemeClr val="dk1"/>
+              </a:fontRef>
+            </p:style>
+            <p:txBody>
+              <a:bodyPr rtlCol="0" anchor="ctr"/>
+              <a:lstStyle/>
+              <a:p>
+                <a:pPr algn="ctr"/>
+                <a:r>
+                  <a:rPr lang="en-US" dirty="0" smtClean="0"/>
+                  <a:t>Experimentally validated annotations</a:t>
+                </a:r>
+              </a:p>
+              <a:p>
+                <a:pPr algn="ctr"/>
+                <a:r>
+                  <a:rPr lang="en-US" dirty="0" smtClean="0"/>
+                  <a:t>Phylogenetic inference</a:t>
+                </a:r>
+                <a:endParaRPr lang="en-US" dirty="0"/>
+              </a:p>
+            </p:txBody>
+          </p:sp>
+          <p:sp>
+            <p:nvSpPr>
+              <p:cNvPr id="17" name="Rounded Rectangle 16"/>
+              <p:cNvSpPr/>
+              <p:nvPr/>
+            </p:nvSpPr>
+            <p:spPr>
+              <a:xfrm>
+                <a:off x="4811753" y="4006084"/>
+                <a:ext cx="4255528" cy="827315"/>
+              </a:xfrm>
+              <a:prstGeom prst="roundRect">
+                <a:avLst/>
+              </a:prstGeom>
+            </p:spPr>
+            <p:style>
+              <a:lnRef idx="2">
+                <a:schemeClr val="dk1"/>
+              </a:lnRef>
+              <a:fillRef idx="1">
+                <a:schemeClr val="lt1"/>
+              </a:fillRef>
+              <a:effectRef idx="0">
+                <a:schemeClr val="dk1"/>
+              </a:effectRef>
+              <a:fontRef idx="minor">
+                <a:schemeClr val="dk1"/>
+              </a:fontRef>
+            </p:style>
+            <p:txBody>
+              <a:bodyPr rtlCol="0" anchor="ctr"/>
+              <a:lstStyle/>
+              <a:p>
+                <a:pPr algn="ctr"/>
+                <a:r>
+                  <a:rPr lang="en-US" dirty="0" smtClean="0"/>
+                  <a:t>Meta-analysis</a:t>
+                </a:r>
+              </a:p>
+              <a:p>
+                <a:pPr algn="ctr"/>
+                <a:r>
+                  <a:rPr lang="en-US" dirty="0" smtClean="0"/>
+                  <a:t>Feature selection and cross-validation</a:t>
+                </a:r>
+                <a:endParaRPr lang="en-US" dirty="0"/>
+              </a:p>
+            </p:txBody>
+          </p:sp>
+        </p:grpSp>
+        <p:grpSp>
+          <p:nvGrpSpPr>
+            <p:cNvPr id="38" name="Group 37"/>
+            <p:cNvGrpSpPr/>
+            <p:nvPr/>
+          </p:nvGrpSpPr>
+          <p:grpSpPr>
+            <a:xfrm>
+              <a:off x="609750" y="5392174"/>
+              <a:ext cx="8457531" cy="1336857"/>
+              <a:chOff x="609750" y="4985782"/>
+              <a:chExt cx="8457531" cy="1336857"/>
+            </a:xfrm>
+          </p:grpSpPr>
+          <p:sp>
+            <p:nvSpPr>
+              <p:cNvPr id="18" name="Rounded Rectangle 17"/>
+              <p:cNvSpPr/>
+              <p:nvPr/>
+            </p:nvSpPr>
+            <p:spPr>
+              <a:xfrm>
+                <a:off x="609750" y="4985782"/>
+                <a:ext cx="8457531" cy="1336857"/>
+              </a:xfrm>
+              <a:prstGeom prst="roundRect">
+                <a:avLst/>
+              </a:prstGeom>
+            </p:spPr>
+            <p:style>
+              <a:lnRef idx="2">
+                <a:schemeClr val="dk1"/>
+              </a:lnRef>
+              <a:fillRef idx="1">
+                <a:schemeClr val="lt1"/>
+              </a:fillRef>
+              <a:effectRef idx="0">
+                <a:schemeClr val="dk1"/>
+              </a:effectRef>
+              <a:fontRef idx="minor">
+                <a:schemeClr val="dk1"/>
+              </a:fontRef>
+            </p:style>
+            <p:txBody>
+              <a:bodyPr rtlCol="0" anchor="ctr"/>
+              <a:lstStyle/>
+              <a:p>
+                <a:pPr algn="ctr"/>
+                <a:endParaRPr lang="en-US" dirty="0"/>
+              </a:p>
+            </p:txBody>
+          </p:sp>
+          <p:grpSp>
+            <p:nvGrpSpPr>
+              <p:cNvPr id="34" name="Group 33"/>
+              <p:cNvGrpSpPr/>
+              <p:nvPr/>
+            </p:nvGrpSpPr>
+            <p:grpSpPr>
+              <a:xfrm>
+                <a:off x="1232942" y="5890048"/>
+                <a:ext cx="7368256" cy="369333"/>
+                <a:chOff x="1232942" y="5919076"/>
+                <a:chExt cx="7368256" cy="369333"/>
+              </a:xfrm>
+            </p:grpSpPr>
+            <p:sp>
+              <p:nvSpPr>
+                <p:cNvPr id="20" name="TextBox 19"/>
+                <p:cNvSpPr txBox="1"/>
+                <p:nvPr/>
+              </p:nvSpPr>
+              <p:spPr>
+                <a:xfrm>
+                  <a:off x="6655604" y="5919077"/>
+                  <a:ext cx="1945594" cy="369332"/>
+                </a:xfrm>
+                <a:prstGeom prst="rect">
+                  <a:avLst/>
+                </a:prstGeom>
+                <a:noFill/>
+              </p:spPr>
+              <p:txBody>
+                <a:bodyPr wrap="square" rtlCol="0" anchor="ctr">
+                  <a:spAutoFit/>
+                </a:bodyPr>
+                <a:lstStyle/>
+                <a:p>
+                  <a:pPr algn="ctr"/>
+                  <a:r>
+                    <a:rPr lang="en-US" dirty="0" smtClean="0"/>
+                    <a:t>Body site habitat</a:t>
+                  </a:r>
+                  <a:endParaRPr lang="en-US" dirty="0"/>
+                </a:p>
+              </p:txBody>
+            </p:sp>
+            <p:sp>
+              <p:nvSpPr>
+                <p:cNvPr id="25" name="TextBox 24"/>
+                <p:cNvSpPr txBox="1"/>
+                <p:nvPr/>
+              </p:nvSpPr>
+              <p:spPr>
+                <a:xfrm>
+                  <a:off x="3193701" y="5919077"/>
+                  <a:ext cx="3446738" cy="369332"/>
+                </a:xfrm>
+                <a:prstGeom prst="rect">
+                  <a:avLst/>
+                </a:prstGeom>
+                <a:noFill/>
+              </p:spPr>
+              <p:txBody>
+                <a:bodyPr wrap="square" rtlCol="0" anchor="ctr">
+                  <a:spAutoFit/>
+                </a:bodyPr>
+                <a:lstStyle/>
+                <a:p>
+                  <a:pPr algn="ctr"/>
+                  <a:r>
+                    <a:rPr lang="en-US" dirty="0" smtClean="0"/>
+                    <a:t>Short-chain fatty acid producers</a:t>
+                  </a:r>
+                  <a:endParaRPr lang="en-US" dirty="0"/>
+                </a:p>
+              </p:txBody>
+            </p:sp>
+            <p:sp>
+              <p:nvSpPr>
+                <p:cNvPr id="26" name="TextBox 25"/>
+                <p:cNvSpPr txBox="1"/>
+                <p:nvPr/>
+              </p:nvSpPr>
+              <p:spPr>
+                <a:xfrm>
+                  <a:off x="1232942" y="5919076"/>
+                  <a:ext cx="1945594" cy="369332"/>
+                </a:xfrm>
+                <a:prstGeom prst="rect">
+                  <a:avLst/>
+                </a:prstGeom>
+                <a:noFill/>
+              </p:spPr>
+              <p:txBody>
+                <a:bodyPr wrap="square" rtlCol="0" anchor="ctr">
+                  <a:spAutoFit/>
+                </a:bodyPr>
+                <a:lstStyle/>
+                <a:p>
+                  <a:pPr algn="ctr"/>
+                  <a:r>
+                    <a:rPr lang="en-US" dirty="0" smtClean="0"/>
+                    <a:t>Aerobic/anaerobic</a:t>
+                  </a:r>
+                  <a:endParaRPr lang="en-US" dirty="0"/>
+                </a:p>
+              </p:txBody>
+            </p:sp>
+          </p:grpSp>
+          <p:grpSp>
+            <p:nvGrpSpPr>
+              <p:cNvPr id="33" name="Group 32"/>
+              <p:cNvGrpSpPr/>
+              <p:nvPr/>
+            </p:nvGrpSpPr>
+            <p:grpSpPr>
+              <a:xfrm>
+                <a:off x="914406" y="5065753"/>
+                <a:ext cx="7828621" cy="369332"/>
+                <a:chOff x="972462" y="5094781"/>
+                <a:chExt cx="7828621" cy="369332"/>
+              </a:xfrm>
+            </p:grpSpPr>
+            <p:sp>
+              <p:nvSpPr>
+                <p:cNvPr id="19" name="TextBox 18"/>
+                <p:cNvSpPr txBox="1"/>
+                <p:nvPr/>
+              </p:nvSpPr>
+              <p:spPr>
+                <a:xfrm>
+                  <a:off x="972462" y="5094781"/>
+                  <a:ext cx="1328867" cy="369332"/>
+                </a:xfrm>
+                <a:prstGeom prst="rect">
+                  <a:avLst/>
+                </a:prstGeom>
+                <a:noFill/>
+              </p:spPr>
+              <p:txBody>
+                <a:bodyPr wrap="square" rtlCol="0" anchor="ctr">
+                  <a:spAutoFit/>
+                </a:bodyPr>
+                <a:lstStyle/>
+                <a:p>
+                  <a:pPr algn="ctr"/>
+                  <a:r>
+                    <a:rPr lang="en-US" dirty="0" smtClean="0"/>
+                    <a:t>Pathogens</a:t>
+                  </a:r>
+                  <a:endParaRPr lang="en-US" dirty="0"/>
+                </a:p>
+              </p:txBody>
+            </p:sp>
+            <p:sp>
+              <p:nvSpPr>
+                <p:cNvPr id="22" name="TextBox 21"/>
+                <p:cNvSpPr txBox="1"/>
+                <p:nvPr/>
+              </p:nvSpPr>
+              <p:spPr>
+                <a:xfrm>
+                  <a:off x="6855489" y="5094781"/>
+                  <a:ext cx="1945594" cy="369332"/>
+                </a:xfrm>
+                <a:prstGeom prst="rect">
+                  <a:avLst/>
+                </a:prstGeom>
+                <a:noFill/>
+              </p:spPr>
+              <p:txBody>
+                <a:bodyPr wrap="square" rtlCol="0" anchor="ctr">
+                  <a:spAutoFit/>
+                </a:bodyPr>
+                <a:lstStyle/>
+                <a:p>
+                  <a:pPr algn="ctr"/>
+                  <a:r>
+                    <a:rPr lang="en-US" dirty="0" smtClean="0"/>
+                    <a:t>Disease-associated</a:t>
+                  </a:r>
+                  <a:endParaRPr lang="en-US" dirty="0"/>
+                </a:p>
+              </p:txBody>
+            </p:sp>
+            <p:sp>
+              <p:nvSpPr>
+                <p:cNvPr id="23" name="TextBox 22"/>
+                <p:cNvSpPr txBox="1"/>
+                <p:nvPr/>
+              </p:nvSpPr>
+              <p:spPr>
+                <a:xfrm>
+                  <a:off x="2494573" y="5094781"/>
+                  <a:ext cx="1945594" cy="369332"/>
+                </a:xfrm>
+                <a:prstGeom prst="rect">
+                  <a:avLst/>
+                </a:prstGeom>
+                <a:noFill/>
+              </p:spPr>
+              <p:txBody>
+                <a:bodyPr wrap="square" rtlCol="0" anchor="ctr">
+                  <a:spAutoFit/>
+                </a:bodyPr>
+                <a:lstStyle/>
+                <a:p>
+                  <a:pPr algn="ctr"/>
+                  <a:r>
+                    <a:rPr lang="en-US" dirty="0" smtClean="0"/>
+                    <a:t>Functional groups</a:t>
+                  </a:r>
+                  <a:endParaRPr lang="en-US" dirty="0"/>
+                </a:p>
+              </p:txBody>
+            </p:sp>
+            <p:sp>
+              <p:nvSpPr>
+                <p:cNvPr id="27" name="TextBox 26"/>
+                <p:cNvSpPr txBox="1"/>
+                <p:nvPr/>
+              </p:nvSpPr>
+              <p:spPr>
+                <a:xfrm>
+                  <a:off x="4851121" y="5094781"/>
+                  <a:ext cx="1607929" cy="369332"/>
+                </a:xfrm>
+                <a:prstGeom prst="rect">
+                  <a:avLst/>
+                </a:prstGeom>
+                <a:noFill/>
+              </p:spPr>
+              <p:txBody>
+                <a:bodyPr wrap="square" rtlCol="0" anchor="ctr">
+                  <a:spAutoFit/>
+                </a:bodyPr>
+                <a:lstStyle/>
+                <a:p>
+                  <a:pPr algn="ctr"/>
+                  <a:r>
+                    <a:rPr lang="en-US" dirty="0" smtClean="0"/>
+                    <a:t>Inflammatory</a:t>
+                  </a:r>
+                  <a:endParaRPr lang="en-US" dirty="0"/>
+                </a:p>
+              </p:txBody>
+            </p:sp>
+          </p:grpSp>
+          <p:grpSp>
+            <p:nvGrpSpPr>
+              <p:cNvPr id="32" name="Group 31"/>
+              <p:cNvGrpSpPr/>
+              <p:nvPr/>
+            </p:nvGrpSpPr>
+            <p:grpSpPr>
+              <a:xfrm>
+                <a:off x="652868" y="5477901"/>
+                <a:ext cx="8299119" cy="369332"/>
+                <a:chOff x="725438" y="5499042"/>
+                <a:chExt cx="8299119" cy="369332"/>
+              </a:xfrm>
+            </p:grpSpPr>
+            <p:sp>
+              <p:nvSpPr>
+                <p:cNvPr id="21" name="TextBox 20"/>
+                <p:cNvSpPr txBox="1"/>
+                <p:nvPr/>
+              </p:nvSpPr>
+              <p:spPr>
+                <a:xfrm>
+                  <a:off x="4733035" y="5499042"/>
+                  <a:ext cx="2354168" cy="369332"/>
+                </a:xfrm>
+                <a:prstGeom prst="rect">
+                  <a:avLst/>
+                </a:prstGeom>
+                <a:noFill/>
+              </p:spPr>
+              <p:txBody>
+                <a:bodyPr wrap="square" rtlCol="0" anchor="ctr">
+                  <a:spAutoFit/>
+                </a:bodyPr>
+                <a:lstStyle/>
+                <a:p>
+                  <a:pPr algn="ctr"/>
+                  <a:r>
+                    <a:rPr lang="en-US" dirty="0" smtClean="0"/>
+                    <a:t>Environmental habitat</a:t>
+                  </a:r>
+                  <a:endParaRPr lang="en-US" dirty="0"/>
+                </a:p>
+              </p:txBody>
+            </p:sp>
+            <p:sp>
+              <p:nvSpPr>
+                <p:cNvPr id="24" name="TextBox 23"/>
+                <p:cNvSpPr txBox="1"/>
+                <p:nvPr/>
+              </p:nvSpPr>
+              <p:spPr>
+                <a:xfrm>
+                  <a:off x="725438" y="5499042"/>
+                  <a:ext cx="1328867" cy="369332"/>
+                </a:xfrm>
+                <a:prstGeom prst="rect">
+                  <a:avLst/>
+                </a:prstGeom>
+                <a:noFill/>
+              </p:spPr>
+              <p:txBody>
+                <a:bodyPr wrap="square" rtlCol="0" anchor="ctr">
+                  <a:spAutoFit/>
+                </a:bodyPr>
+                <a:lstStyle/>
+                <a:p>
+                  <a:pPr algn="ctr"/>
+                  <a:r>
+                    <a:rPr lang="en-US" dirty="0" smtClean="0"/>
+                    <a:t>Sporulation</a:t>
+                  </a:r>
+                  <a:endParaRPr lang="en-US" dirty="0"/>
+                </a:p>
+              </p:txBody>
+            </p:sp>
+            <p:sp>
+              <p:nvSpPr>
+                <p:cNvPr id="28" name="TextBox 27"/>
+                <p:cNvSpPr txBox="1"/>
+                <p:nvPr/>
+              </p:nvSpPr>
+              <p:spPr>
+                <a:xfrm>
+                  <a:off x="7695690" y="5499042"/>
+                  <a:ext cx="1328867" cy="369332"/>
+                </a:xfrm>
+                <a:prstGeom prst="rect">
+                  <a:avLst/>
+                </a:prstGeom>
+                <a:noFill/>
+              </p:spPr>
+              <p:txBody>
+                <a:bodyPr wrap="square" rtlCol="0" anchor="ctr">
+                  <a:spAutoFit/>
+                </a:bodyPr>
+                <a:lstStyle/>
+                <a:p>
+                  <a:pPr algn="ctr"/>
+                  <a:r>
+                    <a:rPr lang="en-US" dirty="0" smtClean="0"/>
+                    <a:t>Tumorigenic</a:t>
+                  </a:r>
+                  <a:endParaRPr lang="en-US" dirty="0"/>
+                </a:p>
+              </p:txBody>
+            </p:sp>
+            <p:sp>
+              <p:nvSpPr>
+                <p:cNvPr id="30" name="TextBox 29"/>
+                <p:cNvSpPr txBox="1"/>
+                <p:nvPr/>
+              </p:nvSpPr>
+              <p:spPr>
+                <a:xfrm>
+                  <a:off x="2662793" y="5499042"/>
+                  <a:ext cx="1461754" cy="369332"/>
+                </a:xfrm>
+                <a:prstGeom prst="rect">
+                  <a:avLst/>
+                </a:prstGeom>
+                <a:noFill/>
+              </p:spPr>
+              <p:txBody>
+                <a:bodyPr wrap="square" rtlCol="0" anchor="ctr">
+                  <a:spAutoFit/>
+                </a:bodyPr>
+                <a:lstStyle/>
+                <a:p>
+                  <a:pPr algn="ctr"/>
+                  <a:r>
+                    <a:rPr lang="en-US" dirty="0" smtClean="0"/>
+                    <a:t>Acid tolerant</a:t>
+                  </a:r>
+                  <a:endParaRPr lang="en-US" dirty="0"/>
+                </a:p>
+              </p:txBody>
+            </p:sp>
+          </p:grpSp>
+        </p:grpSp>
+        <p:sp>
+          <p:nvSpPr>
+            <p:cNvPr id="44" name="Rectangle 43"/>
+            <p:cNvSpPr/>
+            <p:nvPr/>
+          </p:nvSpPr>
+          <p:spPr>
+            <a:xfrm>
+              <a:off x="-1609943" y="1206320"/>
+              <a:ext cx="2038507" cy="646331"/>
+            </a:xfrm>
+            <a:prstGeom prst="rect">
+              <a:avLst/>
+            </a:prstGeom>
+            <a:noFill/>
+          </p:spPr>
+          <p:txBody>
+            <a:bodyPr wrap="none" lIns="91440" tIns="45720" rIns="91440" bIns="45720">
+              <a:spAutoFit/>
+            </a:bodyPr>
+            <a:lstStyle/>
+            <a:p>
+              <a:pPr algn="r"/>
+              <a:r>
+                <a:rPr lang="en-US" sz="3600" b="1" dirty="0" smtClean="0">
+                  <a:ln w="12700">
+                    <a:noFill/>
+                    <a:prstDash val="solid"/>
+                  </a:ln>
+                  <a:solidFill>
+                    <a:schemeClr val="tx1">
+                      <a:lumMod val="65000"/>
+                      <a:lumOff val="35000"/>
+                    </a:schemeClr>
+                  </a:solidFill>
+                  <a:effectLst>
+                    <a:outerShdw blurRad="41275" dist="20320" dir="1800000" algn="tl" rotWithShape="0">
+                      <a:srgbClr val="000000">
+                        <a:alpha val="40000"/>
+                      </a:srgbClr>
+                    </a:outerShdw>
+                  </a:effectLst>
+                </a:rPr>
+                <a:t>Approach</a:t>
+              </a:r>
+              <a:endParaRPr lang="en-US" sz="3600" b="1" dirty="0">
+                <a:ln w="12700">
+                  <a:noFill/>
+                  <a:prstDash val="solid"/>
+                </a:ln>
+                <a:solidFill>
+                  <a:schemeClr val="tx1">
+                    <a:lumMod val="65000"/>
+                    <a:lumOff val="35000"/>
+                  </a:schemeClr>
+                </a:solidFill>
+                <a:effectLst>
+                  <a:outerShdw blurRad="41275" dist="20320" dir="1800000" algn="tl" rotWithShape="0">
+                    <a:srgbClr val="000000">
+                      <a:alpha val="40000"/>
+                    </a:srgbClr>
+                  </a:outerShdw>
+                </a:effectLst>
+              </a:endParaRPr>
+            </a:p>
+          </p:txBody>
+        </p:sp>
+        <p:sp>
+          <p:nvSpPr>
+            <p:cNvPr id="45" name="Rectangle 44"/>
+            <p:cNvSpPr/>
+            <p:nvPr/>
+          </p:nvSpPr>
+          <p:spPr>
+            <a:xfrm>
+              <a:off x="-1238752" y="2544436"/>
+              <a:ext cx="1667316" cy="646331"/>
+            </a:xfrm>
+            <a:prstGeom prst="rect">
+              <a:avLst/>
+            </a:prstGeom>
+            <a:noFill/>
+          </p:spPr>
+          <p:txBody>
+            <a:bodyPr wrap="none" lIns="91440" tIns="45720" rIns="91440" bIns="45720">
+              <a:spAutoFit/>
+            </a:bodyPr>
+            <a:lstStyle/>
+            <a:p>
+              <a:pPr algn="r"/>
+              <a:r>
+                <a:rPr lang="en-US" sz="3600" b="1" dirty="0" smtClean="0">
+                  <a:ln w="12700">
+                    <a:noFill/>
+                    <a:prstDash val="solid"/>
+                  </a:ln>
+                  <a:solidFill>
+                    <a:schemeClr val="tx1">
+                      <a:lumMod val="75000"/>
+                      <a:lumOff val="25000"/>
+                    </a:schemeClr>
+                  </a:solidFill>
+                  <a:effectLst>
+                    <a:outerShdw blurRad="41275" dist="20320" dir="1800000" algn="tl" rotWithShape="0">
+                      <a:srgbClr val="000000">
+                        <a:alpha val="40000"/>
+                      </a:srgbClr>
+                    </a:outerShdw>
+                  </a:effectLst>
+                </a:rPr>
+                <a:t>Sources</a:t>
+              </a:r>
+              <a:endParaRPr lang="en-US" sz="3600" b="1" dirty="0">
+                <a:ln w="12700">
+                  <a:noFill/>
+                  <a:prstDash val="solid"/>
+                </a:ln>
+                <a:solidFill>
+                  <a:schemeClr val="tx1">
+                    <a:lumMod val="75000"/>
+                    <a:lumOff val="25000"/>
+                  </a:schemeClr>
+                </a:solidFill>
+                <a:effectLst>
+                  <a:outerShdw blurRad="41275" dist="20320" dir="1800000" algn="tl" rotWithShape="0">
+                    <a:srgbClr val="000000">
+                      <a:alpha val="40000"/>
+                    </a:srgbClr>
+                  </a:outerShdw>
+                </a:effectLst>
+              </a:endParaRPr>
+            </a:p>
+          </p:txBody>
+        </p:sp>
+        <p:sp>
+          <p:nvSpPr>
+            <p:cNvPr id="46" name="Rectangle 45"/>
+            <p:cNvSpPr/>
+            <p:nvPr/>
+          </p:nvSpPr>
+          <p:spPr>
+            <a:xfrm>
+              <a:off x="-1561276" y="4042329"/>
+              <a:ext cx="1989840" cy="646331"/>
+            </a:xfrm>
+            <a:prstGeom prst="rect">
+              <a:avLst/>
+            </a:prstGeom>
+            <a:noFill/>
+          </p:spPr>
+          <p:txBody>
+            <a:bodyPr wrap="none" lIns="91440" tIns="45720" rIns="91440" bIns="45720">
+              <a:spAutoFit/>
+            </a:bodyPr>
+            <a:lstStyle/>
+            <a:p>
+              <a:pPr algn="r"/>
+              <a:r>
+                <a:rPr lang="en-US" sz="3600" b="1" dirty="0" smtClean="0">
+                  <a:ln w="12700">
+                    <a:noFill/>
+                    <a:prstDash val="solid"/>
+                  </a:ln>
+                  <a:solidFill>
+                    <a:schemeClr val="tx1">
+                      <a:lumMod val="85000"/>
+                      <a:lumOff val="15000"/>
+                    </a:schemeClr>
+                  </a:solidFill>
+                  <a:effectLst>
+                    <a:outerShdw blurRad="41275" dist="20320" dir="1800000" algn="tl" rotWithShape="0">
+                      <a:srgbClr val="000000">
+                        <a:alpha val="40000"/>
+                      </a:srgbClr>
+                    </a:outerShdw>
+                  </a:effectLst>
+                </a:rPr>
+                <a:t>Inference</a:t>
+              </a:r>
+              <a:endParaRPr lang="en-US" sz="3600" b="1" dirty="0">
+                <a:ln w="12700">
+                  <a:noFill/>
+                  <a:prstDash val="solid"/>
+                </a:ln>
+                <a:solidFill>
+                  <a:schemeClr val="tx1">
+                    <a:lumMod val="85000"/>
+                    <a:lumOff val="15000"/>
+                  </a:schemeClr>
+                </a:solidFill>
+                <a:effectLst>
+                  <a:outerShdw blurRad="41275" dist="20320" dir="1800000" algn="tl" rotWithShape="0">
+                    <a:srgbClr val="000000">
+                      <a:alpha val="40000"/>
+                    </a:srgbClr>
+                  </a:outerShdw>
+                </a:effectLst>
+              </a:endParaRPr>
+            </a:p>
+          </p:txBody>
+        </p:sp>
+        <p:sp>
+          <p:nvSpPr>
+            <p:cNvPr id="47" name="Rectangle 46"/>
+            <p:cNvSpPr/>
+            <p:nvPr/>
+          </p:nvSpPr>
+          <p:spPr>
+            <a:xfrm>
+              <a:off x="-1355066" y="5521993"/>
+              <a:ext cx="1783630" cy="1200329"/>
+            </a:xfrm>
+            <a:prstGeom prst="rect">
+              <a:avLst/>
+            </a:prstGeom>
+            <a:noFill/>
+          </p:spPr>
+          <p:txBody>
+            <a:bodyPr wrap="none" lIns="91440" tIns="45720" rIns="91440" bIns="45720">
+              <a:spAutoFit/>
+            </a:bodyPr>
+            <a:lstStyle/>
+            <a:p>
+              <a:pPr algn="r"/>
+              <a:r>
+                <a:rPr lang="en-US" sz="3600" b="1" dirty="0" smtClean="0">
+                  <a:ln w="12700">
+                    <a:noFill/>
+                    <a:prstDash val="solid"/>
+                  </a:ln>
+                  <a:solidFill>
+                    <a:schemeClr val="tx1">
+                      <a:lumMod val="95000"/>
+                      <a:lumOff val="5000"/>
+                    </a:schemeClr>
+                  </a:solidFill>
+                  <a:effectLst>
+                    <a:outerShdw blurRad="41275" dist="20320" dir="1800000" algn="tl" rotWithShape="0">
+                      <a:srgbClr val="000000">
+                        <a:alpha val="40000"/>
+                      </a:srgbClr>
+                    </a:outerShdw>
+                  </a:effectLst>
+                </a:rPr>
+                <a:t>Microbe</a:t>
+              </a:r>
+            </a:p>
+            <a:p>
+              <a:pPr algn="r"/>
+              <a:r>
+                <a:rPr lang="en-US" sz="3600" b="1" dirty="0" smtClean="0">
+                  <a:ln w="12700">
+                    <a:noFill/>
+                    <a:prstDash val="solid"/>
+                  </a:ln>
+                  <a:solidFill>
+                    <a:schemeClr val="tx1">
+                      <a:lumMod val="95000"/>
+                      <a:lumOff val="5000"/>
+                    </a:schemeClr>
+                  </a:solidFill>
+                  <a:effectLst>
+                    <a:outerShdw blurRad="41275" dist="20320" dir="1800000" algn="tl" rotWithShape="0">
+                      <a:srgbClr val="000000">
+                        <a:alpha val="40000"/>
+                      </a:srgbClr>
+                    </a:outerShdw>
+                  </a:effectLst>
+                </a:rPr>
+                <a:t>Sets</a:t>
+              </a:r>
+              <a:endParaRPr lang="en-US" sz="3600" b="1" dirty="0">
+                <a:ln w="12700">
+                  <a:noFill/>
+                  <a:prstDash val="solid"/>
+                </a:ln>
+                <a:solidFill>
+                  <a:schemeClr val="tx1">
+                    <a:lumMod val="95000"/>
+                    <a:lumOff val="5000"/>
+                  </a:schemeClr>
+                </a:solidFill>
+                <a:effectLst>
+                  <a:outerShdw blurRad="41275" dist="20320" dir="1800000" algn="tl" rotWithShape="0">
+                    <a:srgbClr val="000000">
+                      <a:alpha val="40000"/>
+                    </a:srgbClr>
+                  </a:outerShdw>
+                </a:effectLst>
+              </a:endParaRPr>
+            </a:p>
+          </p:txBody>
+        </p:sp>
+        <p:grpSp>
+          <p:nvGrpSpPr>
+            <p:cNvPr id="62" name="Group 61"/>
+            <p:cNvGrpSpPr/>
+            <p:nvPr/>
+          </p:nvGrpSpPr>
+          <p:grpSpPr>
+            <a:xfrm>
+              <a:off x="1339036" y="2007831"/>
+              <a:ext cx="6939676" cy="237638"/>
+              <a:chOff x="1339036" y="1981155"/>
+              <a:chExt cx="6939676" cy="237638"/>
+            </a:xfrm>
+          </p:grpSpPr>
+          <p:sp>
+            <p:nvSpPr>
+              <p:cNvPr id="48" name="Down Arrow 47"/>
+              <p:cNvSpPr/>
+              <p:nvPr/>
+            </p:nvSpPr>
+            <p:spPr>
+              <a:xfrm>
+                <a:off x="1339036" y="1981155"/>
+                <a:ext cx="494258" cy="237638"/>
+              </a:xfrm>
+              <a:prstGeom prst="downArrow">
+                <a:avLst/>
+              </a:prstGeom>
+              <a:solidFill>
+                <a:schemeClr val="bg1">
+                  <a:lumMod val="75000"/>
+                </a:schemeClr>
+              </a:solidFill>
+              <a:ln>
+                <a:noFill/>
+              </a:ln>
+            </p:spPr>
+            <p:style>
+              <a:lnRef idx="2">
+                <a:schemeClr val="accent1">
+                  <a:shade val="50000"/>
+                </a:schemeClr>
+              </a:lnRef>
+              <a:fillRef idx="1">
+                <a:schemeClr val="accent1"/>
+              </a:fillRef>
+              <a:effectRef idx="0">
+                <a:schemeClr val="accent1"/>
+              </a:effectRef>
+              <a:fontRef idx="minor">
+                <a:schemeClr val="lt1"/>
+              </a:fontRef>
+            </p:style>
+            <p:txBody>
+              <a:bodyPr rtlCol="0" anchor="ctr"/>
+              <a:lstStyle/>
+              <a:p>
+                <a:pPr algn="ctr"/>
+                <a:endParaRPr lang="en-US"/>
+              </a:p>
+            </p:txBody>
+          </p:sp>
+          <p:sp>
+            <p:nvSpPr>
+              <p:cNvPr id="49" name="Down Arrow 48"/>
+              <p:cNvSpPr/>
+              <p:nvPr/>
+            </p:nvSpPr>
+            <p:spPr>
+              <a:xfrm>
+                <a:off x="3408376" y="1981155"/>
+                <a:ext cx="494258" cy="237638"/>
+              </a:xfrm>
+              <a:prstGeom prst="downArrow">
+                <a:avLst/>
+              </a:prstGeom>
+              <a:solidFill>
+                <a:schemeClr val="bg1">
+                  <a:lumMod val="75000"/>
+                </a:schemeClr>
+              </a:solidFill>
+              <a:ln>
+                <a:noFill/>
+              </a:ln>
+            </p:spPr>
+            <p:style>
+              <a:lnRef idx="2">
+                <a:schemeClr val="accent1">
+                  <a:shade val="50000"/>
+                </a:schemeClr>
+              </a:lnRef>
+              <a:fillRef idx="1">
+                <a:schemeClr val="accent1"/>
+              </a:fillRef>
+              <a:effectRef idx="0">
+                <a:schemeClr val="accent1"/>
+              </a:effectRef>
+              <a:fontRef idx="minor">
+                <a:schemeClr val="lt1"/>
+              </a:fontRef>
+            </p:style>
+            <p:txBody>
+              <a:bodyPr rtlCol="0" anchor="ctr"/>
+              <a:lstStyle/>
+              <a:p>
+                <a:pPr algn="ctr"/>
+                <a:endParaRPr lang="en-US"/>
+              </a:p>
+            </p:txBody>
+          </p:sp>
+          <p:sp>
+            <p:nvSpPr>
+              <p:cNvPr id="50" name="Down Arrow 49"/>
+              <p:cNvSpPr/>
+              <p:nvPr/>
+            </p:nvSpPr>
+            <p:spPr>
+              <a:xfrm>
+                <a:off x="5604756" y="1981155"/>
+                <a:ext cx="494258" cy="237638"/>
+              </a:xfrm>
+              <a:prstGeom prst="downArrow">
+                <a:avLst/>
+              </a:prstGeom>
+              <a:solidFill>
+                <a:schemeClr val="bg1">
+                  <a:lumMod val="75000"/>
+                </a:schemeClr>
+              </a:solidFill>
+              <a:ln>
+                <a:noFill/>
+              </a:ln>
+            </p:spPr>
+            <p:style>
+              <a:lnRef idx="2">
+                <a:schemeClr val="accent1">
+                  <a:shade val="50000"/>
+                </a:schemeClr>
+              </a:lnRef>
+              <a:fillRef idx="1">
+                <a:schemeClr val="accent1"/>
+              </a:fillRef>
+              <a:effectRef idx="0">
+                <a:schemeClr val="accent1"/>
+              </a:effectRef>
+              <a:fontRef idx="minor">
+                <a:schemeClr val="lt1"/>
+              </a:fontRef>
+            </p:style>
+            <p:txBody>
+              <a:bodyPr rtlCol="0" anchor="ctr"/>
+              <a:lstStyle/>
+              <a:p>
+                <a:pPr algn="ctr"/>
+                <a:endParaRPr lang="en-US"/>
+              </a:p>
+            </p:txBody>
+          </p:sp>
+          <p:sp>
+            <p:nvSpPr>
+              <p:cNvPr id="52" name="Down Arrow 51"/>
+              <p:cNvSpPr/>
+              <p:nvPr/>
+            </p:nvSpPr>
+            <p:spPr>
+              <a:xfrm>
+                <a:off x="7784454" y="1981155"/>
+                <a:ext cx="494258" cy="237638"/>
+              </a:xfrm>
+              <a:prstGeom prst="downArrow">
+                <a:avLst/>
+              </a:prstGeom>
+              <a:solidFill>
+                <a:schemeClr val="bg1">
+                  <a:lumMod val="75000"/>
+                </a:schemeClr>
+              </a:solidFill>
+              <a:ln>
+                <a:noFill/>
+              </a:ln>
+            </p:spPr>
+            <p:style>
+              <a:lnRef idx="2">
+                <a:schemeClr val="accent1">
+                  <a:shade val="50000"/>
+                </a:schemeClr>
+              </a:lnRef>
+              <a:fillRef idx="1">
+                <a:schemeClr val="accent1"/>
+              </a:fillRef>
+              <a:effectRef idx="0">
+                <a:schemeClr val="accent1"/>
+              </a:effectRef>
+              <a:fontRef idx="minor">
+                <a:schemeClr val="lt1"/>
+              </a:fontRef>
+            </p:style>
+            <p:txBody>
+              <a:bodyPr rtlCol="0" anchor="ctr"/>
+              <a:lstStyle/>
+              <a:p>
+                <a:pPr algn="ctr"/>
+                <a:endParaRPr lang="en-US"/>
+              </a:p>
+            </p:txBody>
+          </p:sp>
+        </p:grpSp>
+        <p:grpSp>
+          <p:nvGrpSpPr>
+            <p:cNvPr id="63" name="Group 62"/>
+            <p:cNvGrpSpPr/>
+            <p:nvPr/>
+          </p:nvGrpSpPr>
+          <p:grpSpPr>
+            <a:xfrm>
+              <a:off x="1813105" y="3466278"/>
+              <a:ext cx="5934141" cy="318186"/>
+              <a:chOff x="1813105" y="3448201"/>
+              <a:chExt cx="5934141" cy="318186"/>
+            </a:xfrm>
+          </p:grpSpPr>
+          <p:sp>
+            <p:nvSpPr>
+              <p:cNvPr id="53" name="Down Arrow 52"/>
+              <p:cNvSpPr/>
+              <p:nvPr/>
+            </p:nvSpPr>
+            <p:spPr>
+              <a:xfrm>
+                <a:off x="1813105" y="3448201"/>
+                <a:ext cx="1615460" cy="318186"/>
+              </a:xfrm>
+              <a:prstGeom prst="downArrow">
+                <a:avLst>
+                  <a:gd name="adj1" fmla="val 40566"/>
+                  <a:gd name="adj2" fmla="val 50000"/>
+                </a:avLst>
+              </a:prstGeom>
+              <a:solidFill>
+                <a:schemeClr val="bg1">
+                  <a:lumMod val="65000"/>
+                </a:schemeClr>
+              </a:solidFill>
+              <a:ln>
+                <a:noFill/>
+              </a:ln>
+            </p:spPr>
+            <p:style>
+              <a:lnRef idx="2">
+                <a:schemeClr val="accent1">
+                  <a:shade val="50000"/>
+                </a:schemeClr>
+              </a:lnRef>
+              <a:fillRef idx="1">
+                <a:schemeClr val="accent1"/>
+              </a:fillRef>
+              <a:effectRef idx="0">
+                <a:schemeClr val="accent1"/>
+              </a:effectRef>
+              <a:fontRef idx="minor">
+                <a:schemeClr val="lt1"/>
+              </a:fontRef>
+            </p:style>
+            <p:txBody>
+              <a:bodyPr rtlCol="0" anchor="ctr"/>
+              <a:lstStyle/>
+              <a:p>
+                <a:pPr algn="ctr"/>
+                <a:endParaRPr lang="en-US"/>
+              </a:p>
+            </p:txBody>
+          </p:sp>
+          <p:sp>
+            <p:nvSpPr>
+              <p:cNvPr id="55" name="Down Arrow 54"/>
+              <p:cNvSpPr/>
+              <p:nvPr/>
+            </p:nvSpPr>
+            <p:spPr>
+              <a:xfrm>
+                <a:off x="6131786" y="3448201"/>
+                <a:ext cx="1615460" cy="318186"/>
+              </a:xfrm>
+              <a:prstGeom prst="downArrow">
+                <a:avLst>
+                  <a:gd name="adj1" fmla="val 40566"/>
+                  <a:gd name="adj2" fmla="val 50000"/>
+                </a:avLst>
+              </a:prstGeom>
+              <a:solidFill>
+                <a:schemeClr val="bg1">
+                  <a:lumMod val="65000"/>
+                </a:schemeClr>
+              </a:solidFill>
+              <a:ln>
+                <a:noFill/>
+              </a:ln>
+            </p:spPr>
+            <p:style>
+              <a:lnRef idx="2">
+                <a:schemeClr val="accent1">
+                  <a:shade val="50000"/>
+                </a:schemeClr>
+              </a:lnRef>
+              <a:fillRef idx="1">
+                <a:schemeClr val="accent1"/>
+              </a:fillRef>
+              <a:effectRef idx="0">
+                <a:schemeClr val="accent1"/>
+              </a:effectRef>
+              <a:fontRef idx="minor">
+                <a:schemeClr val="lt1"/>
+              </a:fontRef>
+            </p:style>
+            <p:txBody>
+              <a:bodyPr rtlCol="0" anchor="ctr"/>
+              <a:lstStyle/>
+              <a:p>
+                <a:pPr algn="ctr"/>
+                <a:endParaRPr lang="en-US"/>
+              </a:p>
+            </p:txBody>
+          </p:sp>
+        </p:grpSp>
+        <p:sp>
+          <p:nvSpPr>
+            <p:cNvPr id="56" name="Down Arrow 55"/>
+            <p:cNvSpPr/>
+            <p:nvPr/>
+          </p:nvSpPr>
+          <p:spPr>
+            <a:xfrm>
+              <a:off x="3107073" y="4865919"/>
+              <a:ext cx="3462885" cy="465858"/>
+            </a:xfrm>
+            <a:prstGeom prst="downArrow">
+              <a:avLst>
+                <a:gd name="adj1" fmla="val 25896"/>
+                <a:gd name="adj2" fmla="val 50000"/>
+              </a:avLst>
+            </a:prstGeom>
+            <a:solidFill>
+              <a:schemeClr val="bg1">
+                <a:lumMod val="50000"/>
+              </a:schemeClr>
+            </a:solidFill>
+            <a:ln>
+              <a:noFill/>
+            </a:ln>
+          </p:spPr>
+          <p:style>
+            <a:lnRef idx="2">
+              <a:schemeClr val="accent1">
+                <a:shade val="50000"/>
+              </a:schemeClr>
+            </a:lnRef>
+            <a:fillRef idx="1">
+              <a:schemeClr val="accent1"/>
+            </a:fillRef>
+            <a:effectRef idx="0">
+              <a:schemeClr val="accent1"/>
+            </a:effectRef>
+            <a:fontRef idx="minor">
+              <a:schemeClr val="lt1"/>
+            </a:fontRef>
+          </p:style>
+          <p:txBody>
+            <a:bodyPr rtlCol="0" anchor="ctr"/>
+            <a:lstStyle/>
+            <a:p>
+              <a:pPr algn="ctr"/>
+              <a:endParaRPr lang="en-US"/>
+            </a:p>
+          </p:txBody>
+        </p:sp>
+      </p:grpSp>
+    </p:spTree>
+    <p:extLst>
+      <p:ext uri="{BB962C8B-B14F-4D97-AF65-F5344CB8AC3E}">
+        <p14:creationId xmlns:p14="http://schemas.microsoft.com/office/powerpoint/2010/main" val="4248537954"/>
       </p:ext>
     </p:extLst>
   </p:cSld>

</xml_diff>

<commit_message>
meta analysis results + figures
</commit_message>
<xml_diff>
--- a/figures/figures.pptx
+++ b/figures/figures.pptx
@@ -14,6 +14,7 @@
     <p:sldId id="264" r:id="rId8"/>
     <p:sldId id="265" r:id="rId9"/>
     <p:sldId id="266" r:id="rId10"/>
+    <p:sldId id="267" r:id="rId11"/>
   </p:sldIdLst>
   <p:sldSz cx="9144000" cy="6858000" type="screen4x3"/>
   <p:notesSz cx="6858000" cy="9144000"/>
@@ -3807,6 +3808,1664 @@
 </p:sld>
 </file>
 
+<file path=ppt/slides/slide10.xml><?xml version="1.0" encoding="utf-8"?>
+<p:sld xmlns:a="http://schemas.openxmlformats.org/drawingml/2006/main" xmlns:r="http://schemas.openxmlformats.org/officeDocument/2006/relationships" xmlns:p="http://schemas.openxmlformats.org/presentationml/2006/main">
+  <p:cSld>
+    <p:spTree>
+      <p:nvGrpSpPr>
+        <p:cNvPr id="1" name=""/>
+        <p:cNvGrpSpPr/>
+        <p:nvPr/>
+      </p:nvGrpSpPr>
+      <p:grpSpPr>
+        <a:xfrm>
+          <a:off x="0" y="0"/>
+          <a:ext cx="0" cy="0"/>
+          <a:chOff x="0" y="0"/>
+          <a:chExt cx="0" cy="0"/>
+        </a:xfrm>
+      </p:grpSpPr>
+      <p:pic>
+        <p:nvPicPr>
+          <p:cNvPr id="2" name="Picture 1"/>
+          <p:cNvPicPr>
+            <a:picLocks noChangeAspect="1"/>
+          </p:cNvPicPr>
+          <p:nvPr/>
+        </p:nvPicPr>
+        <p:blipFill>
+          <a:blip r:embed="rId2">
+            <a:extLst>
+              <a:ext uri="{28A0092B-C50C-407E-A947-70E740481C1C}">
+                <a14:useLocalDpi xmlns:a14="http://schemas.microsoft.com/office/drawing/2010/main" val="0"/>
+              </a:ext>
+            </a:extLst>
+          </a:blip>
+          <a:stretch>
+            <a:fillRect/>
+          </a:stretch>
+        </p:blipFill>
+        <p:spPr>
+          <a:xfrm>
+            <a:off x="1097280" y="822960"/>
+            <a:ext cx="6949440" cy="5212080"/>
+          </a:xfrm>
+          <a:prstGeom prst="rect">
+            <a:avLst/>
+          </a:prstGeom>
+        </p:spPr>
+      </p:pic>
+      <p:sp>
+        <p:nvSpPr>
+          <p:cNvPr id="6" name="TextBox 5"/>
+          <p:cNvSpPr txBox="1"/>
+          <p:nvPr/>
+        </p:nvSpPr>
+        <p:spPr>
+          <a:xfrm>
+            <a:off x="3543300" y="902970"/>
+            <a:ext cx="558800" cy="368300"/>
+          </a:xfrm>
+          <a:prstGeom prst="rect">
+            <a:avLst/>
+          </a:prstGeom>
+          <a:noFill/>
+        </p:spPr>
+        <p:txBody>
+          <a:bodyPr wrap="square" rtlCol="0">
+            <a:spAutoFit/>
+          </a:bodyPr>
+          <a:lstStyle/>
+          <a:p>
+            <a:pPr algn="ctr"/>
+            <a:r>
+              <a:rPr lang="en-US" dirty="0" smtClean="0"/>
+              <a:t>***</a:t>
+            </a:r>
+            <a:endParaRPr lang="en-US" dirty="0"/>
+          </a:p>
+        </p:txBody>
+      </p:sp>
+      <p:grpSp>
+        <p:nvGrpSpPr>
+          <p:cNvPr id="67" name="Group 66"/>
+          <p:cNvGrpSpPr/>
+          <p:nvPr/>
+        </p:nvGrpSpPr>
+        <p:grpSpPr>
+          <a:xfrm>
+            <a:off x="3194050" y="2514600"/>
+            <a:ext cx="1106632" cy="374650"/>
+            <a:chOff x="3206750" y="2590800"/>
+            <a:chExt cx="1106632" cy="374650"/>
+          </a:xfrm>
+        </p:grpSpPr>
+        <p:sp>
+          <p:nvSpPr>
+            <p:cNvPr id="7" name="TextBox 6"/>
+            <p:cNvSpPr txBox="1"/>
+            <p:nvPr/>
+          </p:nvSpPr>
+          <p:spPr>
+            <a:xfrm>
+              <a:off x="3733800" y="2590800"/>
+              <a:ext cx="558800" cy="368300"/>
+            </a:xfrm>
+            <a:prstGeom prst="rect">
+              <a:avLst/>
+            </a:prstGeom>
+            <a:noFill/>
+          </p:spPr>
+          <p:txBody>
+            <a:bodyPr wrap="square" rtlCol="0">
+              <a:spAutoFit/>
+            </a:bodyPr>
+            <a:lstStyle/>
+            <a:p>
+              <a:pPr algn="ctr"/>
+              <a:r>
+                <a:rPr lang="en-US" dirty="0" smtClean="0"/>
+                <a:t>**</a:t>
+              </a:r>
+              <a:endParaRPr lang="en-US" dirty="0"/>
+            </a:p>
+          </p:txBody>
+        </p:sp>
+        <p:grpSp>
+          <p:nvGrpSpPr>
+            <p:cNvPr id="11" name="Group 10"/>
+            <p:cNvGrpSpPr/>
+            <p:nvPr/>
+          </p:nvGrpSpPr>
+          <p:grpSpPr>
+            <a:xfrm>
+              <a:off x="3674918" y="2812413"/>
+              <a:ext cx="638464" cy="58603"/>
+              <a:chOff x="1238250" y="1087831"/>
+              <a:chExt cx="1280160" cy="115934"/>
+            </a:xfrm>
+          </p:grpSpPr>
+          <p:cxnSp>
+            <p:nvCxnSpPr>
+              <p:cNvPr id="8" name="Straight Connector 7"/>
+              <p:cNvCxnSpPr/>
+              <p:nvPr/>
+            </p:nvCxnSpPr>
+            <p:spPr>
+              <a:xfrm>
+                <a:off x="1238250" y="1089102"/>
+                <a:ext cx="0" cy="114663"/>
+              </a:xfrm>
+              <a:prstGeom prst="line">
+                <a:avLst/>
+              </a:prstGeom>
+              <a:ln w="12700">
+                <a:solidFill>
+                  <a:schemeClr val="tx1"/>
+                </a:solidFill>
+              </a:ln>
+            </p:spPr>
+            <p:style>
+              <a:lnRef idx="1">
+                <a:schemeClr val="accent1"/>
+              </a:lnRef>
+              <a:fillRef idx="0">
+                <a:schemeClr val="accent1"/>
+              </a:fillRef>
+              <a:effectRef idx="0">
+                <a:schemeClr val="accent1"/>
+              </a:effectRef>
+              <a:fontRef idx="minor">
+                <a:schemeClr val="tx1"/>
+              </a:fontRef>
+            </p:style>
+          </p:cxnSp>
+          <p:cxnSp>
+            <p:nvCxnSpPr>
+              <p:cNvPr id="9" name="Straight Connector 8"/>
+              <p:cNvCxnSpPr/>
+              <p:nvPr/>
+            </p:nvCxnSpPr>
+            <p:spPr>
+              <a:xfrm>
+                <a:off x="2518410" y="1087831"/>
+                <a:ext cx="0" cy="114663"/>
+              </a:xfrm>
+              <a:prstGeom prst="line">
+                <a:avLst/>
+              </a:prstGeom>
+              <a:ln w="12700">
+                <a:solidFill>
+                  <a:schemeClr val="tx1"/>
+                </a:solidFill>
+              </a:ln>
+            </p:spPr>
+            <p:style>
+              <a:lnRef idx="1">
+                <a:schemeClr val="accent1"/>
+              </a:lnRef>
+              <a:fillRef idx="0">
+                <a:schemeClr val="accent1"/>
+              </a:fillRef>
+              <a:effectRef idx="0">
+                <a:schemeClr val="accent1"/>
+              </a:effectRef>
+              <a:fontRef idx="minor">
+                <a:schemeClr val="tx1"/>
+              </a:fontRef>
+            </p:style>
+          </p:cxnSp>
+          <p:cxnSp>
+            <p:nvCxnSpPr>
+              <p:cNvPr id="10" name="Straight Connector 9"/>
+              <p:cNvCxnSpPr/>
+              <p:nvPr/>
+            </p:nvCxnSpPr>
+            <p:spPr>
+              <a:xfrm>
+                <a:off x="1238250" y="1093045"/>
+                <a:ext cx="1280160" cy="0"/>
+              </a:xfrm>
+              <a:prstGeom prst="line">
+                <a:avLst/>
+              </a:prstGeom>
+              <a:ln w="12700">
+                <a:solidFill>
+                  <a:schemeClr val="tx1"/>
+                </a:solidFill>
+              </a:ln>
+            </p:spPr>
+            <p:style>
+              <a:lnRef idx="1">
+                <a:schemeClr val="accent1"/>
+              </a:lnRef>
+              <a:fillRef idx="0">
+                <a:schemeClr val="accent1"/>
+              </a:fillRef>
+              <a:effectRef idx="0">
+                <a:schemeClr val="accent1"/>
+              </a:effectRef>
+              <a:fontRef idx="minor">
+                <a:schemeClr val="tx1"/>
+              </a:fontRef>
+            </p:style>
+          </p:cxnSp>
+        </p:grpSp>
+        <p:grpSp>
+          <p:nvGrpSpPr>
+            <p:cNvPr id="19" name="Group 18"/>
+            <p:cNvGrpSpPr/>
+            <p:nvPr/>
+          </p:nvGrpSpPr>
+          <p:grpSpPr>
+            <a:xfrm>
+              <a:off x="3674918" y="2850513"/>
+              <a:ext cx="319232" cy="58603"/>
+              <a:chOff x="1238250" y="1087831"/>
+              <a:chExt cx="1280160" cy="115934"/>
+            </a:xfrm>
+          </p:grpSpPr>
+          <p:cxnSp>
+            <p:nvCxnSpPr>
+              <p:cNvPr id="20" name="Straight Connector 19"/>
+              <p:cNvCxnSpPr/>
+              <p:nvPr/>
+            </p:nvCxnSpPr>
+            <p:spPr>
+              <a:xfrm>
+                <a:off x="1238250" y="1089102"/>
+                <a:ext cx="0" cy="114663"/>
+              </a:xfrm>
+              <a:prstGeom prst="line">
+                <a:avLst/>
+              </a:prstGeom>
+              <a:ln w="12700">
+                <a:solidFill>
+                  <a:schemeClr val="tx1"/>
+                </a:solidFill>
+              </a:ln>
+            </p:spPr>
+            <p:style>
+              <a:lnRef idx="1">
+                <a:schemeClr val="accent1"/>
+              </a:lnRef>
+              <a:fillRef idx="0">
+                <a:schemeClr val="accent1"/>
+              </a:fillRef>
+              <a:effectRef idx="0">
+                <a:schemeClr val="accent1"/>
+              </a:effectRef>
+              <a:fontRef idx="minor">
+                <a:schemeClr val="tx1"/>
+              </a:fontRef>
+            </p:style>
+          </p:cxnSp>
+          <p:cxnSp>
+            <p:nvCxnSpPr>
+              <p:cNvPr id="21" name="Straight Connector 20"/>
+              <p:cNvCxnSpPr/>
+              <p:nvPr/>
+            </p:nvCxnSpPr>
+            <p:spPr>
+              <a:xfrm>
+                <a:off x="2518410" y="1087831"/>
+                <a:ext cx="0" cy="114663"/>
+              </a:xfrm>
+              <a:prstGeom prst="line">
+                <a:avLst/>
+              </a:prstGeom>
+              <a:ln w="12700">
+                <a:solidFill>
+                  <a:schemeClr val="tx1"/>
+                </a:solidFill>
+              </a:ln>
+            </p:spPr>
+            <p:style>
+              <a:lnRef idx="1">
+                <a:schemeClr val="accent1"/>
+              </a:lnRef>
+              <a:fillRef idx="0">
+                <a:schemeClr val="accent1"/>
+              </a:fillRef>
+              <a:effectRef idx="0">
+                <a:schemeClr val="accent1"/>
+              </a:effectRef>
+              <a:fontRef idx="minor">
+                <a:schemeClr val="tx1"/>
+              </a:fontRef>
+            </p:style>
+          </p:cxnSp>
+          <p:cxnSp>
+            <p:nvCxnSpPr>
+              <p:cNvPr id="22" name="Straight Connector 21"/>
+              <p:cNvCxnSpPr/>
+              <p:nvPr/>
+            </p:nvCxnSpPr>
+            <p:spPr>
+              <a:xfrm>
+                <a:off x="1238250" y="1093045"/>
+                <a:ext cx="1280160" cy="0"/>
+              </a:xfrm>
+              <a:prstGeom prst="line">
+                <a:avLst/>
+              </a:prstGeom>
+              <a:ln w="12700">
+                <a:solidFill>
+                  <a:schemeClr val="tx1"/>
+                </a:solidFill>
+              </a:ln>
+            </p:spPr>
+            <p:style>
+              <a:lnRef idx="1">
+                <a:schemeClr val="accent1"/>
+              </a:lnRef>
+              <a:fillRef idx="0">
+                <a:schemeClr val="accent1"/>
+              </a:fillRef>
+              <a:effectRef idx="0">
+                <a:schemeClr val="accent1"/>
+              </a:effectRef>
+              <a:fontRef idx="minor">
+                <a:schemeClr val="tx1"/>
+              </a:fontRef>
+            </p:style>
+          </p:cxnSp>
+        </p:grpSp>
+        <p:grpSp>
+          <p:nvGrpSpPr>
+            <p:cNvPr id="23" name="Group 22"/>
+            <p:cNvGrpSpPr/>
+            <p:nvPr/>
+          </p:nvGrpSpPr>
+          <p:grpSpPr>
+            <a:xfrm>
+              <a:off x="3338447" y="2806063"/>
+              <a:ext cx="290211" cy="58603"/>
+              <a:chOff x="1238250" y="1087831"/>
+              <a:chExt cx="1280160" cy="115934"/>
+            </a:xfrm>
+          </p:grpSpPr>
+          <p:cxnSp>
+            <p:nvCxnSpPr>
+              <p:cNvPr id="24" name="Straight Connector 23"/>
+              <p:cNvCxnSpPr/>
+              <p:nvPr/>
+            </p:nvCxnSpPr>
+            <p:spPr>
+              <a:xfrm>
+                <a:off x="1238250" y="1089102"/>
+                <a:ext cx="0" cy="114663"/>
+              </a:xfrm>
+              <a:prstGeom prst="line">
+                <a:avLst/>
+              </a:prstGeom>
+              <a:ln w="12700">
+                <a:solidFill>
+                  <a:schemeClr val="tx1"/>
+                </a:solidFill>
+              </a:ln>
+            </p:spPr>
+            <p:style>
+              <a:lnRef idx="1">
+                <a:schemeClr val="accent1"/>
+              </a:lnRef>
+              <a:fillRef idx="0">
+                <a:schemeClr val="accent1"/>
+              </a:fillRef>
+              <a:effectRef idx="0">
+                <a:schemeClr val="accent1"/>
+              </a:effectRef>
+              <a:fontRef idx="minor">
+                <a:schemeClr val="tx1"/>
+              </a:fontRef>
+            </p:style>
+          </p:cxnSp>
+          <p:cxnSp>
+            <p:nvCxnSpPr>
+              <p:cNvPr id="25" name="Straight Connector 24"/>
+              <p:cNvCxnSpPr/>
+              <p:nvPr/>
+            </p:nvCxnSpPr>
+            <p:spPr>
+              <a:xfrm>
+                <a:off x="2518410" y="1087831"/>
+                <a:ext cx="0" cy="114663"/>
+              </a:xfrm>
+              <a:prstGeom prst="line">
+                <a:avLst/>
+              </a:prstGeom>
+              <a:ln w="12700">
+                <a:solidFill>
+                  <a:schemeClr val="tx1"/>
+                </a:solidFill>
+              </a:ln>
+            </p:spPr>
+            <p:style>
+              <a:lnRef idx="1">
+                <a:schemeClr val="accent1"/>
+              </a:lnRef>
+              <a:fillRef idx="0">
+                <a:schemeClr val="accent1"/>
+              </a:fillRef>
+              <a:effectRef idx="0">
+                <a:schemeClr val="accent1"/>
+              </a:effectRef>
+              <a:fontRef idx="minor">
+                <a:schemeClr val="tx1"/>
+              </a:fontRef>
+            </p:style>
+          </p:cxnSp>
+          <p:cxnSp>
+            <p:nvCxnSpPr>
+              <p:cNvPr id="26" name="Straight Connector 25"/>
+              <p:cNvCxnSpPr/>
+              <p:nvPr/>
+            </p:nvCxnSpPr>
+            <p:spPr>
+              <a:xfrm>
+                <a:off x="1238250" y="1093045"/>
+                <a:ext cx="1280160" cy="0"/>
+              </a:xfrm>
+              <a:prstGeom prst="line">
+                <a:avLst/>
+              </a:prstGeom>
+              <a:ln w="12700">
+                <a:solidFill>
+                  <a:schemeClr val="tx1"/>
+                </a:solidFill>
+              </a:ln>
+            </p:spPr>
+            <p:style>
+              <a:lnRef idx="1">
+                <a:schemeClr val="accent1"/>
+              </a:lnRef>
+              <a:fillRef idx="0">
+                <a:schemeClr val="accent1"/>
+              </a:fillRef>
+              <a:effectRef idx="0">
+                <a:schemeClr val="accent1"/>
+              </a:effectRef>
+              <a:fontRef idx="minor">
+                <a:schemeClr val="tx1"/>
+              </a:fontRef>
+            </p:style>
+          </p:cxnSp>
+        </p:grpSp>
+        <p:sp>
+          <p:nvSpPr>
+            <p:cNvPr id="27" name="TextBox 26"/>
+            <p:cNvSpPr txBox="1"/>
+            <p:nvPr/>
+          </p:nvSpPr>
+          <p:spPr>
+            <a:xfrm>
+              <a:off x="3206750" y="2597150"/>
+              <a:ext cx="558800" cy="368300"/>
+            </a:xfrm>
+            <a:prstGeom prst="rect">
+              <a:avLst/>
+            </a:prstGeom>
+            <a:noFill/>
+          </p:spPr>
+          <p:txBody>
+            <a:bodyPr wrap="square" rtlCol="0">
+              <a:spAutoFit/>
+            </a:bodyPr>
+            <a:lstStyle/>
+            <a:p>
+              <a:pPr algn="ctr"/>
+              <a:r>
+                <a:rPr lang="en-US" dirty="0" smtClean="0"/>
+                <a:t>**</a:t>
+              </a:r>
+              <a:endParaRPr lang="en-US" dirty="0"/>
+            </a:p>
+          </p:txBody>
+        </p:sp>
+      </p:grpSp>
+      <p:grpSp>
+        <p:nvGrpSpPr>
+          <p:cNvPr id="68" name="Group 67"/>
+          <p:cNvGrpSpPr/>
+          <p:nvPr/>
+        </p:nvGrpSpPr>
+        <p:grpSpPr>
+          <a:xfrm>
+            <a:off x="4984750" y="2533824"/>
+            <a:ext cx="996950" cy="374650"/>
+            <a:chOff x="4984750" y="2584624"/>
+            <a:chExt cx="996950" cy="374650"/>
+          </a:xfrm>
+        </p:grpSpPr>
+        <p:sp>
+          <p:nvSpPr>
+            <p:cNvPr id="28" name="TextBox 27"/>
+            <p:cNvSpPr txBox="1"/>
+            <p:nvPr/>
+          </p:nvSpPr>
+          <p:spPr>
+            <a:xfrm>
+              <a:off x="4984750" y="2584624"/>
+              <a:ext cx="558800" cy="368300"/>
+            </a:xfrm>
+            <a:prstGeom prst="rect">
+              <a:avLst/>
+            </a:prstGeom>
+            <a:noFill/>
+          </p:spPr>
+          <p:txBody>
+            <a:bodyPr wrap="square" rtlCol="0">
+              <a:spAutoFit/>
+            </a:bodyPr>
+            <a:lstStyle/>
+            <a:p>
+              <a:pPr algn="ctr"/>
+              <a:r>
+                <a:rPr lang="en-US" dirty="0" smtClean="0"/>
+                <a:t>**</a:t>
+              </a:r>
+              <a:endParaRPr lang="en-US" dirty="0"/>
+            </a:p>
+          </p:txBody>
+        </p:sp>
+        <p:grpSp>
+          <p:nvGrpSpPr>
+            <p:cNvPr id="29" name="Group 28"/>
+            <p:cNvGrpSpPr/>
+            <p:nvPr/>
+          </p:nvGrpSpPr>
+          <p:grpSpPr>
+            <a:xfrm>
+              <a:off x="5039761" y="2787187"/>
+              <a:ext cx="436079" cy="58603"/>
+              <a:chOff x="1238250" y="1087831"/>
+              <a:chExt cx="1280160" cy="115934"/>
+            </a:xfrm>
+          </p:grpSpPr>
+          <p:cxnSp>
+            <p:nvCxnSpPr>
+              <p:cNvPr id="30" name="Straight Connector 29"/>
+              <p:cNvCxnSpPr/>
+              <p:nvPr/>
+            </p:nvCxnSpPr>
+            <p:spPr>
+              <a:xfrm>
+                <a:off x="1238250" y="1089102"/>
+                <a:ext cx="0" cy="114663"/>
+              </a:xfrm>
+              <a:prstGeom prst="line">
+                <a:avLst/>
+              </a:prstGeom>
+              <a:ln w="12700">
+                <a:solidFill>
+                  <a:schemeClr val="tx1"/>
+                </a:solidFill>
+              </a:ln>
+            </p:spPr>
+            <p:style>
+              <a:lnRef idx="1">
+                <a:schemeClr val="accent1"/>
+              </a:lnRef>
+              <a:fillRef idx="0">
+                <a:schemeClr val="accent1"/>
+              </a:fillRef>
+              <a:effectRef idx="0">
+                <a:schemeClr val="accent1"/>
+              </a:effectRef>
+              <a:fontRef idx="minor">
+                <a:schemeClr val="tx1"/>
+              </a:fontRef>
+            </p:style>
+          </p:cxnSp>
+          <p:cxnSp>
+            <p:nvCxnSpPr>
+              <p:cNvPr id="31" name="Straight Connector 30"/>
+              <p:cNvCxnSpPr/>
+              <p:nvPr/>
+            </p:nvCxnSpPr>
+            <p:spPr>
+              <a:xfrm>
+                <a:off x="2518410" y="1087831"/>
+                <a:ext cx="0" cy="114663"/>
+              </a:xfrm>
+              <a:prstGeom prst="line">
+                <a:avLst/>
+              </a:prstGeom>
+              <a:ln w="12700">
+                <a:solidFill>
+                  <a:schemeClr val="tx1"/>
+                </a:solidFill>
+              </a:ln>
+            </p:spPr>
+            <p:style>
+              <a:lnRef idx="1">
+                <a:schemeClr val="accent1"/>
+              </a:lnRef>
+              <a:fillRef idx="0">
+                <a:schemeClr val="accent1"/>
+              </a:fillRef>
+              <a:effectRef idx="0">
+                <a:schemeClr val="accent1"/>
+              </a:effectRef>
+              <a:fontRef idx="minor">
+                <a:schemeClr val="tx1"/>
+              </a:fontRef>
+            </p:style>
+          </p:cxnSp>
+          <p:cxnSp>
+            <p:nvCxnSpPr>
+              <p:cNvPr id="32" name="Straight Connector 31"/>
+              <p:cNvCxnSpPr/>
+              <p:nvPr/>
+            </p:nvCxnSpPr>
+            <p:spPr>
+              <a:xfrm>
+                <a:off x="1238250" y="1093045"/>
+                <a:ext cx="1280160" cy="0"/>
+              </a:xfrm>
+              <a:prstGeom prst="line">
+                <a:avLst/>
+              </a:prstGeom>
+              <a:ln w="12700">
+                <a:solidFill>
+                  <a:schemeClr val="tx1"/>
+                </a:solidFill>
+              </a:ln>
+            </p:spPr>
+            <p:style>
+              <a:lnRef idx="1">
+                <a:schemeClr val="accent1"/>
+              </a:lnRef>
+              <a:fillRef idx="0">
+                <a:schemeClr val="accent1"/>
+              </a:fillRef>
+              <a:effectRef idx="0">
+                <a:schemeClr val="accent1"/>
+              </a:effectRef>
+              <a:fontRef idx="minor">
+                <a:schemeClr val="tx1"/>
+              </a:fontRef>
+            </p:style>
+          </p:cxnSp>
+        </p:grpSp>
+        <p:grpSp>
+          <p:nvGrpSpPr>
+            <p:cNvPr id="34" name="Group 33"/>
+            <p:cNvGrpSpPr/>
+            <p:nvPr/>
+          </p:nvGrpSpPr>
+          <p:grpSpPr>
+            <a:xfrm>
+              <a:off x="5495662" y="2786202"/>
+              <a:ext cx="396435" cy="58603"/>
+              <a:chOff x="1238250" y="1087831"/>
+              <a:chExt cx="1280160" cy="115934"/>
+            </a:xfrm>
+          </p:grpSpPr>
+          <p:cxnSp>
+            <p:nvCxnSpPr>
+              <p:cNvPr id="35" name="Straight Connector 34"/>
+              <p:cNvCxnSpPr/>
+              <p:nvPr/>
+            </p:nvCxnSpPr>
+            <p:spPr>
+              <a:xfrm>
+                <a:off x="1238250" y="1089102"/>
+                <a:ext cx="0" cy="114663"/>
+              </a:xfrm>
+              <a:prstGeom prst="line">
+                <a:avLst/>
+              </a:prstGeom>
+              <a:ln w="12700">
+                <a:solidFill>
+                  <a:schemeClr val="tx1"/>
+                </a:solidFill>
+              </a:ln>
+            </p:spPr>
+            <p:style>
+              <a:lnRef idx="1">
+                <a:schemeClr val="accent1"/>
+              </a:lnRef>
+              <a:fillRef idx="0">
+                <a:schemeClr val="accent1"/>
+              </a:fillRef>
+              <a:effectRef idx="0">
+                <a:schemeClr val="accent1"/>
+              </a:effectRef>
+              <a:fontRef idx="minor">
+                <a:schemeClr val="tx1"/>
+              </a:fontRef>
+            </p:style>
+          </p:cxnSp>
+          <p:cxnSp>
+            <p:nvCxnSpPr>
+              <p:cNvPr id="36" name="Straight Connector 35"/>
+              <p:cNvCxnSpPr/>
+              <p:nvPr/>
+            </p:nvCxnSpPr>
+            <p:spPr>
+              <a:xfrm>
+                <a:off x="2518410" y="1087831"/>
+                <a:ext cx="0" cy="114663"/>
+              </a:xfrm>
+              <a:prstGeom prst="line">
+                <a:avLst/>
+              </a:prstGeom>
+              <a:ln w="12700">
+                <a:solidFill>
+                  <a:schemeClr val="tx1"/>
+                </a:solidFill>
+              </a:ln>
+            </p:spPr>
+            <p:style>
+              <a:lnRef idx="1">
+                <a:schemeClr val="accent1"/>
+              </a:lnRef>
+              <a:fillRef idx="0">
+                <a:schemeClr val="accent1"/>
+              </a:fillRef>
+              <a:effectRef idx="0">
+                <a:schemeClr val="accent1"/>
+              </a:effectRef>
+              <a:fontRef idx="minor">
+                <a:schemeClr val="tx1"/>
+              </a:fontRef>
+            </p:style>
+          </p:cxnSp>
+          <p:cxnSp>
+            <p:nvCxnSpPr>
+              <p:cNvPr id="37" name="Straight Connector 36"/>
+              <p:cNvCxnSpPr/>
+              <p:nvPr/>
+            </p:nvCxnSpPr>
+            <p:spPr>
+              <a:xfrm>
+                <a:off x="1238250" y="1093045"/>
+                <a:ext cx="1280160" cy="0"/>
+              </a:xfrm>
+              <a:prstGeom prst="line">
+                <a:avLst/>
+              </a:prstGeom>
+              <a:ln w="12700">
+                <a:solidFill>
+                  <a:schemeClr val="tx1"/>
+                </a:solidFill>
+              </a:ln>
+            </p:spPr>
+            <p:style>
+              <a:lnRef idx="1">
+                <a:schemeClr val="accent1"/>
+              </a:lnRef>
+              <a:fillRef idx="0">
+                <a:schemeClr val="accent1"/>
+              </a:fillRef>
+              <a:effectRef idx="0">
+                <a:schemeClr val="accent1"/>
+              </a:effectRef>
+              <a:fontRef idx="minor">
+                <a:schemeClr val="tx1"/>
+              </a:fontRef>
+            </p:style>
+          </p:cxnSp>
+        </p:grpSp>
+        <p:sp>
+          <p:nvSpPr>
+            <p:cNvPr id="38" name="TextBox 37"/>
+            <p:cNvSpPr txBox="1"/>
+            <p:nvPr/>
+          </p:nvSpPr>
+          <p:spPr>
+            <a:xfrm>
+              <a:off x="5422900" y="2590974"/>
+              <a:ext cx="558800" cy="368300"/>
+            </a:xfrm>
+            <a:prstGeom prst="rect">
+              <a:avLst/>
+            </a:prstGeom>
+            <a:noFill/>
+          </p:spPr>
+          <p:txBody>
+            <a:bodyPr wrap="square" rtlCol="0">
+              <a:spAutoFit/>
+            </a:bodyPr>
+            <a:lstStyle/>
+            <a:p>
+              <a:pPr algn="ctr"/>
+              <a:r>
+                <a:rPr lang="en-US" dirty="0" smtClean="0"/>
+                <a:t>**</a:t>
+              </a:r>
+              <a:endParaRPr lang="en-US" dirty="0"/>
+            </a:p>
+          </p:txBody>
+        </p:sp>
+      </p:grpSp>
+      <p:sp>
+        <p:nvSpPr>
+          <p:cNvPr id="39" name="TextBox 38"/>
+          <p:cNvSpPr txBox="1"/>
+          <p:nvPr/>
+        </p:nvSpPr>
+        <p:spPr>
+          <a:xfrm>
+            <a:off x="6527800" y="2584624"/>
+            <a:ext cx="558800" cy="368300"/>
+          </a:xfrm>
+          <a:prstGeom prst="rect">
+            <a:avLst/>
+          </a:prstGeom>
+          <a:noFill/>
+        </p:spPr>
+        <p:txBody>
+          <a:bodyPr wrap="square" rtlCol="0">
+            <a:spAutoFit/>
+          </a:bodyPr>
+          <a:lstStyle/>
+          <a:p>
+            <a:pPr algn="ctr"/>
+            <a:r>
+              <a:rPr lang="en-US" dirty="0" smtClean="0"/>
+              <a:t>*</a:t>
+            </a:r>
+            <a:endParaRPr lang="en-US" dirty="0"/>
+          </a:p>
+        </p:txBody>
+      </p:sp>
+      <p:grpSp>
+        <p:nvGrpSpPr>
+          <p:cNvPr id="40" name="Group 39"/>
+          <p:cNvGrpSpPr/>
+          <p:nvPr/>
+        </p:nvGrpSpPr>
+        <p:grpSpPr>
+          <a:xfrm>
+            <a:off x="6633353" y="2799887"/>
+            <a:ext cx="360395" cy="58603"/>
+            <a:chOff x="1238250" y="1087831"/>
+            <a:chExt cx="1280160" cy="115934"/>
+          </a:xfrm>
+        </p:grpSpPr>
+        <p:cxnSp>
+          <p:nvCxnSpPr>
+            <p:cNvPr id="41" name="Straight Connector 40"/>
+            <p:cNvCxnSpPr/>
+            <p:nvPr/>
+          </p:nvCxnSpPr>
+          <p:spPr>
+            <a:xfrm>
+              <a:off x="1238250" y="1089102"/>
+              <a:ext cx="0" cy="114663"/>
+            </a:xfrm>
+            <a:prstGeom prst="line">
+              <a:avLst/>
+            </a:prstGeom>
+            <a:ln w="12700">
+              <a:solidFill>
+                <a:schemeClr val="tx1"/>
+              </a:solidFill>
+            </a:ln>
+          </p:spPr>
+          <p:style>
+            <a:lnRef idx="1">
+              <a:schemeClr val="accent1"/>
+            </a:lnRef>
+            <a:fillRef idx="0">
+              <a:schemeClr val="accent1"/>
+            </a:fillRef>
+            <a:effectRef idx="0">
+              <a:schemeClr val="accent1"/>
+            </a:effectRef>
+            <a:fontRef idx="minor">
+              <a:schemeClr val="tx1"/>
+            </a:fontRef>
+          </p:style>
+        </p:cxnSp>
+        <p:cxnSp>
+          <p:nvCxnSpPr>
+            <p:cNvPr id="42" name="Straight Connector 41"/>
+            <p:cNvCxnSpPr/>
+            <p:nvPr/>
+          </p:nvCxnSpPr>
+          <p:spPr>
+            <a:xfrm>
+              <a:off x="2518410" y="1087831"/>
+              <a:ext cx="0" cy="114663"/>
+            </a:xfrm>
+            <a:prstGeom prst="line">
+              <a:avLst/>
+            </a:prstGeom>
+            <a:ln w="12700">
+              <a:solidFill>
+                <a:schemeClr val="tx1"/>
+              </a:solidFill>
+            </a:ln>
+          </p:spPr>
+          <p:style>
+            <a:lnRef idx="1">
+              <a:schemeClr val="accent1"/>
+            </a:lnRef>
+            <a:fillRef idx="0">
+              <a:schemeClr val="accent1"/>
+            </a:fillRef>
+            <a:effectRef idx="0">
+              <a:schemeClr val="accent1"/>
+            </a:effectRef>
+            <a:fontRef idx="minor">
+              <a:schemeClr val="tx1"/>
+            </a:fontRef>
+          </p:style>
+        </p:cxnSp>
+        <p:cxnSp>
+          <p:nvCxnSpPr>
+            <p:cNvPr id="43" name="Straight Connector 42"/>
+            <p:cNvCxnSpPr/>
+            <p:nvPr/>
+          </p:nvCxnSpPr>
+          <p:spPr>
+            <a:xfrm>
+              <a:off x="1238250" y="1093045"/>
+              <a:ext cx="1280160" cy="0"/>
+            </a:xfrm>
+            <a:prstGeom prst="line">
+              <a:avLst/>
+            </a:prstGeom>
+            <a:ln w="12700">
+              <a:solidFill>
+                <a:schemeClr val="tx1"/>
+              </a:solidFill>
+            </a:ln>
+          </p:spPr>
+          <p:style>
+            <a:lnRef idx="1">
+              <a:schemeClr val="accent1"/>
+            </a:lnRef>
+            <a:fillRef idx="0">
+              <a:schemeClr val="accent1"/>
+            </a:fillRef>
+            <a:effectRef idx="0">
+              <a:schemeClr val="accent1"/>
+            </a:effectRef>
+            <a:fontRef idx="minor">
+              <a:schemeClr val="tx1"/>
+            </a:fontRef>
+          </p:style>
+        </p:cxnSp>
+      </p:grpSp>
+      <p:sp>
+        <p:nvSpPr>
+          <p:cNvPr id="44" name="TextBox 43"/>
+          <p:cNvSpPr txBox="1"/>
+          <p:nvPr/>
+        </p:nvSpPr>
+        <p:spPr>
+          <a:xfrm>
+            <a:off x="6777848" y="2343329"/>
+            <a:ext cx="558800" cy="368300"/>
+          </a:xfrm>
+          <a:prstGeom prst="rect">
+            <a:avLst/>
+          </a:prstGeom>
+          <a:noFill/>
+        </p:spPr>
+        <p:txBody>
+          <a:bodyPr wrap="square" rtlCol="0">
+            <a:spAutoFit/>
+          </a:bodyPr>
+          <a:lstStyle/>
+          <a:p>
+            <a:pPr algn="ctr"/>
+            <a:r>
+              <a:rPr lang="en-US" dirty="0" smtClean="0"/>
+              <a:t>***</a:t>
+            </a:r>
+            <a:endParaRPr lang="en-US" dirty="0"/>
+          </a:p>
+        </p:txBody>
+      </p:sp>
+      <p:grpSp>
+        <p:nvGrpSpPr>
+          <p:cNvPr id="45" name="Group 44"/>
+          <p:cNvGrpSpPr/>
+          <p:nvPr/>
+        </p:nvGrpSpPr>
+        <p:grpSpPr>
+          <a:xfrm>
+            <a:off x="6972301" y="2679242"/>
+            <a:ext cx="360395" cy="58603"/>
+            <a:chOff x="1238250" y="1087831"/>
+            <a:chExt cx="1280160" cy="115934"/>
+          </a:xfrm>
+        </p:grpSpPr>
+        <p:cxnSp>
+          <p:nvCxnSpPr>
+            <p:cNvPr id="46" name="Straight Connector 45"/>
+            <p:cNvCxnSpPr/>
+            <p:nvPr/>
+          </p:nvCxnSpPr>
+          <p:spPr>
+            <a:xfrm>
+              <a:off x="1238250" y="1089102"/>
+              <a:ext cx="0" cy="114663"/>
+            </a:xfrm>
+            <a:prstGeom prst="line">
+              <a:avLst/>
+            </a:prstGeom>
+            <a:ln w="12700">
+              <a:solidFill>
+                <a:schemeClr val="tx1"/>
+              </a:solidFill>
+            </a:ln>
+          </p:spPr>
+          <p:style>
+            <a:lnRef idx="1">
+              <a:schemeClr val="accent1"/>
+            </a:lnRef>
+            <a:fillRef idx="0">
+              <a:schemeClr val="accent1"/>
+            </a:fillRef>
+            <a:effectRef idx="0">
+              <a:schemeClr val="accent1"/>
+            </a:effectRef>
+            <a:fontRef idx="minor">
+              <a:schemeClr val="tx1"/>
+            </a:fontRef>
+          </p:style>
+        </p:cxnSp>
+        <p:cxnSp>
+          <p:nvCxnSpPr>
+            <p:cNvPr id="47" name="Straight Connector 46"/>
+            <p:cNvCxnSpPr/>
+            <p:nvPr/>
+          </p:nvCxnSpPr>
+          <p:spPr>
+            <a:xfrm>
+              <a:off x="2518410" y="1087831"/>
+              <a:ext cx="0" cy="114663"/>
+            </a:xfrm>
+            <a:prstGeom prst="line">
+              <a:avLst/>
+            </a:prstGeom>
+            <a:ln w="12700">
+              <a:solidFill>
+                <a:schemeClr val="tx1"/>
+              </a:solidFill>
+            </a:ln>
+          </p:spPr>
+          <p:style>
+            <a:lnRef idx="1">
+              <a:schemeClr val="accent1"/>
+            </a:lnRef>
+            <a:fillRef idx="0">
+              <a:schemeClr val="accent1"/>
+            </a:fillRef>
+            <a:effectRef idx="0">
+              <a:schemeClr val="accent1"/>
+            </a:effectRef>
+            <a:fontRef idx="minor">
+              <a:schemeClr val="tx1"/>
+            </a:fontRef>
+          </p:style>
+        </p:cxnSp>
+        <p:cxnSp>
+          <p:nvCxnSpPr>
+            <p:cNvPr id="48" name="Straight Connector 47"/>
+            <p:cNvCxnSpPr/>
+            <p:nvPr/>
+          </p:nvCxnSpPr>
+          <p:spPr>
+            <a:xfrm>
+              <a:off x="1238250" y="1093045"/>
+              <a:ext cx="1280160" cy="0"/>
+            </a:xfrm>
+            <a:prstGeom prst="line">
+              <a:avLst/>
+            </a:prstGeom>
+            <a:ln w="12700">
+              <a:solidFill>
+                <a:schemeClr val="tx1"/>
+              </a:solidFill>
+            </a:ln>
+          </p:spPr>
+          <p:style>
+            <a:lnRef idx="1">
+              <a:schemeClr val="accent1"/>
+            </a:lnRef>
+            <a:fillRef idx="0">
+              <a:schemeClr val="accent1"/>
+            </a:fillRef>
+            <a:effectRef idx="0">
+              <a:schemeClr val="accent1"/>
+            </a:effectRef>
+            <a:fontRef idx="minor">
+              <a:schemeClr val="tx1"/>
+            </a:fontRef>
+          </p:style>
+        </p:cxnSp>
+      </p:grpSp>
+      <p:grpSp>
+        <p:nvGrpSpPr>
+          <p:cNvPr id="49" name="Group 48"/>
+          <p:cNvGrpSpPr/>
+          <p:nvPr/>
+        </p:nvGrpSpPr>
+        <p:grpSpPr>
+          <a:xfrm>
+            <a:off x="6629893" y="2641142"/>
+            <a:ext cx="702310" cy="58603"/>
+            <a:chOff x="1238250" y="1087831"/>
+            <a:chExt cx="1280160" cy="115934"/>
+          </a:xfrm>
+        </p:grpSpPr>
+        <p:cxnSp>
+          <p:nvCxnSpPr>
+            <p:cNvPr id="50" name="Straight Connector 49"/>
+            <p:cNvCxnSpPr/>
+            <p:nvPr/>
+          </p:nvCxnSpPr>
+          <p:spPr>
+            <a:xfrm>
+              <a:off x="1238250" y="1089102"/>
+              <a:ext cx="0" cy="114663"/>
+            </a:xfrm>
+            <a:prstGeom prst="line">
+              <a:avLst/>
+            </a:prstGeom>
+            <a:ln w="12700">
+              <a:solidFill>
+                <a:schemeClr val="tx1"/>
+              </a:solidFill>
+            </a:ln>
+          </p:spPr>
+          <p:style>
+            <a:lnRef idx="1">
+              <a:schemeClr val="accent1"/>
+            </a:lnRef>
+            <a:fillRef idx="0">
+              <a:schemeClr val="accent1"/>
+            </a:fillRef>
+            <a:effectRef idx="0">
+              <a:schemeClr val="accent1"/>
+            </a:effectRef>
+            <a:fontRef idx="minor">
+              <a:schemeClr val="tx1"/>
+            </a:fontRef>
+          </p:style>
+        </p:cxnSp>
+        <p:cxnSp>
+          <p:nvCxnSpPr>
+            <p:cNvPr id="51" name="Straight Connector 50"/>
+            <p:cNvCxnSpPr/>
+            <p:nvPr/>
+          </p:nvCxnSpPr>
+          <p:spPr>
+            <a:xfrm>
+              <a:off x="2518410" y="1087831"/>
+              <a:ext cx="0" cy="114663"/>
+            </a:xfrm>
+            <a:prstGeom prst="line">
+              <a:avLst/>
+            </a:prstGeom>
+            <a:ln w="12700">
+              <a:solidFill>
+                <a:schemeClr val="tx1"/>
+              </a:solidFill>
+            </a:ln>
+          </p:spPr>
+          <p:style>
+            <a:lnRef idx="1">
+              <a:schemeClr val="accent1"/>
+            </a:lnRef>
+            <a:fillRef idx="0">
+              <a:schemeClr val="accent1"/>
+            </a:fillRef>
+            <a:effectRef idx="0">
+              <a:schemeClr val="accent1"/>
+            </a:effectRef>
+            <a:fontRef idx="minor">
+              <a:schemeClr val="tx1"/>
+            </a:fontRef>
+          </p:style>
+        </p:cxnSp>
+        <p:cxnSp>
+          <p:nvCxnSpPr>
+            <p:cNvPr id="52" name="Straight Connector 51"/>
+            <p:cNvCxnSpPr/>
+            <p:nvPr/>
+          </p:nvCxnSpPr>
+          <p:spPr>
+            <a:xfrm>
+              <a:off x="1238250" y="1093045"/>
+              <a:ext cx="1280160" cy="0"/>
+            </a:xfrm>
+            <a:prstGeom prst="line">
+              <a:avLst/>
+            </a:prstGeom>
+            <a:ln w="12700">
+              <a:solidFill>
+                <a:schemeClr val="tx1"/>
+              </a:solidFill>
+            </a:ln>
+          </p:spPr>
+          <p:style>
+            <a:lnRef idx="1">
+              <a:schemeClr val="accent1"/>
+            </a:lnRef>
+            <a:fillRef idx="0">
+              <a:schemeClr val="accent1"/>
+            </a:fillRef>
+            <a:effectRef idx="0">
+              <a:schemeClr val="accent1"/>
+            </a:effectRef>
+            <a:fontRef idx="minor">
+              <a:schemeClr val="tx1"/>
+            </a:fontRef>
+          </p:style>
+        </p:cxnSp>
+      </p:grpSp>
+      <p:grpSp>
+        <p:nvGrpSpPr>
+          <p:cNvPr id="53" name="Group 52"/>
+          <p:cNvGrpSpPr/>
+          <p:nvPr/>
+        </p:nvGrpSpPr>
+        <p:grpSpPr>
+          <a:xfrm>
+            <a:off x="6632023" y="2553775"/>
+            <a:ext cx="981628" cy="67426"/>
+            <a:chOff x="1238250" y="1087831"/>
+            <a:chExt cx="1280160" cy="115934"/>
+          </a:xfrm>
+        </p:grpSpPr>
+        <p:cxnSp>
+          <p:nvCxnSpPr>
+            <p:cNvPr id="54" name="Straight Connector 53"/>
+            <p:cNvCxnSpPr/>
+            <p:nvPr/>
+          </p:nvCxnSpPr>
+          <p:spPr>
+            <a:xfrm>
+              <a:off x="1238250" y="1089102"/>
+              <a:ext cx="0" cy="114663"/>
+            </a:xfrm>
+            <a:prstGeom prst="line">
+              <a:avLst/>
+            </a:prstGeom>
+            <a:ln w="12700">
+              <a:solidFill>
+                <a:schemeClr val="tx1"/>
+              </a:solidFill>
+            </a:ln>
+          </p:spPr>
+          <p:style>
+            <a:lnRef idx="1">
+              <a:schemeClr val="accent1"/>
+            </a:lnRef>
+            <a:fillRef idx="0">
+              <a:schemeClr val="accent1"/>
+            </a:fillRef>
+            <a:effectRef idx="0">
+              <a:schemeClr val="accent1"/>
+            </a:effectRef>
+            <a:fontRef idx="minor">
+              <a:schemeClr val="tx1"/>
+            </a:fontRef>
+          </p:style>
+        </p:cxnSp>
+        <p:cxnSp>
+          <p:nvCxnSpPr>
+            <p:cNvPr id="55" name="Straight Connector 54"/>
+            <p:cNvCxnSpPr/>
+            <p:nvPr/>
+          </p:nvCxnSpPr>
+          <p:spPr>
+            <a:xfrm>
+              <a:off x="2518410" y="1087831"/>
+              <a:ext cx="0" cy="114663"/>
+            </a:xfrm>
+            <a:prstGeom prst="line">
+              <a:avLst/>
+            </a:prstGeom>
+            <a:ln w="12700">
+              <a:solidFill>
+                <a:schemeClr val="tx1"/>
+              </a:solidFill>
+            </a:ln>
+          </p:spPr>
+          <p:style>
+            <a:lnRef idx="1">
+              <a:schemeClr val="accent1"/>
+            </a:lnRef>
+            <a:fillRef idx="0">
+              <a:schemeClr val="accent1"/>
+            </a:fillRef>
+            <a:effectRef idx="0">
+              <a:schemeClr val="accent1"/>
+            </a:effectRef>
+            <a:fontRef idx="minor">
+              <a:schemeClr val="tx1"/>
+            </a:fontRef>
+          </p:style>
+        </p:cxnSp>
+        <p:cxnSp>
+          <p:nvCxnSpPr>
+            <p:cNvPr id="56" name="Straight Connector 55"/>
+            <p:cNvCxnSpPr/>
+            <p:nvPr/>
+          </p:nvCxnSpPr>
+          <p:spPr>
+            <a:xfrm>
+              <a:off x="1238250" y="1093045"/>
+              <a:ext cx="1280160" cy="0"/>
+            </a:xfrm>
+            <a:prstGeom prst="line">
+              <a:avLst/>
+            </a:prstGeom>
+            <a:ln w="12700">
+              <a:solidFill>
+                <a:schemeClr val="tx1"/>
+              </a:solidFill>
+            </a:ln>
+          </p:spPr>
+          <p:style>
+            <a:lnRef idx="1">
+              <a:schemeClr val="accent1"/>
+            </a:lnRef>
+            <a:fillRef idx="0">
+              <a:schemeClr val="accent1"/>
+            </a:fillRef>
+            <a:effectRef idx="0">
+              <a:schemeClr val="accent1"/>
+            </a:effectRef>
+            <a:fontRef idx="minor">
+              <a:schemeClr val="tx1"/>
+            </a:fontRef>
+          </p:style>
+        </p:cxnSp>
+      </p:grpSp>
+      <p:grpSp>
+        <p:nvGrpSpPr>
+          <p:cNvPr id="57" name="Group 56"/>
+          <p:cNvGrpSpPr/>
+          <p:nvPr/>
+        </p:nvGrpSpPr>
+        <p:grpSpPr>
+          <a:xfrm>
+            <a:off x="7328251" y="2730235"/>
+            <a:ext cx="360395" cy="58603"/>
+            <a:chOff x="1238250" y="1087831"/>
+            <a:chExt cx="1280160" cy="115934"/>
+          </a:xfrm>
+        </p:grpSpPr>
+        <p:cxnSp>
+          <p:nvCxnSpPr>
+            <p:cNvPr id="58" name="Straight Connector 57"/>
+            <p:cNvCxnSpPr/>
+            <p:nvPr/>
+          </p:nvCxnSpPr>
+          <p:spPr>
+            <a:xfrm>
+              <a:off x="1238250" y="1089102"/>
+              <a:ext cx="0" cy="114663"/>
+            </a:xfrm>
+            <a:prstGeom prst="line">
+              <a:avLst/>
+            </a:prstGeom>
+            <a:ln w="12700">
+              <a:solidFill>
+                <a:schemeClr val="tx1"/>
+              </a:solidFill>
+            </a:ln>
+          </p:spPr>
+          <p:style>
+            <a:lnRef idx="1">
+              <a:schemeClr val="accent1"/>
+            </a:lnRef>
+            <a:fillRef idx="0">
+              <a:schemeClr val="accent1"/>
+            </a:fillRef>
+            <a:effectRef idx="0">
+              <a:schemeClr val="accent1"/>
+            </a:effectRef>
+            <a:fontRef idx="minor">
+              <a:schemeClr val="tx1"/>
+            </a:fontRef>
+          </p:style>
+        </p:cxnSp>
+        <p:cxnSp>
+          <p:nvCxnSpPr>
+            <p:cNvPr id="59" name="Straight Connector 58"/>
+            <p:cNvCxnSpPr/>
+            <p:nvPr/>
+          </p:nvCxnSpPr>
+          <p:spPr>
+            <a:xfrm>
+              <a:off x="2518410" y="1087831"/>
+              <a:ext cx="0" cy="114663"/>
+            </a:xfrm>
+            <a:prstGeom prst="line">
+              <a:avLst/>
+            </a:prstGeom>
+            <a:ln w="12700">
+              <a:solidFill>
+                <a:schemeClr val="tx1"/>
+              </a:solidFill>
+            </a:ln>
+          </p:spPr>
+          <p:style>
+            <a:lnRef idx="1">
+              <a:schemeClr val="accent1"/>
+            </a:lnRef>
+            <a:fillRef idx="0">
+              <a:schemeClr val="accent1"/>
+            </a:fillRef>
+            <a:effectRef idx="0">
+              <a:schemeClr val="accent1"/>
+            </a:effectRef>
+            <a:fontRef idx="minor">
+              <a:schemeClr val="tx1"/>
+            </a:fontRef>
+          </p:style>
+        </p:cxnSp>
+        <p:cxnSp>
+          <p:nvCxnSpPr>
+            <p:cNvPr id="60" name="Straight Connector 59"/>
+            <p:cNvCxnSpPr/>
+            <p:nvPr/>
+          </p:nvCxnSpPr>
+          <p:spPr>
+            <a:xfrm>
+              <a:off x="1238250" y="1093045"/>
+              <a:ext cx="1280160" cy="0"/>
+            </a:xfrm>
+            <a:prstGeom prst="line">
+              <a:avLst/>
+            </a:prstGeom>
+            <a:ln w="12700">
+              <a:solidFill>
+                <a:schemeClr val="tx1"/>
+              </a:solidFill>
+            </a:ln>
+          </p:spPr>
+          <p:style>
+            <a:lnRef idx="1">
+              <a:schemeClr val="accent1"/>
+            </a:lnRef>
+            <a:fillRef idx="0">
+              <a:schemeClr val="accent1"/>
+            </a:fillRef>
+            <a:effectRef idx="0">
+              <a:schemeClr val="accent1"/>
+            </a:effectRef>
+            <a:fontRef idx="minor">
+              <a:schemeClr val="tx1"/>
+            </a:fontRef>
+          </p:style>
+        </p:cxnSp>
+      </p:grpSp>
+      <p:sp>
+        <p:nvSpPr>
+          <p:cNvPr id="61" name="TextBox 60"/>
+          <p:cNvSpPr txBox="1"/>
+          <p:nvPr/>
+        </p:nvSpPr>
+        <p:spPr>
+          <a:xfrm>
+            <a:off x="7247748" y="2527479"/>
+            <a:ext cx="558800" cy="368300"/>
+          </a:xfrm>
+          <a:prstGeom prst="rect">
+            <a:avLst/>
+          </a:prstGeom>
+          <a:noFill/>
+        </p:spPr>
+        <p:txBody>
+          <a:bodyPr wrap="square" rtlCol="0">
+            <a:spAutoFit/>
+          </a:bodyPr>
+          <a:lstStyle/>
+          <a:p>
+            <a:pPr algn="ctr"/>
+            <a:r>
+              <a:rPr lang="en-US" dirty="0" smtClean="0"/>
+              <a:t>**</a:t>
+            </a:r>
+            <a:endParaRPr lang="en-US" dirty="0"/>
+          </a:p>
+        </p:txBody>
+      </p:sp>
+      <p:grpSp>
+        <p:nvGrpSpPr>
+          <p:cNvPr id="63" name="Group 62"/>
+          <p:cNvGrpSpPr/>
+          <p:nvPr/>
+        </p:nvGrpSpPr>
+        <p:grpSpPr>
+          <a:xfrm>
+            <a:off x="3503468" y="1117417"/>
+            <a:ext cx="638464" cy="58603"/>
+            <a:chOff x="1238250" y="1087831"/>
+            <a:chExt cx="1280160" cy="115934"/>
+          </a:xfrm>
+        </p:grpSpPr>
+        <p:cxnSp>
+          <p:nvCxnSpPr>
+            <p:cNvPr id="64" name="Straight Connector 63"/>
+            <p:cNvCxnSpPr/>
+            <p:nvPr/>
+          </p:nvCxnSpPr>
+          <p:spPr>
+            <a:xfrm>
+              <a:off x="1238250" y="1089102"/>
+              <a:ext cx="0" cy="114663"/>
+            </a:xfrm>
+            <a:prstGeom prst="line">
+              <a:avLst/>
+            </a:prstGeom>
+            <a:ln w="12700">
+              <a:solidFill>
+                <a:schemeClr val="tx1"/>
+              </a:solidFill>
+            </a:ln>
+          </p:spPr>
+          <p:style>
+            <a:lnRef idx="1">
+              <a:schemeClr val="accent1"/>
+            </a:lnRef>
+            <a:fillRef idx="0">
+              <a:schemeClr val="accent1"/>
+            </a:fillRef>
+            <a:effectRef idx="0">
+              <a:schemeClr val="accent1"/>
+            </a:effectRef>
+            <a:fontRef idx="minor">
+              <a:schemeClr val="tx1"/>
+            </a:fontRef>
+          </p:style>
+        </p:cxnSp>
+        <p:cxnSp>
+          <p:nvCxnSpPr>
+            <p:cNvPr id="65" name="Straight Connector 64"/>
+            <p:cNvCxnSpPr/>
+            <p:nvPr/>
+          </p:nvCxnSpPr>
+          <p:spPr>
+            <a:xfrm>
+              <a:off x="2518410" y="1087831"/>
+              <a:ext cx="0" cy="114663"/>
+            </a:xfrm>
+            <a:prstGeom prst="line">
+              <a:avLst/>
+            </a:prstGeom>
+            <a:ln w="12700">
+              <a:solidFill>
+                <a:schemeClr val="tx1"/>
+              </a:solidFill>
+            </a:ln>
+          </p:spPr>
+          <p:style>
+            <a:lnRef idx="1">
+              <a:schemeClr val="accent1"/>
+            </a:lnRef>
+            <a:fillRef idx="0">
+              <a:schemeClr val="accent1"/>
+            </a:fillRef>
+            <a:effectRef idx="0">
+              <a:schemeClr val="accent1"/>
+            </a:effectRef>
+            <a:fontRef idx="minor">
+              <a:schemeClr val="tx1"/>
+            </a:fontRef>
+          </p:style>
+        </p:cxnSp>
+        <p:cxnSp>
+          <p:nvCxnSpPr>
+            <p:cNvPr id="66" name="Straight Connector 65"/>
+            <p:cNvCxnSpPr/>
+            <p:nvPr/>
+          </p:nvCxnSpPr>
+          <p:spPr>
+            <a:xfrm>
+              <a:off x="1238250" y="1093045"/>
+              <a:ext cx="1280160" cy="0"/>
+            </a:xfrm>
+            <a:prstGeom prst="line">
+              <a:avLst/>
+            </a:prstGeom>
+            <a:ln w="12700">
+              <a:solidFill>
+                <a:schemeClr val="tx1"/>
+              </a:solidFill>
+            </a:ln>
+          </p:spPr>
+          <p:style>
+            <a:lnRef idx="1">
+              <a:schemeClr val="accent1"/>
+            </a:lnRef>
+            <a:fillRef idx="0">
+              <a:schemeClr val="accent1"/>
+            </a:fillRef>
+            <a:effectRef idx="0">
+              <a:schemeClr val="accent1"/>
+            </a:effectRef>
+            <a:fontRef idx="minor">
+              <a:schemeClr val="tx1"/>
+            </a:fontRef>
+          </p:style>
+        </p:cxnSp>
+      </p:grpSp>
+    </p:spTree>
+    <p:extLst>
+      <p:ext uri="{BB962C8B-B14F-4D97-AF65-F5344CB8AC3E}">
+        <p14:creationId xmlns:p14="http://schemas.microsoft.com/office/powerpoint/2010/main" val="3686640967"/>
+      </p:ext>
+    </p:extLst>
+  </p:cSld>
+  <p:clrMapOvr>
+    <a:masterClrMapping/>
+  </p:clrMapOvr>
+</p:sld>
+</file>
+
 <file path=ppt/slides/slide2.xml><?xml version="1.0" encoding="utf-8"?>
 <p:sld xmlns:a="http://schemas.openxmlformats.org/drawingml/2006/main" xmlns:r="http://schemas.openxmlformats.org/officeDocument/2006/relationships" xmlns:p="http://schemas.openxmlformats.org/presentationml/2006/main">
   <p:cSld>

</xml_diff>

<commit_message>
More feedback + new defn of shared bugs for figures
</commit_message>
<xml_diff>
--- a/figures/figures.pptx
+++ b/figures/figures.pptx
@@ -4,6 +4,9 @@
   <p:sldMasterIdLst>
     <p:sldMasterId id="2147483648" r:id="rId1"/>
   </p:sldMasterIdLst>
+  <p:notesMasterIdLst>
+    <p:notesMasterId r:id="rId13"/>
+  </p:notesMasterIdLst>
   <p:sldIdLst>
     <p:sldId id="257" r:id="rId2"/>
     <p:sldId id="258" r:id="rId3"/>
@@ -115,6 +118,440 @@
     </a:lvl9pPr>
   </p:defaultTextStyle>
 </p:presentation>
+</file>
+
+<file path=ppt/notesMasters/notesMaster1.xml><?xml version="1.0" encoding="utf-8"?>
+<p:notesMaster xmlns:a="http://schemas.openxmlformats.org/drawingml/2006/main" xmlns:r="http://schemas.openxmlformats.org/officeDocument/2006/relationships" xmlns:p="http://schemas.openxmlformats.org/presentationml/2006/main">
+  <p:cSld>
+    <p:bg>
+      <p:bgRef idx="1001">
+        <a:schemeClr val="bg1"/>
+      </p:bgRef>
+    </p:bg>
+    <p:spTree>
+      <p:nvGrpSpPr>
+        <p:cNvPr id="1" name=""/>
+        <p:cNvGrpSpPr/>
+        <p:nvPr/>
+      </p:nvGrpSpPr>
+      <p:grpSpPr>
+        <a:xfrm>
+          <a:off x="0" y="0"/>
+          <a:ext cx="0" cy="0"/>
+          <a:chOff x="0" y="0"/>
+          <a:chExt cx="0" cy="0"/>
+        </a:xfrm>
+      </p:grpSpPr>
+      <p:sp>
+        <p:nvSpPr>
+          <p:cNvPr id="2" name="Header Placeholder 1"/>
+          <p:cNvSpPr>
+            <a:spLocks noGrp="1"/>
+          </p:cNvSpPr>
+          <p:nvPr>
+            <p:ph type="hdr" sz="quarter"/>
+          </p:nvPr>
+        </p:nvSpPr>
+        <p:spPr>
+          <a:xfrm>
+            <a:off x="0" y="0"/>
+            <a:ext cx="2971800" cy="457200"/>
+          </a:xfrm>
+          <a:prstGeom prst="rect">
+            <a:avLst/>
+          </a:prstGeom>
+        </p:spPr>
+        <p:txBody>
+          <a:bodyPr vert="horz" lIns="91440" tIns="45720" rIns="91440" bIns="45720" rtlCol="0"/>
+          <a:lstStyle>
+            <a:lvl1pPr algn="l">
+              <a:defRPr sz="1200"/>
+            </a:lvl1pPr>
+          </a:lstStyle>
+          <a:p>
+            <a:endParaRPr lang="en-US"/>
+          </a:p>
+        </p:txBody>
+      </p:sp>
+      <p:sp>
+        <p:nvSpPr>
+          <p:cNvPr id="3" name="Date Placeholder 2"/>
+          <p:cNvSpPr>
+            <a:spLocks noGrp="1"/>
+          </p:cNvSpPr>
+          <p:nvPr>
+            <p:ph type="dt" idx="1"/>
+          </p:nvPr>
+        </p:nvSpPr>
+        <p:spPr>
+          <a:xfrm>
+            <a:off x="3884613" y="0"/>
+            <a:ext cx="2971800" cy="457200"/>
+          </a:xfrm>
+          <a:prstGeom prst="rect">
+            <a:avLst/>
+          </a:prstGeom>
+        </p:spPr>
+        <p:txBody>
+          <a:bodyPr vert="horz" lIns="91440" tIns="45720" rIns="91440" bIns="45720" rtlCol="0"/>
+          <a:lstStyle>
+            <a:lvl1pPr algn="r">
+              <a:defRPr sz="1200"/>
+            </a:lvl1pPr>
+          </a:lstStyle>
+          <a:p>
+            <a:fld id="{7C15C016-C61E-4F5D-86CD-A711DB2C9AD2}" type="datetimeFigureOut">
+              <a:rPr lang="en-US" smtClean="0"/>
+              <a:t>10/4/2016</a:t>
+            </a:fld>
+            <a:endParaRPr lang="en-US"/>
+          </a:p>
+        </p:txBody>
+      </p:sp>
+      <p:sp>
+        <p:nvSpPr>
+          <p:cNvPr id="4" name="Slide Image Placeholder 3"/>
+          <p:cNvSpPr>
+            <a:spLocks noGrp="1" noRot="1" noChangeAspect="1"/>
+          </p:cNvSpPr>
+          <p:nvPr>
+            <p:ph type="sldImg" idx="2"/>
+          </p:nvPr>
+        </p:nvSpPr>
+        <p:spPr>
+          <a:xfrm>
+            <a:off x="1143000" y="685800"/>
+            <a:ext cx="4572000" cy="3429000"/>
+          </a:xfrm>
+          <a:prstGeom prst="rect">
+            <a:avLst/>
+          </a:prstGeom>
+          <a:noFill/>
+          <a:ln w="12700">
+            <a:solidFill>
+              <a:prstClr val="black"/>
+            </a:solidFill>
+          </a:ln>
+        </p:spPr>
+        <p:txBody>
+          <a:bodyPr vert="horz" lIns="91440" tIns="45720" rIns="91440" bIns="45720" rtlCol="0" anchor="ctr"/>
+          <a:lstStyle/>
+          <a:p>
+            <a:endParaRPr lang="en-US"/>
+          </a:p>
+        </p:txBody>
+      </p:sp>
+      <p:sp>
+        <p:nvSpPr>
+          <p:cNvPr id="5" name="Notes Placeholder 4"/>
+          <p:cNvSpPr>
+            <a:spLocks noGrp="1"/>
+          </p:cNvSpPr>
+          <p:nvPr>
+            <p:ph type="body" sz="quarter" idx="3"/>
+          </p:nvPr>
+        </p:nvSpPr>
+        <p:spPr>
+          <a:xfrm>
+            <a:off x="685800" y="4343400"/>
+            <a:ext cx="5486400" cy="4114800"/>
+          </a:xfrm>
+          <a:prstGeom prst="rect">
+            <a:avLst/>
+          </a:prstGeom>
+        </p:spPr>
+        <p:txBody>
+          <a:bodyPr vert="horz" lIns="91440" tIns="45720" rIns="91440" bIns="45720" rtlCol="0"/>
+          <a:lstStyle/>
+          <a:p>
+            <a:pPr lvl="0"/>
+            <a:r>
+              <a:rPr lang="en-US" smtClean="0"/>
+              <a:t>Click to edit Master text styles</a:t>
+            </a:r>
+          </a:p>
+          <a:p>
+            <a:pPr lvl="1"/>
+            <a:r>
+              <a:rPr lang="en-US" smtClean="0"/>
+              <a:t>Second level</a:t>
+            </a:r>
+          </a:p>
+          <a:p>
+            <a:pPr lvl="2"/>
+            <a:r>
+              <a:rPr lang="en-US" smtClean="0"/>
+              <a:t>Third level</a:t>
+            </a:r>
+          </a:p>
+          <a:p>
+            <a:pPr lvl="3"/>
+            <a:r>
+              <a:rPr lang="en-US" smtClean="0"/>
+              <a:t>Fourth level</a:t>
+            </a:r>
+          </a:p>
+          <a:p>
+            <a:pPr lvl="4"/>
+            <a:r>
+              <a:rPr lang="en-US" smtClean="0"/>
+              <a:t>Fifth level</a:t>
+            </a:r>
+            <a:endParaRPr lang="en-US"/>
+          </a:p>
+        </p:txBody>
+      </p:sp>
+      <p:sp>
+        <p:nvSpPr>
+          <p:cNvPr id="6" name="Footer Placeholder 5"/>
+          <p:cNvSpPr>
+            <a:spLocks noGrp="1"/>
+          </p:cNvSpPr>
+          <p:nvPr>
+            <p:ph type="ftr" sz="quarter" idx="4"/>
+          </p:nvPr>
+        </p:nvSpPr>
+        <p:spPr>
+          <a:xfrm>
+            <a:off x="0" y="8685213"/>
+            <a:ext cx="2971800" cy="457200"/>
+          </a:xfrm>
+          <a:prstGeom prst="rect">
+            <a:avLst/>
+          </a:prstGeom>
+        </p:spPr>
+        <p:txBody>
+          <a:bodyPr vert="horz" lIns="91440" tIns="45720" rIns="91440" bIns="45720" rtlCol="0" anchor="b"/>
+          <a:lstStyle>
+            <a:lvl1pPr algn="l">
+              <a:defRPr sz="1200"/>
+            </a:lvl1pPr>
+          </a:lstStyle>
+          <a:p>
+            <a:endParaRPr lang="en-US"/>
+          </a:p>
+        </p:txBody>
+      </p:sp>
+      <p:sp>
+        <p:nvSpPr>
+          <p:cNvPr id="7" name="Slide Number Placeholder 6"/>
+          <p:cNvSpPr>
+            <a:spLocks noGrp="1"/>
+          </p:cNvSpPr>
+          <p:nvPr>
+            <p:ph type="sldNum" sz="quarter" idx="5"/>
+          </p:nvPr>
+        </p:nvSpPr>
+        <p:spPr>
+          <a:xfrm>
+            <a:off x="3884613" y="8685213"/>
+            <a:ext cx="2971800" cy="457200"/>
+          </a:xfrm>
+          <a:prstGeom prst="rect">
+            <a:avLst/>
+          </a:prstGeom>
+        </p:spPr>
+        <p:txBody>
+          <a:bodyPr vert="horz" lIns="91440" tIns="45720" rIns="91440" bIns="45720" rtlCol="0" anchor="b"/>
+          <a:lstStyle>
+            <a:lvl1pPr algn="r">
+              <a:defRPr sz="1200"/>
+            </a:lvl1pPr>
+          </a:lstStyle>
+          <a:p>
+            <a:fld id="{1AF025F9-1E93-4D2D-9F8B-0E09F6B16C16}" type="slidenum">
+              <a:rPr lang="en-US" smtClean="0"/>
+              <a:t>‹#›</a:t>
+            </a:fld>
+            <a:endParaRPr lang="en-US"/>
+          </a:p>
+        </p:txBody>
+      </p:sp>
+    </p:spTree>
+    <p:extLst>
+      <p:ext uri="{BB962C8B-B14F-4D97-AF65-F5344CB8AC3E}">
+        <p14:creationId xmlns:p14="http://schemas.microsoft.com/office/powerpoint/2010/main" val="4046329222"/>
+      </p:ext>
+    </p:extLst>
+  </p:cSld>
+  <p:clrMap bg1="lt1" tx1="dk1" bg2="lt2" tx2="dk2" accent1="accent1" accent2="accent2" accent3="accent3" accent4="accent4" accent5="accent5" accent6="accent6" hlink="hlink" folHlink="folHlink"/>
+  <p:notesStyle>
+    <a:lvl1pPr marL="0" algn="l" defTabSz="914400" rtl="0" eaLnBrk="1" latinLnBrk="0" hangingPunct="1">
+      <a:defRPr sz="1200" kern="1200">
+        <a:solidFill>
+          <a:schemeClr val="tx1"/>
+        </a:solidFill>
+        <a:latin typeface="+mn-lt"/>
+        <a:ea typeface="+mn-ea"/>
+        <a:cs typeface="+mn-cs"/>
+      </a:defRPr>
+    </a:lvl1pPr>
+    <a:lvl2pPr marL="457200" algn="l" defTabSz="914400" rtl="0" eaLnBrk="1" latinLnBrk="0" hangingPunct="1">
+      <a:defRPr sz="1200" kern="1200">
+        <a:solidFill>
+          <a:schemeClr val="tx1"/>
+        </a:solidFill>
+        <a:latin typeface="+mn-lt"/>
+        <a:ea typeface="+mn-ea"/>
+        <a:cs typeface="+mn-cs"/>
+      </a:defRPr>
+    </a:lvl2pPr>
+    <a:lvl3pPr marL="914400" algn="l" defTabSz="914400" rtl="0" eaLnBrk="1" latinLnBrk="0" hangingPunct="1">
+      <a:defRPr sz="1200" kern="1200">
+        <a:solidFill>
+          <a:schemeClr val="tx1"/>
+        </a:solidFill>
+        <a:latin typeface="+mn-lt"/>
+        <a:ea typeface="+mn-ea"/>
+        <a:cs typeface="+mn-cs"/>
+      </a:defRPr>
+    </a:lvl3pPr>
+    <a:lvl4pPr marL="1371600" algn="l" defTabSz="914400" rtl="0" eaLnBrk="1" latinLnBrk="0" hangingPunct="1">
+      <a:defRPr sz="1200" kern="1200">
+        <a:solidFill>
+          <a:schemeClr val="tx1"/>
+        </a:solidFill>
+        <a:latin typeface="+mn-lt"/>
+        <a:ea typeface="+mn-ea"/>
+        <a:cs typeface="+mn-cs"/>
+      </a:defRPr>
+    </a:lvl4pPr>
+    <a:lvl5pPr marL="1828800" algn="l" defTabSz="914400" rtl="0" eaLnBrk="1" latinLnBrk="0" hangingPunct="1">
+      <a:defRPr sz="1200" kern="1200">
+        <a:solidFill>
+          <a:schemeClr val="tx1"/>
+        </a:solidFill>
+        <a:latin typeface="+mn-lt"/>
+        <a:ea typeface="+mn-ea"/>
+        <a:cs typeface="+mn-cs"/>
+      </a:defRPr>
+    </a:lvl5pPr>
+    <a:lvl6pPr marL="2286000" algn="l" defTabSz="914400" rtl="0" eaLnBrk="1" latinLnBrk="0" hangingPunct="1">
+      <a:defRPr sz="1200" kern="1200">
+        <a:solidFill>
+          <a:schemeClr val="tx1"/>
+        </a:solidFill>
+        <a:latin typeface="+mn-lt"/>
+        <a:ea typeface="+mn-ea"/>
+        <a:cs typeface="+mn-cs"/>
+      </a:defRPr>
+    </a:lvl6pPr>
+    <a:lvl7pPr marL="2743200" algn="l" defTabSz="914400" rtl="0" eaLnBrk="1" latinLnBrk="0" hangingPunct="1">
+      <a:defRPr sz="1200" kern="1200">
+        <a:solidFill>
+          <a:schemeClr val="tx1"/>
+        </a:solidFill>
+        <a:latin typeface="+mn-lt"/>
+        <a:ea typeface="+mn-ea"/>
+        <a:cs typeface="+mn-cs"/>
+      </a:defRPr>
+    </a:lvl7pPr>
+    <a:lvl8pPr marL="3200400" algn="l" defTabSz="914400" rtl="0" eaLnBrk="1" latinLnBrk="0" hangingPunct="1">
+      <a:defRPr sz="1200" kern="1200">
+        <a:solidFill>
+          <a:schemeClr val="tx1"/>
+        </a:solidFill>
+        <a:latin typeface="+mn-lt"/>
+        <a:ea typeface="+mn-ea"/>
+        <a:cs typeface="+mn-cs"/>
+      </a:defRPr>
+    </a:lvl8pPr>
+    <a:lvl9pPr marL="3657600" algn="l" defTabSz="914400" rtl="0" eaLnBrk="1" latinLnBrk="0" hangingPunct="1">
+      <a:defRPr sz="1200" kern="1200">
+        <a:solidFill>
+          <a:schemeClr val="tx1"/>
+        </a:solidFill>
+        <a:latin typeface="+mn-lt"/>
+        <a:ea typeface="+mn-ea"/>
+        <a:cs typeface="+mn-cs"/>
+      </a:defRPr>
+    </a:lvl9pPr>
+  </p:notesStyle>
+</p:notesMaster>
+</file>
+
+<file path=ppt/notesSlides/notesSlide1.xml><?xml version="1.0" encoding="utf-8"?>
+<p:notes xmlns:a="http://schemas.openxmlformats.org/drawingml/2006/main" xmlns:r="http://schemas.openxmlformats.org/officeDocument/2006/relationships" xmlns:p="http://schemas.openxmlformats.org/presentationml/2006/main">
+  <p:cSld>
+    <p:spTree>
+      <p:nvGrpSpPr>
+        <p:cNvPr id="1" name=""/>
+        <p:cNvGrpSpPr/>
+        <p:nvPr/>
+      </p:nvGrpSpPr>
+      <p:grpSpPr>
+        <a:xfrm>
+          <a:off x="0" y="0"/>
+          <a:ext cx="0" cy="0"/>
+          <a:chOff x="0" y="0"/>
+          <a:chExt cx="0" cy="0"/>
+        </a:xfrm>
+      </p:grpSpPr>
+      <p:sp>
+        <p:nvSpPr>
+          <p:cNvPr id="2" name="Slide Image Placeholder 1"/>
+          <p:cNvSpPr>
+            <a:spLocks noGrp="1" noRot="1" noChangeAspect="1"/>
+          </p:cNvSpPr>
+          <p:nvPr>
+            <p:ph type="sldImg"/>
+          </p:nvPr>
+        </p:nvSpPr>
+        <p:spPr/>
+      </p:sp>
+      <p:sp>
+        <p:nvSpPr>
+          <p:cNvPr id="3" name="Notes Placeholder 2"/>
+          <p:cNvSpPr>
+            <a:spLocks noGrp="1"/>
+          </p:cNvSpPr>
+          <p:nvPr>
+            <p:ph type="body" idx="1"/>
+          </p:nvPr>
+        </p:nvSpPr>
+        <p:spPr/>
+        <p:txBody>
+          <a:bodyPr/>
+          <a:lstStyle/>
+          <a:p>
+            <a:endParaRPr lang="en-US" dirty="0"/>
+          </a:p>
+        </p:txBody>
+      </p:sp>
+      <p:sp>
+        <p:nvSpPr>
+          <p:cNvPr id="4" name="Slide Number Placeholder 3"/>
+          <p:cNvSpPr>
+            <a:spLocks noGrp="1"/>
+          </p:cNvSpPr>
+          <p:nvPr>
+            <p:ph type="sldNum" sz="quarter" idx="10"/>
+          </p:nvPr>
+        </p:nvSpPr>
+        <p:spPr/>
+        <p:txBody>
+          <a:bodyPr/>
+          <a:lstStyle/>
+          <a:p>
+            <a:fld id="{1AF025F9-1E93-4D2D-9F8B-0E09F6B16C16}" type="slidenum">
+              <a:rPr lang="en-US" smtClean="0"/>
+              <a:t>6</a:t>
+            </a:fld>
+            <a:endParaRPr lang="en-US"/>
+          </a:p>
+        </p:txBody>
+      </p:sp>
+    </p:spTree>
+    <p:extLst>
+      <p:ext uri="{BB962C8B-B14F-4D97-AF65-F5344CB8AC3E}">
+        <p14:creationId xmlns:p14="http://schemas.microsoft.com/office/powerpoint/2010/main" val="1003475838"/>
+      </p:ext>
+    </p:extLst>
+  </p:cSld>
+  <p:clrMapOvr>
+    <a:masterClrMapping/>
+  </p:clrMapOvr>
+</p:notes>
 </file>
 
 <file path=ppt/slideLayouts/slideLayout1.xml><?xml version="1.0" encoding="utf-8"?>
@@ -298,7 +735,7 @@
           <a:p>
             <a:fld id="{56FF5959-4879-46D8-B814-66C710277C6C}" type="datetimeFigureOut">
               <a:rPr lang="en-US" smtClean="0"/>
-              <a:t>10/3/2016</a:t>
+              <a:t>10/4/2016</a:t>
             </a:fld>
             <a:endParaRPr lang="en-US"/>
           </a:p>
@@ -468,7 +905,7 @@
           <a:p>
             <a:fld id="{56FF5959-4879-46D8-B814-66C710277C6C}" type="datetimeFigureOut">
               <a:rPr lang="en-US" smtClean="0"/>
-              <a:t>10/3/2016</a:t>
+              <a:t>10/4/2016</a:t>
             </a:fld>
             <a:endParaRPr lang="en-US"/>
           </a:p>
@@ -648,7 +1085,7 @@
           <a:p>
             <a:fld id="{56FF5959-4879-46D8-B814-66C710277C6C}" type="datetimeFigureOut">
               <a:rPr lang="en-US" smtClean="0"/>
-              <a:t>10/3/2016</a:t>
+              <a:t>10/4/2016</a:t>
             </a:fld>
             <a:endParaRPr lang="en-US"/>
           </a:p>
@@ -818,7 +1255,7 @@
           <a:p>
             <a:fld id="{56FF5959-4879-46D8-B814-66C710277C6C}" type="datetimeFigureOut">
               <a:rPr lang="en-US" smtClean="0"/>
-              <a:t>10/3/2016</a:t>
+              <a:t>10/4/2016</a:t>
             </a:fld>
             <a:endParaRPr lang="en-US"/>
           </a:p>
@@ -1064,7 +1501,7 @@
           <a:p>
             <a:fld id="{56FF5959-4879-46D8-B814-66C710277C6C}" type="datetimeFigureOut">
               <a:rPr lang="en-US" smtClean="0"/>
-              <a:t>10/3/2016</a:t>
+              <a:t>10/4/2016</a:t>
             </a:fld>
             <a:endParaRPr lang="en-US"/>
           </a:p>
@@ -1352,7 +1789,7 @@
           <a:p>
             <a:fld id="{56FF5959-4879-46D8-B814-66C710277C6C}" type="datetimeFigureOut">
               <a:rPr lang="en-US" smtClean="0"/>
-              <a:t>10/3/2016</a:t>
+              <a:t>10/4/2016</a:t>
             </a:fld>
             <a:endParaRPr lang="en-US"/>
           </a:p>
@@ -1774,7 +2211,7 @@
           <a:p>
             <a:fld id="{56FF5959-4879-46D8-B814-66C710277C6C}" type="datetimeFigureOut">
               <a:rPr lang="en-US" smtClean="0"/>
-              <a:t>10/3/2016</a:t>
+              <a:t>10/4/2016</a:t>
             </a:fld>
             <a:endParaRPr lang="en-US"/>
           </a:p>
@@ -1892,7 +2329,7 @@
           <a:p>
             <a:fld id="{56FF5959-4879-46D8-B814-66C710277C6C}" type="datetimeFigureOut">
               <a:rPr lang="en-US" smtClean="0"/>
-              <a:t>10/3/2016</a:t>
+              <a:t>10/4/2016</a:t>
             </a:fld>
             <a:endParaRPr lang="en-US"/>
           </a:p>
@@ -1987,7 +2424,7 @@
           <a:p>
             <a:fld id="{56FF5959-4879-46D8-B814-66C710277C6C}" type="datetimeFigureOut">
               <a:rPr lang="en-US" smtClean="0"/>
-              <a:t>10/3/2016</a:t>
+              <a:t>10/4/2016</a:t>
             </a:fld>
             <a:endParaRPr lang="en-US"/>
           </a:p>
@@ -2264,7 +2701,7 @@
           <a:p>
             <a:fld id="{56FF5959-4879-46D8-B814-66C710277C6C}" type="datetimeFigureOut">
               <a:rPr lang="en-US" smtClean="0"/>
-              <a:t>10/3/2016</a:t>
+              <a:t>10/4/2016</a:t>
             </a:fld>
             <a:endParaRPr lang="en-US"/>
           </a:p>
@@ -2517,7 +2954,7 @@
           <a:p>
             <a:fld id="{56FF5959-4879-46D8-B814-66C710277C6C}" type="datetimeFigureOut">
               <a:rPr lang="en-US" smtClean="0"/>
-              <a:t>10/3/2016</a:t>
+              <a:t>10/4/2016</a:t>
             </a:fld>
             <a:endParaRPr lang="en-US"/>
           </a:p>
@@ -2730,7 +3167,7 @@
           <a:p>
             <a:fld id="{56FF5959-4879-46D8-B814-66C710277C6C}" type="datetimeFigureOut">
               <a:rPr lang="en-US" smtClean="0"/>
-              <a:t>10/3/2016</a:t>
+              <a:t>10/4/2016</a:t>
             </a:fld>
             <a:endParaRPr lang="en-US"/>
           </a:p>
@@ -3113,10 +3550,10 @@
         </p:nvGrpSpPr>
         <p:grpSpPr>
           <a:xfrm>
-            <a:off x="450790" y="347423"/>
-            <a:ext cx="6700470" cy="2773995"/>
+            <a:off x="517963" y="820974"/>
+            <a:ext cx="6700470" cy="2773994"/>
             <a:chOff x="450790" y="347423"/>
-            <a:chExt cx="6700470" cy="2773995"/>
+            <a:chExt cx="6700470" cy="2773994"/>
           </a:xfrm>
         </p:grpSpPr>
         <p:pic>
@@ -3142,7 +3579,7 @@
           <p:spPr>
             <a:xfrm>
               <a:off x="3738658" y="775254"/>
-              <a:ext cx="3412602" cy="2346164"/>
+              <a:ext cx="3412602" cy="2346163"/>
             </a:xfrm>
             <a:prstGeom prst="rect">
               <a:avLst/>
@@ -3172,15 +3609,15 @@
           <p:spPr>
             <a:xfrm>
               <a:off x="450790" y="775254"/>
-              <a:ext cx="3412602" cy="2346164"/>
+              <a:ext cx="3412602" cy="2346163"/>
             </a:xfrm>
             <a:prstGeom prst="rect">
               <a:avLst/>
             </a:prstGeom>
           </p:spPr>
         </p:pic>
-        <mc:AlternateContent xmlns:mc="http://schemas.openxmlformats.org/markup-compatibility/2006" xmlns:a14="http://schemas.microsoft.com/office/drawing/2010/main">
-          <mc:Choice Requires="a14">
+        <mc:AlternateContent xmlns:mc="http://schemas.openxmlformats.org/markup-compatibility/2006">
+          <mc:Choice xmlns:a14="http://schemas.microsoft.com/office/drawing/2010/main" Requires="a14">
             <p:sp>
               <p:nvSpPr>
                 <p:cNvPr id="8" name="TextBox 7"/>
@@ -3189,8 +3626,8 @@
               </p:nvSpPr>
               <p:spPr>
                 <a:xfrm>
-                  <a:off x="893851" y="506453"/>
-                  <a:ext cx="1263240" cy="307777"/>
+                  <a:off x="684785" y="506453"/>
+                  <a:ext cx="1681372" cy="307777"/>
                 </a:xfrm>
                 <a:prstGeom prst="rect">
                   <a:avLst/>
@@ -3229,6 +3666,103 @@
                                 </a:solidFill>
                                 <a:latin typeface="Cambria Math"/>
                               </a:rPr>
+                              <m:t>𝑞</m:t>
+                            </m:r>
+                          </m:e>
+                          <m:sub>
+                            <m:r>
+                              <a:rPr lang="en-US" sz="1400" b="0" i="1" smtClean="0">
+                                <a:solidFill>
+                                  <a:schemeClr val="tx1"/>
+                                </a:solidFill>
+                                <a:latin typeface="Cambria Math"/>
+                              </a:rPr>
+                              <m:t>𝑟</m:t>
+                            </m:r>
+                          </m:sub>
+                        </m:sSub>
+                        <m:r>
+                          <a:rPr lang="en-US" sz="1400" b="0" i="1" smtClean="0">
+                            <a:solidFill>
+                              <a:schemeClr val="tx1"/>
+                            </a:solidFill>
+                            <a:latin typeface="Cambria Math"/>
+                          </a:rPr>
+                          <m:t>&gt;</m:t>
+                        </m:r>
+                        <m:r>
+                          <a:rPr lang="en-US" sz="1400" b="0" i="1" smtClean="0">
+                            <a:solidFill>
+                              <a:schemeClr val="tx1"/>
+                            </a:solidFill>
+                            <a:latin typeface="Cambria Math"/>
+                          </a:rPr>
+                          <m:t>0.</m:t>
+                        </m:r>
+                        <m:r>
+                          <a:rPr lang="en-US" sz="1400" b="0" i="1" smtClean="0">
+                            <a:solidFill>
+                              <a:schemeClr val="tx1"/>
+                            </a:solidFill>
+                            <a:latin typeface="Cambria Math"/>
+                          </a:rPr>
+                          <m:t>0</m:t>
+                        </m:r>
+                        <m:r>
+                          <a:rPr lang="en-US" sz="1400" b="0" i="1" smtClean="0">
+                            <a:solidFill>
+                              <a:schemeClr val="tx1"/>
+                            </a:solidFill>
+                            <a:latin typeface="Cambria Math"/>
+                          </a:rPr>
+                          <m:t>5</m:t>
+                        </m:r>
+                        <m:r>
+                          <a:rPr lang="en-US" sz="1400" b="0" i="1" smtClean="0">
+                            <a:solidFill>
+                              <a:schemeClr val="tx1"/>
+                            </a:solidFill>
+                            <a:latin typeface="Cambria Math"/>
+                          </a:rPr>
+                          <m:t> </m:t>
+                        </m:r>
+                        <m:r>
+                          <a:rPr lang="en-US" sz="1400" b="0" i="1" smtClean="0">
+                            <a:solidFill>
+                              <a:schemeClr val="tx1"/>
+                            </a:solidFill>
+                            <a:latin typeface="Cambria Math"/>
+                          </a:rPr>
+                          <m:t>𝑜𝑟</m:t>
+                        </m:r>
+                        <m:r>
+                          <a:rPr lang="en-US" sz="1400" b="0" i="1" smtClean="0">
+                            <a:solidFill>
+                              <a:schemeClr val="tx1"/>
+                            </a:solidFill>
+                            <a:latin typeface="Cambria Math"/>
+                          </a:rPr>
+                          <m:t> </m:t>
+                        </m:r>
+                        <m:sSub>
+                          <m:sSubPr>
+                            <m:ctrlPr>
+                              <a:rPr lang="en-US" sz="1400" b="0" i="1" smtClean="0">
+                                <a:solidFill>
+                                  <a:schemeClr val="tx1"/>
+                                </a:solidFill>
+                                <a:latin typeface="Cambria Math"/>
+                              </a:rPr>
+                            </m:ctrlPr>
+                          </m:sSubPr>
+                          <m:e>
+                            <m:r>
+                              <a:rPr lang="en-US" sz="1400" b="0" i="1" smtClean="0">
+                                <a:solidFill>
+                                  <a:schemeClr val="tx1"/>
+                                </a:solidFill>
+                                <a:latin typeface="Cambria Math"/>
+                              </a:rPr>
                               <m:t>𝑟</m:t>
                             </m:r>
                           </m:e>
@@ -3251,7 +3785,7 @@
                             </a:solidFill>
                             <a:latin typeface="Cambria Math"/>
                           </a:rPr>
-                          <m:t>&lt;0.5</m:t>
+                          <m:t>&lt;0</m:t>
                         </m:r>
                       </m:oMath>
                     </m:oMathPara>
@@ -3265,7 +3799,7 @@
               </p:txBody>
             </p:sp>
           </mc:Choice>
-          <mc:Fallback xmlns="">
+          <mc:Fallback>
             <p:sp>
               <p:nvSpPr>
                 <p:cNvPr id="8" name="TextBox 7"/>
@@ -3276,8 +3810,8 @@
               </p:nvSpPr>
               <p:spPr>
                 <a:xfrm>
-                  <a:off x="893851" y="506453"/>
-                  <a:ext cx="1263240" cy="307777"/>
+                  <a:off x="684785" y="506453"/>
+                  <a:ext cx="1681372" cy="307777"/>
                 </a:xfrm>
                 <a:prstGeom prst="rect">
                   <a:avLst/>
@@ -3285,7 +3819,7 @@
                 <a:blipFill rotWithShape="1">
                   <a:blip r:embed="rId4"/>
                   <a:stretch>
-                    <a:fillRect/>
+                    <a:fillRect b="-2000"/>
                   </a:stretch>
                 </a:blipFill>
               </p:spPr>
@@ -3341,8 +3875,8 @@
             </a:p>
           </p:txBody>
         </p:sp>
-        <mc:AlternateContent xmlns:mc="http://schemas.openxmlformats.org/markup-compatibility/2006" xmlns:a14="http://schemas.microsoft.com/office/drawing/2010/main">
-          <mc:Choice Requires="a14">
+        <mc:AlternateContent xmlns:mc="http://schemas.openxmlformats.org/markup-compatibility/2006">
+          <mc:Choice xmlns:a14="http://schemas.microsoft.com/office/drawing/2010/main" Requires="a14">
             <p:sp>
               <p:nvSpPr>
                 <p:cNvPr id="10" name="TextBox 9"/>
@@ -3351,7 +3885,7 @@
               </p:nvSpPr>
               <p:spPr>
                 <a:xfrm>
-                  <a:off x="5285055" y="347423"/>
+                  <a:off x="5658435" y="347423"/>
                   <a:ext cx="1356397" cy="532005"/>
                 </a:xfrm>
                 <a:prstGeom prst="rect">
@@ -3529,7 +4063,7 @@
               </p:txBody>
             </p:sp>
           </mc:Choice>
-          <mc:Fallback xmlns="">
+          <mc:Fallback>
             <p:sp>
               <p:nvSpPr>
                 <p:cNvPr id="10" name="TextBox 9"/>
@@ -3540,7 +4074,7 @@
               </p:nvSpPr>
               <p:spPr>
                 <a:xfrm>
-                  <a:off x="5285055" y="347423"/>
+                  <a:off x="5658435" y="347423"/>
                   <a:ext cx="1356397" cy="532005"/>
                 </a:xfrm>
                 <a:prstGeom prst="rect">
@@ -3568,8 +4102,8 @@
             </p:sp>
           </mc:Fallback>
         </mc:AlternateContent>
-        <mc:AlternateContent xmlns:mc="http://schemas.openxmlformats.org/markup-compatibility/2006" xmlns:a14="http://schemas.microsoft.com/office/drawing/2010/main">
-          <mc:Choice Requires="a14">
+        <mc:AlternateContent xmlns:mc="http://schemas.openxmlformats.org/markup-compatibility/2006">
+          <mc:Choice xmlns:a14="http://schemas.microsoft.com/office/drawing/2010/main" Requires="a14">
             <p:sp>
               <p:nvSpPr>
                 <p:cNvPr id="11" name="TextBox 10"/>
@@ -3578,8 +4112,8 @@
               </p:nvSpPr>
               <p:spPr>
                 <a:xfrm>
-                  <a:off x="4169594" y="506453"/>
-                  <a:ext cx="1275365" cy="307777"/>
+                  <a:off x="3820305" y="491213"/>
+                  <a:ext cx="1867262" cy="728789"/>
                 </a:xfrm>
                 <a:prstGeom prst="rect">
                   <a:avLst/>
@@ -3599,6 +4133,67 @@
                         <m:jc m:val="center"/>
                       </m:oMathParaPr>
                       <m:oMath xmlns:m="http://schemas.openxmlformats.org/officeDocument/2006/math">
+                        <m:sSub>
+                          <m:sSubPr>
+                            <m:ctrlPr>
+                              <a:rPr lang="en-US" sz="1400" i="1" smtClean="0">
+                                <a:solidFill>
+                                  <a:schemeClr val="tx1"/>
+                                </a:solidFill>
+                                <a:latin typeface="Cambria Math"/>
+                              </a:rPr>
+                            </m:ctrlPr>
+                          </m:sSubPr>
+                          <m:e>
+                            <m:r>
+                              <a:rPr lang="en-US" sz="1400" b="0" i="1" smtClean="0">
+                                <a:solidFill>
+                                  <a:schemeClr val="tx1"/>
+                                </a:solidFill>
+                                <a:latin typeface="Cambria Math"/>
+                              </a:rPr>
+                              <m:t>𝑞</m:t>
+                            </m:r>
+                          </m:e>
+                          <m:sub>
+                            <m:r>
+                              <a:rPr lang="en-US" sz="1400" b="0" i="1" smtClean="0">
+                                <a:solidFill>
+                                  <a:schemeClr val="tx1"/>
+                                </a:solidFill>
+                                <a:latin typeface="Cambria Math"/>
+                              </a:rPr>
+                              <m:t>𝑟</m:t>
+                            </m:r>
+                          </m:sub>
+                        </m:sSub>
+                        <m:r>
+                          <a:rPr lang="en-US" sz="1400" b="0" i="1" smtClean="0">
+                            <a:solidFill>
+                              <a:schemeClr val="tx1"/>
+                            </a:solidFill>
+                            <a:latin typeface="Cambria Math"/>
+                          </a:rPr>
+                          <m:t>&lt;0.05 </m:t>
+                        </m:r>
+                        <m:r>
+                          <a:rPr lang="en-US" sz="1400" b="0" i="1" smtClean="0">
+                            <a:solidFill>
+                              <a:schemeClr val="tx1"/>
+                            </a:solidFill>
+                            <a:latin typeface="Cambria Math"/>
+                          </a:rPr>
+                          <m:t>𝑎𝑛𝑑</m:t>
+                        </m:r>
+                        <m:r>
+                          <a:rPr lang="en-US" sz="1400" b="0" i="1" smtClean="0">
+                            <a:solidFill>
+                              <a:schemeClr val="tx1"/>
+                            </a:solidFill>
+                            <a:latin typeface="Cambria Math"/>
+                          </a:rPr>
+                          <m:t> </m:t>
+                        </m:r>
                         <m:sSub>
                           <m:sSubPr>
                             <m:ctrlPr>
@@ -3639,9 +4234,8 @@
                               <a:schemeClr val="tx1"/>
                             </a:solidFill>
                             <a:latin typeface="Cambria Math"/>
-                            <a:ea typeface="Cambria Math"/>
                           </a:rPr>
-                          <m:t>≥</m:t>
+                          <m:t>&gt;</m:t>
                         </m:r>
                         <m:r>
                           <a:rPr lang="en-US" sz="1400" b="0" i="1" smtClean="0">
@@ -3650,7 +4244,7 @@
                             </a:solidFill>
                             <a:latin typeface="Cambria Math"/>
                           </a:rPr>
-                          <m:t>0.5</m:t>
+                          <m:t>0</m:t>
                         </m:r>
                       </m:oMath>
                     </m:oMathPara>
@@ -3664,7 +4258,7 @@
               </p:txBody>
             </p:sp>
           </mc:Choice>
-          <mc:Fallback xmlns="">
+          <mc:Fallback>
             <p:sp>
               <p:nvSpPr>
                 <p:cNvPr id="11" name="TextBox 10"/>
@@ -3675,8 +4269,8 @@
               </p:nvSpPr>
               <p:spPr>
                 <a:xfrm>
-                  <a:off x="4169594" y="506453"/>
-                  <a:ext cx="1275365" cy="307777"/>
+                  <a:off x="3820305" y="491213"/>
+                  <a:ext cx="1867262" cy="728789"/>
                 </a:xfrm>
                 <a:prstGeom prst="rect">
                   <a:avLst/>
@@ -10776,7 +11370,7 @@
                 <a:pPr algn="ctr"/>
                 <a:r>
                   <a:rPr lang="en-US" dirty="0" smtClean="0"/>
-                  <a:t>Phylogenetic inference</a:t>
+                  <a:t>Genome mining</a:t>
                 </a:r>
                 <a:endParaRPr lang="en-US" dirty="0"/>
               </a:p>
@@ -12052,9 +12646,9 @@
         <p:grpSpPr>
           <a:xfrm>
             <a:off x="27432" y="1681089"/>
-            <a:ext cx="9089135" cy="3495821"/>
+            <a:ext cx="9089135" cy="3495820"/>
             <a:chOff x="27432" y="1681089"/>
-            <a:chExt cx="9089135" cy="3495821"/>
+            <a:chExt cx="9089135" cy="3495820"/>
           </a:xfrm>
         </p:grpSpPr>
         <p:pic>
@@ -12066,7 +12660,7 @@
             <p:nvPr/>
           </p:nvPicPr>
           <p:blipFill>
-            <a:blip r:embed="rId2">
+            <a:blip r:embed="rId3">
               <a:extLst>
                 <a:ext uri="{28A0092B-C50C-407E-A947-70E740481C1C}">
                   <a14:useLocalDpi xmlns:a14="http://schemas.microsoft.com/office/drawing/2010/main" val="0"/>
@@ -12080,7 +12674,7 @@
           <p:spPr>
             <a:xfrm>
               <a:off x="27432" y="1681089"/>
-              <a:ext cx="9089135" cy="3495821"/>
+              <a:ext cx="9089135" cy="3495820"/>
             </a:xfrm>
             <a:prstGeom prst="rect">
               <a:avLst/>
@@ -13455,9 +14049,9 @@
         <p:grpSpPr>
           <a:xfrm>
             <a:off x="-18683" y="2285520"/>
-            <a:ext cx="8809052" cy="2799345"/>
+            <a:ext cx="8809052" cy="2799344"/>
             <a:chOff x="-18683" y="2285520"/>
-            <a:chExt cx="8809052" cy="2799345"/>
+            <a:chExt cx="8809052" cy="2799344"/>
           </a:xfrm>
         </p:grpSpPr>
         <p:grpSp>
@@ -13469,9 +14063,9 @@
           <p:grpSpPr>
             <a:xfrm>
               <a:off x="-18683" y="2285520"/>
-              <a:ext cx="8809052" cy="2799345"/>
+              <a:ext cx="8809052" cy="2799344"/>
               <a:chOff x="320040" y="1660786"/>
-              <a:chExt cx="8809052" cy="2799345"/>
+              <a:chExt cx="8809052" cy="2799344"/>
             </a:xfrm>
           </p:grpSpPr>
           <p:grpSp>
@@ -13574,9 +14168,9 @@
             <p:grpSpPr>
               <a:xfrm>
                 <a:off x="4586920" y="1788265"/>
-                <a:ext cx="4542172" cy="2671866"/>
+                <a:ext cx="4542172" cy="2671865"/>
                 <a:chOff x="4586920" y="1788265"/>
-                <a:chExt cx="4542172" cy="2671866"/>
+                <a:chExt cx="4542172" cy="2671865"/>
               </a:xfrm>
             </p:grpSpPr>
             <p:pic>
@@ -13602,7 +14196,7 @@
               <p:spPr>
                 <a:xfrm>
                   <a:off x="4586920" y="1788265"/>
-                  <a:ext cx="4542172" cy="2671866"/>
+                  <a:ext cx="4542172" cy="2671865"/>
                 </a:xfrm>
                 <a:prstGeom prst="rect">
                   <a:avLst/>
@@ -14403,7 +14997,14 @@
                     <a:latin typeface="Arial" panose="020B0604020202020204" pitchFamily="34" charset="0"/>
                     <a:cs typeface="Arial" panose="020B0604020202020204" pitchFamily="34" charset="0"/>
                   </a:rPr>
-                  <a:t>p &lt; 0.001</a:t>
+                  <a:t>p </a:t>
+                </a:r>
+                <a:r>
+                  <a:rPr lang="en-US" sz="1100" dirty="0" smtClean="0">
+                    <a:latin typeface="Arial" panose="020B0604020202020204" pitchFamily="34" charset="0"/>
+                    <a:cs typeface="Arial" panose="020B0604020202020204" pitchFamily="34" charset="0"/>
+                  </a:rPr>
+                  <a:t>= 0.007</a:t>
                 </a:r>
                 <a:endParaRPr lang="en-US" sz="1100" dirty="0">
                   <a:latin typeface="Arial" panose="020B0604020202020204" pitchFamily="34" charset="0"/>
@@ -14575,7 +15176,14 @@
                     <a:latin typeface="Arial" panose="020B0604020202020204" pitchFamily="34" charset="0"/>
                     <a:cs typeface="Arial" panose="020B0604020202020204" pitchFamily="34" charset="0"/>
                   </a:rPr>
-                  <a:t>p = 0.06</a:t>
+                  <a:t>p = </a:t>
+                </a:r>
+                <a:r>
+                  <a:rPr lang="en-US" sz="1100" dirty="0" smtClean="0">
+                    <a:latin typeface="Arial" panose="020B0604020202020204" pitchFamily="34" charset="0"/>
+                    <a:cs typeface="Arial" panose="020B0604020202020204" pitchFamily="34" charset="0"/>
+                  </a:rPr>
+                  <a:t>0.3</a:t>
                 </a:r>
                 <a:endParaRPr lang="en-US" sz="1100" dirty="0">
                   <a:latin typeface="Arial" panose="020B0604020202020204" pitchFamily="34" charset="0"/>
@@ -14747,7 +15355,21 @@
                     <a:latin typeface="Arial" panose="020B0604020202020204" pitchFamily="34" charset="0"/>
                     <a:cs typeface="Arial" panose="020B0604020202020204" pitchFamily="34" charset="0"/>
                   </a:rPr>
-                  <a:t>p = 0.5</a:t>
+                  <a:t>p </a:t>
+                </a:r>
+                <a:r>
+                  <a:rPr lang="en-US" sz="1100" dirty="0" smtClean="0">
+                    <a:latin typeface="Arial" panose="020B0604020202020204" pitchFamily="34" charset="0"/>
+                    <a:cs typeface="Arial" panose="020B0604020202020204" pitchFamily="34" charset="0"/>
+                  </a:rPr>
+                  <a:t>&gt; </a:t>
+                </a:r>
+                <a:r>
+                  <a:rPr lang="en-US" sz="1100" dirty="0" smtClean="0">
+                    <a:latin typeface="Arial" panose="020B0604020202020204" pitchFamily="34" charset="0"/>
+                    <a:cs typeface="Arial" panose="020B0604020202020204" pitchFamily="34" charset="0"/>
+                  </a:rPr>
+                  <a:t>0.5</a:t>
                 </a:r>
                 <a:endParaRPr lang="en-US" sz="1100" dirty="0">
                   <a:latin typeface="Arial" panose="020B0604020202020204" pitchFamily="34" charset="0"/>
@@ -14790,16 +15412,16 @@
       </p:grpSpPr>
       <p:grpSp>
         <p:nvGrpSpPr>
-          <p:cNvPr id="2" name="Group 1"/>
+          <p:cNvPr id="4" name="Group 3"/>
           <p:cNvGrpSpPr/>
           <p:nvPr/>
         </p:nvGrpSpPr>
         <p:grpSpPr>
           <a:xfrm>
             <a:off x="-18683" y="2285520"/>
-            <a:ext cx="8809052" cy="2799344"/>
+            <a:ext cx="8809051" cy="2799344"/>
             <a:chOff x="-18683" y="2285520"/>
-            <a:chExt cx="8809052" cy="2799344"/>
+            <a:chExt cx="8809051" cy="2799344"/>
           </a:xfrm>
         </p:grpSpPr>
         <p:grpSp>
@@ -14811,9 +15433,9 @@
           <p:grpSpPr>
             <a:xfrm>
               <a:off x="-18683" y="2285520"/>
-              <a:ext cx="8809052" cy="2799344"/>
+              <a:ext cx="8809051" cy="2799344"/>
               <a:chOff x="320040" y="1660786"/>
-              <a:chExt cx="8809052" cy="2799344"/>
+              <a:chExt cx="8809051" cy="2799344"/>
             </a:xfrm>
           </p:grpSpPr>
           <p:grpSp>
@@ -14915,10 +15537,10 @@
             </p:nvGrpSpPr>
             <p:grpSpPr>
               <a:xfrm>
-                <a:off x="4586920" y="1788265"/>
-                <a:ext cx="4542172" cy="2671865"/>
-                <a:chOff x="4586920" y="1788265"/>
-                <a:chExt cx="4542172" cy="2671865"/>
+                <a:off x="4586921" y="1788265"/>
+                <a:ext cx="4542170" cy="2671865"/>
+                <a:chOff x="4586921" y="1788265"/>
+                <a:chExt cx="4542170" cy="2671865"/>
               </a:xfrm>
             </p:grpSpPr>
             <p:pic>
@@ -14943,8 +15565,8 @@
               </p:blipFill>
               <p:spPr>
                 <a:xfrm>
-                  <a:off x="4586920" y="1788265"/>
-                  <a:ext cx="4542172" cy="2671865"/>
+                  <a:off x="4586921" y="1788265"/>
+                  <a:ext cx="4542170" cy="2671865"/>
                 </a:xfrm>
                 <a:prstGeom prst="rect">
                   <a:avLst/>
@@ -15745,7 +16367,14 @@
                     <a:latin typeface="Arial" panose="020B0604020202020204" pitchFamily="34" charset="0"/>
                     <a:cs typeface="Arial" panose="020B0604020202020204" pitchFamily="34" charset="0"/>
                   </a:rPr>
-                  <a:t>p = 0.13</a:t>
+                  <a:t>p = </a:t>
+                </a:r>
+                <a:r>
+                  <a:rPr lang="en-US" sz="1100" dirty="0" smtClean="0">
+                    <a:latin typeface="Arial" panose="020B0604020202020204" pitchFamily="34" charset="0"/>
+                    <a:cs typeface="Arial" panose="020B0604020202020204" pitchFamily="34" charset="0"/>
+                  </a:rPr>
+                  <a:t>0.35</a:t>
                 </a:r>
                 <a:endParaRPr lang="en-US" sz="1100" dirty="0">
                   <a:latin typeface="Arial" panose="020B0604020202020204" pitchFamily="34" charset="0"/>
@@ -15763,7 +16392,7 @@
           </p:nvGrpSpPr>
           <p:grpSpPr>
             <a:xfrm>
-              <a:off x="6279882" y="2998037"/>
+              <a:off x="6279882" y="2312237"/>
               <a:ext cx="787400" cy="289949"/>
               <a:chOff x="1926957" y="2380439"/>
               <a:chExt cx="787400" cy="289949"/>
@@ -15917,7 +16546,14 @@
                     <a:latin typeface="Arial" panose="020B0604020202020204" pitchFamily="34" charset="0"/>
                     <a:cs typeface="Arial" panose="020B0604020202020204" pitchFamily="34" charset="0"/>
                   </a:rPr>
-                  <a:t>p = 0.002</a:t>
+                  <a:t>p = 0</a:t>
+                </a:r>
+                <a:r>
+                  <a:rPr lang="en-US" sz="1100" dirty="0" smtClean="0">
+                    <a:latin typeface="Arial" panose="020B0604020202020204" pitchFamily="34" charset="0"/>
+                    <a:cs typeface="Arial" panose="020B0604020202020204" pitchFamily="34" charset="0"/>
+                  </a:rPr>
+                  <a:t>. 26</a:t>
                 </a:r>
                 <a:endParaRPr lang="en-US" sz="1100" dirty="0">
                   <a:latin typeface="Arial" panose="020B0604020202020204" pitchFamily="34" charset="0"/>
@@ -16089,7 +16725,21 @@
                     <a:latin typeface="Arial" panose="020B0604020202020204" pitchFamily="34" charset="0"/>
                     <a:cs typeface="Arial" panose="020B0604020202020204" pitchFamily="34" charset="0"/>
                   </a:rPr>
-                  <a:t>p = 0.5</a:t>
+                  <a:t>p </a:t>
+                </a:r>
+                <a:r>
+                  <a:rPr lang="en-US" sz="1100" dirty="0" smtClean="0">
+                    <a:latin typeface="Arial" panose="020B0604020202020204" pitchFamily="34" charset="0"/>
+                    <a:cs typeface="Arial" panose="020B0604020202020204" pitchFamily="34" charset="0"/>
+                  </a:rPr>
+                  <a:t>&gt; </a:t>
+                </a:r>
+                <a:r>
+                  <a:rPr lang="en-US" sz="1100" dirty="0" smtClean="0">
+                    <a:latin typeface="Arial" panose="020B0604020202020204" pitchFamily="34" charset="0"/>
+                    <a:cs typeface="Arial" panose="020B0604020202020204" pitchFamily="34" charset="0"/>
+                  </a:rPr>
+                  <a:t>0.5</a:t>
                 </a:r>
                 <a:endParaRPr lang="en-US" sz="1100" dirty="0">
                   <a:latin typeface="Arial" panose="020B0604020202020204" pitchFamily="34" charset="0"/>
@@ -16396,4 +17046,289 @@
   <a:objectDefaults/>
   <a:extraClrSchemeLst/>
 </a:theme>
+</file>
+
+<file path=ppt/theme/theme2.xml><?xml version="1.0" encoding="utf-8"?>
+<a:theme xmlns:a="http://schemas.openxmlformats.org/drawingml/2006/main" name="Office Theme">
+  <a:themeElements>
+    <a:clrScheme name="Office">
+      <a:dk1>
+        <a:sysClr val="windowText" lastClr="000000"/>
+      </a:dk1>
+      <a:lt1>
+        <a:sysClr val="window" lastClr="FFFFFF"/>
+      </a:lt1>
+      <a:dk2>
+        <a:srgbClr val="1F497D"/>
+      </a:dk2>
+      <a:lt2>
+        <a:srgbClr val="EEECE1"/>
+      </a:lt2>
+      <a:accent1>
+        <a:srgbClr val="4F81BD"/>
+      </a:accent1>
+      <a:accent2>
+        <a:srgbClr val="C0504D"/>
+      </a:accent2>
+      <a:accent3>
+        <a:srgbClr val="9BBB59"/>
+      </a:accent3>
+      <a:accent4>
+        <a:srgbClr val="8064A2"/>
+      </a:accent4>
+      <a:accent5>
+        <a:srgbClr val="4BACC6"/>
+      </a:accent5>
+      <a:accent6>
+        <a:srgbClr val="F79646"/>
+      </a:accent6>
+      <a:hlink>
+        <a:srgbClr val="0000FF"/>
+      </a:hlink>
+      <a:folHlink>
+        <a:srgbClr val="800080"/>
+      </a:folHlink>
+    </a:clrScheme>
+    <a:fontScheme name="Office">
+      <a:majorFont>
+        <a:latin typeface="Calibri"/>
+        <a:ea typeface=""/>
+        <a:cs typeface=""/>
+        <a:font script="Jpan" typeface="ＭＳ Ｐゴシック"/>
+        <a:font script="Hang" typeface="맑은 고딕"/>
+        <a:font script="Hans" typeface="宋体"/>
+        <a:font script="Hant" typeface="新細明體"/>
+        <a:font script="Arab" typeface="Times New Roman"/>
+        <a:font script="Hebr" typeface="Times New Roman"/>
+        <a:font script="Thai" typeface="Angsana New"/>
+        <a:font script="Ethi" typeface="Nyala"/>
+        <a:font script="Beng" typeface="Vrinda"/>
+        <a:font script="Gujr" typeface="Shruti"/>
+        <a:font script="Khmr" typeface="MoolBoran"/>
+        <a:font script="Knda" typeface="Tunga"/>
+        <a:font script="Guru" typeface="Raavi"/>
+        <a:font script="Cans" typeface="Euphemia"/>
+        <a:font script="Cher" typeface="Plantagenet Cherokee"/>
+        <a:font script="Yiii" typeface="Microsoft Yi Baiti"/>
+        <a:font script="Tibt" typeface="Microsoft Himalaya"/>
+        <a:font script="Thaa" typeface="MV Boli"/>
+        <a:font script="Deva" typeface="Mangal"/>
+        <a:font script="Telu" typeface="Gautami"/>
+        <a:font script="Taml" typeface="Latha"/>
+        <a:font script="Syrc" typeface="Estrangelo Edessa"/>
+        <a:font script="Orya" typeface="Kalinga"/>
+        <a:font script="Mlym" typeface="Kartika"/>
+        <a:font script="Laoo" typeface="DokChampa"/>
+        <a:font script="Sinh" typeface="Iskoola Pota"/>
+        <a:font script="Mong" typeface="Mongolian Baiti"/>
+        <a:font script="Viet" typeface="Times New Roman"/>
+        <a:font script="Uigh" typeface="Microsoft Uighur"/>
+        <a:font script="Geor" typeface="Sylfaen"/>
+      </a:majorFont>
+      <a:minorFont>
+        <a:latin typeface="Calibri"/>
+        <a:ea typeface=""/>
+        <a:cs typeface=""/>
+        <a:font script="Jpan" typeface="ＭＳ Ｐゴシック"/>
+        <a:font script="Hang" typeface="맑은 고딕"/>
+        <a:font script="Hans" typeface="宋体"/>
+        <a:font script="Hant" typeface="新細明體"/>
+        <a:font script="Arab" typeface="Arial"/>
+        <a:font script="Hebr" typeface="Arial"/>
+        <a:font script="Thai" typeface="Cordia New"/>
+        <a:font script="Ethi" typeface="Nyala"/>
+        <a:font script="Beng" typeface="Vrinda"/>
+        <a:font script="Gujr" typeface="Shruti"/>
+        <a:font script="Khmr" typeface="DaunPenh"/>
+        <a:font script="Knda" typeface="Tunga"/>
+        <a:font script="Guru" typeface="Raavi"/>
+        <a:font script="Cans" typeface="Euphemia"/>
+        <a:font script="Cher" typeface="Plantagenet Cherokee"/>
+        <a:font script="Yiii" typeface="Microsoft Yi Baiti"/>
+        <a:font script="Tibt" typeface="Microsoft Himalaya"/>
+        <a:font script="Thaa" typeface="MV Boli"/>
+        <a:font script="Deva" typeface="Mangal"/>
+        <a:font script="Telu" typeface="Gautami"/>
+        <a:font script="Taml" typeface="Latha"/>
+        <a:font script="Syrc" typeface="Estrangelo Edessa"/>
+        <a:font script="Orya" typeface="Kalinga"/>
+        <a:font script="Mlym" typeface="Kartika"/>
+        <a:font script="Laoo" typeface="DokChampa"/>
+        <a:font script="Sinh" typeface="Iskoola Pota"/>
+        <a:font script="Mong" typeface="Mongolian Baiti"/>
+        <a:font script="Viet" typeface="Arial"/>
+        <a:font script="Uigh" typeface="Microsoft Uighur"/>
+        <a:font script="Geor" typeface="Sylfaen"/>
+      </a:minorFont>
+    </a:fontScheme>
+    <a:fmtScheme name="Office">
+      <a:fillStyleLst>
+        <a:solidFill>
+          <a:schemeClr val="phClr"/>
+        </a:solidFill>
+        <a:gradFill rotWithShape="1">
+          <a:gsLst>
+            <a:gs pos="0">
+              <a:schemeClr val="phClr">
+                <a:tint val="50000"/>
+                <a:satMod val="300000"/>
+              </a:schemeClr>
+            </a:gs>
+            <a:gs pos="35000">
+              <a:schemeClr val="phClr">
+                <a:tint val="37000"/>
+                <a:satMod val="300000"/>
+              </a:schemeClr>
+            </a:gs>
+            <a:gs pos="100000">
+              <a:schemeClr val="phClr">
+                <a:tint val="15000"/>
+                <a:satMod val="350000"/>
+              </a:schemeClr>
+            </a:gs>
+          </a:gsLst>
+          <a:lin ang="16200000" scaled="1"/>
+        </a:gradFill>
+        <a:gradFill rotWithShape="1">
+          <a:gsLst>
+            <a:gs pos="0">
+              <a:schemeClr val="phClr">
+                <a:shade val="51000"/>
+                <a:satMod val="130000"/>
+              </a:schemeClr>
+            </a:gs>
+            <a:gs pos="80000">
+              <a:schemeClr val="phClr">
+                <a:shade val="93000"/>
+                <a:satMod val="130000"/>
+              </a:schemeClr>
+            </a:gs>
+            <a:gs pos="100000">
+              <a:schemeClr val="phClr">
+                <a:shade val="94000"/>
+                <a:satMod val="135000"/>
+              </a:schemeClr>
+            </a:gs>
+          </a:gsLst>
+          <a:lin ang="16200000" scaled="0"/>
+        </a:gradFill>
+      </a:fillStyleLst>
+      <a:lnStyleLst>
+        <a:ln w="9525" cap="flat" cmpd="sng" algn="ctr">
+          <a:solidFill>
+            <a:schemeClr val="phClr">
+              <a:shade val="95000"/>
+              <a:satMod val="105000"/>
+            </a:schemeClr>
+          </a:solidFill>
+          <a:prstDash val="solid"/>
+        </a:ln>
+        <a:ln w="25400" cap="flat" cmpd="sng" algn="ctr">
+          <a:solidFill>
+            <a:schemeClr val="phClr"/>
+          </a:solidFill>
+          <a:prstDash val="solid"/>
+        </a:ln>
+        <a:ln w="38100" cap="flat" cmpd="sng" algn="ctr">
+          <a:solidFill>
+            <a:schemeClr val="phClr"/>
+          </a:solidFill>
+          <a:prstDash val="solid"/>
+        </a:ln>
+      </a:lnStyleLst>
+      <a:effectStyleLst>
+        <a:effectStyle>
+          <a:effectLst>
+            <a:outerShdw blurRad="40000" dist="20000" dir="5400000" rotWithShape="0">
+              <a:srgbClr val="000000">
+                <a:alpha val="38000"/>
+              </a:srgbClr>
+            </a:outerShdw>
+          </a:effectLst>
+        </a:effectStyle>
+        <a:effectStyle>
+          <a:effectLst>
+            <a:outerShdw blurRad="40000" dist="23000" dir="5400000" rotWithShape="0">
+              <a:srgbClr val="000000">
+                <a:alpha val="35000"/>
+              </a:srgbClr>
+            </a:outerShdw>
+          </a:effectLst>
+        </a:effectStyle>
+        <a:effectStyle>
+          <a:effectLst>
+            <a:outerShdw blurRad="40000" dist="23000" dir="5400000" rotWithShape="0">
+              <a:srgbClr val="000000">
+                <a:alpha val="35000"/>
+              </a:srgbClr>
+            </a:outerShdw>
+          </a:effectLst>
+          <a:scene3d>
+            <a:camera prst="orthographicFront">
+              <a:rot lat="0" lon="0" rev="0"/>
+            </a:camera>
+            <a:lightRig rig="threePt" dir="t">
+              <a:rot lat="0" lon="0" rev="1200000"/>
+            </a:lightRig>
+          </a:scene3d>
+          <a:sp3d>
+            <a:bevelT w="63500" h="25400"/>
+          </a:sp3d>
+        </a:effectStyle>
+      </a:effectStyleLst>
+      <a:bgFillStyleLst>
+        <a:solidFill>
+          <a:schemeClr val="phClr"/>
+        </a:solidFill>
+        <a:gradFill rotWithShape="1">
+          <a:gsLst>
+            <a:gs pos="0">
+              <a:schemeClr val="phClr">
+                <a:tint val="40000"/>
+                <a:satMod val="350000"/>
+              </a:schemeClr>
+            </a:gs>
+            <a:gs pos="40000">
+              <a:schemeClr val="phClr">
+                <a:tint val="45000"/>
+                <a:shade val="99000"/>
+                <a:satMod val="350000"/>
+              </a:schemeClr>
+            </a:gs>
+            <a:gs pos="100000">
+              <a:schemeClr val="phClr">
+                <a:shade val="20000"/>
+                <a:satMod val="255000"/>
+              </a:schemeClr>
+            </a:gs>
+          </a:gsLst>
+          <a:path path="circle">
+            <a:fillToRect l="50000" t="-80000" r="50000" b="180000"/>
+          </a:path>
+        </a:gradFill>
+        <a:gradFill rotWithShape="1">
+          <a:gsLst>
+            <a:gs pos="0">
+              <a:schemeClr val="phClr">
+                <a:tint val="80000"/>
+                <a:satMod val="300000"/>
+              </a:schemeClr>
+            </a:gs>
+            <a:gs pos="100000">
+              <a:schemeClr val="phClr">
+                <a:shade val="30000"/>
+                <a:satMod val="200000"/>
+              </a:schemeClr>
+            </a:gs>
+          </a:gsLst>
+          <a:path path="circle">
+            <a:fillToRect l="50000" t="50000" r="50000" b="50000"/>
+          </a:path>
+        </a:gradFill>
+      </a:bgFillStyleLst>
+    </a:fmtScheme>
+  </a:themeElements>
+  <a:objectDefaults/>
+  <a:extraClrSchemeLst/>
+</a:theme>
 </file>
</xml_diff>